<commit_message>
update MoveWiFi_v4, add 4GRoute_ShenZhen.
</commit_message>
<xml_diff>
--- a/graphic.pptx
+++ b/graphic.pptx
@@ -19,8 +19,8 @@
     <p:sldId id="265" r:id="rId10"/>
     <p:sldId id="263" r:id="rId11"/>
     <p:sldId id="266" r:id="rId12"/>
-    <p:sldId id="267" r:id="rId13"/>
-    <p:sldId id="268" r:id="rId14"/>
+    <p:sldId id="268" r:id="rId13"/>
+    <p:sldId id="267" r:id="rId14"/>
   </p:sldIdLst>
   <p:sldSz cx="12192000" cy="6858000"/>
   <p:notesSz cx="6858000" cy="9144000"/>
@@ -209,7 +209,7 @@
           <a:p>
             <a:fld id="{DDED566E-5D7F-4531-8C4F-B890F2DF42DB}" type="datetimeFigureOut">
               <a:rPr lang="zh-CN" altLang="en-US" smtClean="0"/>
-              <a:t>2018/9/5</a:t>
+              <a:t>2018/10/16</a:t>
             </a:fld>
             <a:endParaRPr lang="zh-CN" altLang="en-US"/>
           </a:p>
@@ -689,7 +689,7 @@
           <a:p>
             <a:fld id="{7A08BB2A-4DEF-488C-8A91-ACD052FEC8C5}" type="datetimeFigureOut">
               <a:rPr lang="zh-CN" altLang="en-US" smtClean="0"/>
-              <a:t>2018/9/5</a:t>
+              <a:t>2018/10/16</a:t>
             </a:fld>
             <a:endParaRPr lang="zh-CN" altLang="en-US"/>
           </a:p>
@@ -857,7 +857,7 @@
           <a:p>
             <a:fld id="{7A08BB2A-4DEF-488C-8A91-ACD052FEC8C5}" type="datetimeFigureOut">
               <a:rPr lang="zh-CN" altLang="en-US" smtClean="0"/>
-              <a:t>2018/9/5</a:t>
+              <a:t>2018/10/16</a:t>
             </a:fld>
             <a:endParaRPr lang="zh-CN" altLang="en-US"/>
           </a:p>
@@ -1035,7 +1035,7 @@
           <a:p>
             <a:fld id="{7A08BB2A-4DEF-488C-8A91-ACD052FEC8C5}" type="datetimeFigureOut">
               <a:rPr lang="zh-CN" altLang="en-US" smtClean="0"/>
-              <a:t>2018/9/5</a:t>
+              <a:t>2018/10/16</a:t>
             </a:fld>
             <a:endParaRPr lang="zh-CN" altLang="en-US"/>
           </a:p>
@@ -1203,7 +1203,7 @@
           <a:p>
             <a:fld id="{7A08BB2A-4DEF-488C-8A91-ACD052FEC8C5}" type="datetimeFigureOut">
               <a:rPr lang="zh-CN" altLang="en-US" smtClean="0"/>
-              <a:t>2018/9/5</a:t>
+              <a:t>2018/10/16</a:t>
             </a:fld>
             <a:endParaRPr lang="zh-CN" altLang="en-US"/>
           </a:p>
@@ -1448,7 +1448,7 @@
           <a:p>
             <a:fld id="{7A08BB2A-4DEF-488C-8A91-ACD052FEC8C5}" type="datetimeFigureOut">
               <a:rPr lang="zh-CN" altLang="en-US" smtClean="0"/>
-              <a:t>2018/9/5</a:t>
+              <a:t>2018/10/16</a:t>
             </a:fld>
             <a:endParaRPr lang="zh-CN" altLang="en-US"/>
           </a:p>
@@ -1677,7 +1677,7 @@
           <a:p>
             <a:fld id="{7A08BB2A-4DEF-488C-8A91-ACD052FEC8C5}" type="datetimeFigureOut">
               <a:rPr lang="zh-CN" altLang="en-US" smtClean="0"/>
-              <a:t>2018/9/5</a:t>
+              <a:t>2018/10/16</a:t>
             </a:fld>
             <a:endParaRPr lang="zh-CN" altLang="en-US"/>
           </a:p>
@@ -2041,7 +2041,7 @@
           <a:p>
             <a:fld id="{7A08BB2A-4DEF-488C-8A91-ACD052FEC8C5}" type="datetimeFigureOut">
               <a:rPr lang="zh-CN" altLang="en-US" smtClean="0"/>
-              <a:t>2018/9/5</a:t>
+              <a:t>2018/10/16</a:t>
             </a:fld>
             <a:endParaRPr lang="zh-CN" altLang="en-US"/>
           </a:p>
@@ -2158,7 +2158,7 @@
           <a:p>
             <a:fld id="{7A08BB2A-4DEF-488C-8A91-ACD052FEC8C5}" type="datetimeFigureOut">
               <a:rPr lang="zh-CN" altLang="en-US" smtClean="0"/>
-              <a:t>2018/9/5</a:t>
+              <a:t>2018/10/16</a:t>
             </a:fld>
             <a:endParaRPr lang="zh-CN" altLang="en-US"/>
           </a:p>
@@ -2253,7 +2253,7 @@
           <a:p>
             <a:fld id="{7A08BB2A-4DEF-488C-8A91-ACD052FEC8C5}" type="datetimeFigureOut">
               <a:rPr lang="zh-CN" altLang="en-US" smtClean="0"/>
-              <a:t>2018/9/5</a:t>
+              <a:t>2018/10/16</a:t>
             </a:fld>
             <a:endParaRPr lang="zh-CN" altLang="en-US"/>
           </a:p>
@@ -2528,7 +2528,7 @@
           <a:p>
             <a:fld id="{7A08BB2A-4DEF-488C-8A91-ACD052FEC8C5}" type="datetimeFigureOut">
               <a:rPr lang="zh-CN" altLang="en-US" smtClean="0"/>
-              <a:t>2018/9/5</a:t>
+              <a:t>2018/10/16</a:t>
             </a:fld>
             <a:endParaRPr lang="zh-CN" altLang="en-US"/>
           </a:p>
@@ -2780,7 +2780,7 @@
           <a:p>
             <a:fld id="{7A08BB2A-4DEF-488C-8A91-ACD052FEC8C5}" type="datetimeFigureOut">
               <a:rPr lang="zh-CN" altLang="en-US" smtClean="0"/>
-              <a:t>2018/9/5</a:t>
+              <a:t>2018/10/16</a:t>
             </a:fld>
             <a:endParaRPr lang="zh-CN" altLang="en-US"/>
           </a:p>
@@ -2991,7 +2991,7 @@
           <a:p>
             <a:fld id="{7A08BB2A-4DEF-488C-8A91-ACD052FEC8C5}" type="datetimeFigureOut">
               <a:rPr lang="zh-CN" altLang="en-US" smtClean="0"/>
-              <a:t>2018/9/5</a:t>
+              <a:t>2018/10/16</a:t>
             </a:fld>
             <a:endParaRPr lang="zh-CN" altLang="en-US"/>
           </a:p>
@@ -5274,7 +5274,7 @@
           <p:cNvPr id="3" name="图片 2">
             <a:extLst>
               <a:ext uri="{FF2B5EF4-FFF2-40B4-BE49-F238E27FC236}">
-                <a16:creationId xmlns:a16="http://schemas.microsoft.com/office/drawing/2014/main" xmlns="" id="{98758726-BE56-48DD-9184-9BB7EA8B90E9}"/>
+                <a16:creationId xmlns="" xmlns:a16="http://schemas.microsoft.com/office/drawing/2014/main" id="{98758726-BE56-48DD-9184-9BB7EA8B90E9}"/>
               </a:ext>
             </a:extLst>
           </p:cNvPr>
@@ -6091,1077 +6091,50 @@
           <a:chExt cx="0" cy="0"/>
         </a:xfrm>
       </p:grpSpPr>
-      <p:sp>
-        <p:nvSpPr>
-          <p:cNvPr id="53" name="矩形 52"/>
-          <p:cNvSpPr/>
-          <p:nvPr/>
-        </p:nvSpPr>
-        <p:spPr>
-          <a:xfrm>
-            <a:off x="6605329" y="5182337"/>
-            <a:ext cx="377644" cy="258869"/>
+      <p:pic>
+        <p:nvPicPr>
+          <p:cNvPr id="1026" name="Picture 2" descr="http://shumeipai.nxez.com/wp-content/uploads/2015/09/20150904210710471-0.jpg"/>
+          <p:cNvPicPr>
+            <a:picLocks noChangeAspect="1" noChangeArrowheads="1"/>
+          </p:cNvPicPr>
+          <p:nvPr/>
+        </p:nvPicPr>
+        <p:blipFill>
+          <a:blip r:embed="rId2">
+            <a:extLst>
+              <a:ext uri="{28A0092B-C50C-407E-A947-70E740481C1C}">
+                <a14:useLocalDpi xmlns:a14="http://schemas.microsoft.com/office/drawing/2010/main" val="0"/>
+              </a:ext>
+            </a:extLst>
+          </a:blip>
+          <a:srcRect/>
+          <a:stretch>
+            <a:fillRect/>
+          </a:stretch>
+        </p:blipFill>
+        <p:spPr bwMode="auto">
+          <a:xfrm>
+            <a:off x="1908173" y="0"/>
+            <a:ext cx="9848398" cy="6795395"/>
           </a:xfrm>
           <a:prstGeom prst="rect">
             <a:avLst/>
           </a:prstGeom>
-        </p:spPr>
-        <p:style>
-          <a:lnRef idx="2">
-            <a:schemeClr val="dk1"/>
-          </a:lnRef>
-          <a:fillRef idx="1">
-            <a:schemeClr val="lt1"/>
-          </a:fillRef>
-          <a:effectRef idx="0">
-            <a:schemeClr val="dk1"/>
-          </a:effectRef>
-          <a:fontRef idx="minor">
-            <a:schemeClr val="dk1"/>
-          </a:fontRef>
-        </p:style>
-        <p:txBody>
-          <a:bodyPr rtlCol="0" anchor="ctr"/>
-          <a:lstStyle/>
-          <a:p>
-            <a:pPr algn="ctr"/>
-            <a:endParaRPr lang="zh-CN" altLang="en-US" dirty="0"/>
-          </a:p>
-        </p:txBody>
-      </p:sp>
-      <p:sp>
-        <p:nvSpPr>
-          <p:cNvPr id="54" name="矩形 53"/>
-          <p:cNvSpPr/>
-          <p:nvPr/>
-        </p:nvSpPr>
-        <p:spPr>
-          <a:xfrm>
-            <a:off x="5558827" y="5081495"/>
-            <a:ext cx="620487" cy="381970"/>
-          </a:xfrm>
-          <a:prstGeom prst="rect">
-            <a:avLst/>
-          </a:prstGeom>
-        </p:spPr>
-        <p:style>
-          <a:lnRef idx="2">
-            <a:schemeClr val="dk1"/>
-          </a:lnRef>
-          <a:fillRef idx="1">
-            <a:schemeClr val="lt1"/>
-          </a:fillRef>
-          <a:effectRef idx="0">
-            <a:schemeClr val="dk1"/>
-          </a:effectRef>
-          <a:fontRef idx="minor">
-            <a:schemeClr val="dk1"/>
-          </a:fontRef>
-        </p:style>
-        <p:txBody>
-          <a:bodyPr rtlCol="0" anchor="ctr"/>
-          <a:lstStyle/>
-          <a:p>
-            <a:pPr algn="ctr"/>
-            <a:endParaRPr lang="zh-CN" altLang="en-US" dirty="0"/>
-          </a:p>
-        </p:txBody>
-      </p:sp>
-      <p:sp>
-        <p:nvSpPr>
-          <p:cNvPr id="41" name="矩形 40"/>
-          <p:cNvSpPr/>
-          <p:nvPr/>
-        </p:nvSpPr>
-        <p:spPr>
-          <a:xfrm>
-            <a:off x="7426220" y="4756284"/>
-            <a:ext cx="620487" cy="682688"/>
-          </a:xfrm>
-          <a:prstGeom prst="rect">
-            <a:avLst/>
-          </a:prstGeom>
-        </p:spPr>
-        <p:style>
-          <a:lnRef idx="2">
-            <a:schemeClr val="dk1"/>
-          </a:lnRef>
-          <a:fillRef idx="1">
-            <a:schemeClr val="lt1"/>
-          </a:fillRef>
-          <a:effectRef idx="0">
-            <a:schemeClr val="dk1"/>
-          </a:effectRef>
-          <a:fontRef idx="minor">
-            <a:schemeClr val="dk1"/>
-          </a:fontRef>
-        </p:style>
-        <p:txBody>
-          <a:bodyPr rtlCol="0" anchor="ctr"/>
-          <a:lstStyle/>
-          <a:p>
-            <a:pPr algn="ctr"/>
-            <a:r>
-              <a:rPr lang="en-US" altLang="zh-CN" dirty="0" smtClean="0"/>
-              <a:t>RJ45</a:t>
-            </a:r>
-            <a:endParaRPr lang="zh-CN" altLang="en-US" dirty="0"/>
-          </a:p>
-        </p:txBody>
-      </p:sp>
+          <a:noFill/>
+          <a:extLst>
+            <a:ext uri="{909E8E84-426E-40DD-AFC4-6F175D3DCCD1}">
+              <a14:hiddenFill xmlns:a14="http://schemas.microsoft.com/office/drawing/2010/main">
+                <a:solidFill>
+                  <a:srgbClr val="FFFFFF"/>
+                </a:solidFill>
+              </a14:hiddenFill>
+            </a:ext>
+          </a:extLst>
+        </p:spPr>
+      </p:pic>
       <p:sp>
         <p:nvSpPr>
           <p:cNvPr id="2" name="矩形 1"/>
-          <p:cNvSpPr/>
-          <p:nvPr/>
-        </p:nvSpPr>
-        <p:spPr>
-          <a:xfrm>
-            <a:off x="1240973" y="2503714"/>
-            <a:ext cx="3222172" cy="2830288"/>
-          </a:xfrm>
-          <a:prstGeom prst="rect">
-            <a:avLst/>
-          </a:prstGeom>
-        </p:spPr>
-        <p:style>
-          <a:lnRef idx="2">
-            <a:schemeClr val="dk1"/>
-          </a:lnRef>
-          <a:fillRef idx="1">
-            <a:schemeClr val="lt1"/>
-          </a:fillRef>
-          <a:effectRef idx="0">
-            <a:schemeClr val="dk1"/>
-          </a:effectRef>
-          <a:fontRef idx="minor">
-            <a:schemeClr val="dk1"/>
-          </a:fontRef>
-        </p:style>
-        <p:txBody>
-          <a:bodyPr rtlCol="0" anchor="ctr"/>
-          <a:lstStyle/>
-          <a:p>
-            <a:pPr algn="ctr"/>
-            <a:endParaRPr lang="zh-CN" altLang="en-US"/>
-          </a:p>
-        </p:txBody>
-      </p:sp>
-      <p:sp>
-        <p:nvSpPr>
-          <p:cNvPr id="4" name="矩形 3"/>
-          <p:cNvSpPr/>
-          <p:nvPr/>
-        </p:nvSpPr>
-        <p:spPr>
-          <a:xfrm>
-            <a:off x="2658804" y="5152029"/>
-            <a:ext cx="377644" cy="258869"/>
-          </a:xfrm>
-          <a:prstGeom prst="rect">
-            <a:avLst/>
-          </a:prstGeom>
-        </p:spPr>
-        <p:style>
-          <a:lnRef idx="2">
-            <a:schemeClr val="dk1"/>
-          </a:lnRef>
-          <a:fillRef idx="1">
-            <a:schemeClr val="lt1"/>
-          </a:fillRef>
-          <a:effectRef idx="0">
-            <a:schemeClr val="dk1"/>
-          </a:effectRef>
-          <a:fontRef idx="minor">
-            <a:schemeClr val="dk1"/>
-          </a:fontRef>
-        </p:style>
-        <p:txBody>
-          <a:bodyPr rtlCol="0" anchor="ctr"/>
-          <a:lstStyle/>
-          <a:p>
-            <a:pPr algn="ctr"/>
-            <a:endParaRPr lang="zh-CN" altLang="en-US" dirty="0"/>
-          </a:p>
-        </p:txBody>
-      </p:sp>
-      <p:sp>
-        <p:nvSpPr>
-          <p:cNvPr id="10" name="矩形 9"/>
-          <p:cNvSpPr/>
-          <p:nvPr/>
-        </p:nvSpPr>
-        <p:spPr>
-          <a:xfrm>
-            <a:off x="3479695" y="4756284"/>
-            <a:ext cx="620487" cy="682688"/>
-          </a:xfrm>
-          <a:prstGeom prst="rect">
-            <a:avLst/>
-          </a:prstGeom>
-        </p:spPr>
-        <p:style>
-          <a:lnRef idx="2">
-            <a:schemeClr val="dk1"/>
-          </a:lnRef>
-          <a:fillRef idx="1">
-            <a:schemeClr val="lt1"/>
-          </a:fillRef>
-          <a:effectRef idx="0">
-            <a:schemeClr val="dk1"/>
-          </a:effectRef>
-          <a:fontRef idx="minor">
-            <a:schemeClr val="dk1"/>
-          </a:fontRef>
-        </p:style>
-        <p:txBody>
-          <a:bodyPr rtlCol="0" anchor="ctr"/>
-          <a:lstStyle/>
-          <a:p>
-            <a:pPr algn="ctr"/>
-            <a:r>
-              <a:rPr lang="en-US" altLang="zh-CN" dirty="0" smtClean="0"/>
-              <a:t>RJ45</a:t>
-            </a:r>
-            <a:endParaRPr lang="zh-CN" altLang="en-US" dirty="0"/>
-          </a:p>
-        </p:txBody>
-      </p:sp>
-      <p:sp>
-        <p:nvSpPr>
-          <p:cNvPr id="11" name="椭圆 10"/>
-          <p:cNvSpPr/>
-          <p:nvPr/>
-        </p:nvSpPr>
-        <p:spPr>
-          <a:xfrm>
-            <a:off x="4161026" y="2601252"/>
-            <a:ext cx="206828" cy="206828"/>
-          </a:xfrm>
-          <a:prstGeom prst="ellipse">
-            <a:avLst/>
-          </a:prstGeom>
-        </p:spPr>
-        <p:style>
-          <a:lnRef idx="2">
-            <a:schemeClr val="dk1"/>
-          </a:lnRef>
-          <a:fillRef idx="1">
-            <a:schemeClr val="lt1"/>
-          </a:fillRef>
-          <a:effectRef idx="0">
-            <a:schemeClr val="dk1"/>
-          </a:effectRef>
-          <a:fontRef idx="minor">
-            <a:schemeClr val="dk1"/>
-          </a:fontRef>
-        </p:style>
-        <p:txBody>
-          <a:bodyPr rtlCol="0" anchor="ctr"/>
-          <a:lstStyle/>
-          <a:p>
-            <a:pPr algn="ctr"/>
-            <a:endParaRPr lang="zh-CN" altLang="en-US"/>
-          </a:p>
-        </p:txBody>
-      </p:sp>
-      <p:sp>
-        <p:nvSpPr>
-          <p:cNvPr id="13" name="椭圆 12"/>
-          <p:cNvSpPr/>
-          <p:nvPr/>
-        </p:nvSpPr>
-        <p:spPr>
-          <a:xfrm>
-            <a:off x="1371816" y="2584050"/>
-            <a:ext cx="206828" cy="206828"/>
-          </a:xfrm>
-          <a:prstGeom prst="ellipse">
-            <a:avLst/>
-          </a:prstGeom>
-        </p:spPr>
-        <p:style>
-          <a:lnRef idx="2">
-            <a:schemeClr val="dk1"/>
-          </a:lnRef>
-          <a:fillRef idx="1">
-            <a:schemeClr val="lt1"/>
-          </a:fillRef>
-          <a:effectRef idx="0">
-            <a:schemeClr val="dk1"/>
-          </a:effectRef>
-          <a:fontRef idx="minor">
-            <a:schemeClr val="dk1"/>
-          </a:fontRef>
-        </p:style>
-        <p:txBody>
-          <a:bodyPr rtlCol="0" anchor="ctr"/>
-          <a:lstStyle/>
-          <a:p>
-            <a:pPr algn="ctr"/>
-            <a:endParaRPr lang="zh-CN" altLang="en-US"/>
-          </a:p>
-        </p:txBody>
-      </p:sp>
-      <p:sp>
-        <p:nvSpPr>
-          <p:cNvPr id="14" name="椭圆 13"/>
-          <p:cNvSpPr/>
-          <p:nvPr/>
-        </p:nvSpPr>
-        <p:spPr>
-          <a:xfrm>
-            <a:off x="1309748" y="5075660"/>
-            <a:ext cx="206828" cy="206828"/>
-          </a:xfrm>
-          <a:prstGeom prst="ellipse">
-            <a:avLst/>
-          </a:prstGeom>
-        </p:spPr>
-        <p:style>
-          <a:lnRef idx="2">
-            <a:schemeClr val="dk1"/>
-          </a:lnRef>
-          <a:fillRef idx="1">
-            <a:schemeClr val="lt1"/>
-          </a:fillRef>
-          <a:effectRef idx="0">
-            <a:schemeClr val="dk1"/>
-          </a:effectRef>
-          <a:fontRef idx="minor">
-            <a:schemeClr val="dk1"/>
-          </a:fontRef>
-        </p:style>
-        <p:txBody>
-          <a:bodyPr rtlCol="0" anchor="ctr"/>
-          <a:lstStyle/>
-          <a:p>
-            <a:pPr algn="ctr"/>
-            <a:endParaRPr lang="zh-CN" altLang="en-US"/>
-          </a:p>
-        </p:txBody>
-      </p:sp>
-      <p:sp>
-        <p:nvSpPr>
-          <p:cNvPr id="15" name="椭圆 14"/>
-          <p:cNvSpPr/>
-          <p:nvPr/>
-        </p:nvSpPr>
-        <p:spPr>
-          <a:xfrm>
-            <a:off x="4161026" y="5057002"/>
-            <a:ext cx="206828" cy="206828"/>
-          </a:xfrm>
-          <a:prstGeom prst="ellipse">
-            <a:avLst/>
-          </a:prstGeom>
-        </p:spPr>
-        <p:style>
-          <a:lnRef idx="2">
-            <a:schemeClr val="dk1"/>
-          </a:lnRef>
-          <a:fillRef idx="1">
-            <a:schemeClr val="lt1"/>
-          </a:fillRef>
-          <a:effectRef idx="0">
-            <a:schemeClr val="dk1"/>
-          </a:effectRef>
-          <a:fontRef idx="minor">
-            <a:schemeClr val="dk1"/>
-          </a:fontRef>
-        </p:style>
-        <p:txBody>
-          <a:bodyPr rtlCol="0" anchor="ctr"/>
-          <a:lstStyle/>
-          <a:p>
-            <a:pPr algn="ctr"/>
-            <a:endParaRPr lang="zh-CN" altLang="en-US"/>
-          </a:p>
-        </p:txBody>
-      </p:sp>
-      <p:sp>
-        <p:nvSpPr>
-          <p:cNvPr id="17" name="矩形 16"/>
-          <p:cNvSpPr/>
-          <p:nvPr/>
-        </p:nvSpPr>
-        <p:spPr>
-          <a:xfrm>
-            <a:off x="1371816" y="2875247"/>
-            <a:ext cx="2960485" cy="1674160"/>
-          </a:xfrm>
-          <a:prstGeom prst="rect">
-            <a:avLst/>
-          </a:prstGeom>
-        </p:spPr>
-        <p:style>
-          <a:lnRef idx="2">
-            <a:schemeClr val="dk1"/>
-          </a:lnRef>
-          <a:fillRef idx="1">
-            <a:schemeClr val="lt1"/>
-          </a:fillRef>
-          <a:effectRef idx="0">
-            <a:schemeClr val="dk1"/>
-          </a:effectRef>
-          <a:fontRef idx="minor">
-            <a:schemeClr val="dk1"/>
-          </a:fontRef>
-        </p:style>
-        <p:txBody>
-          <a:bodyPr rtlCol="0" anchor="ctr"/>
-          <a:lstStyle/>
-          <a:p>
-            <a:pPr algn="ctr"/>
-            <a:r>
-              <a:rPr lang="en-US" altLang="zh-CN" dirty="0" smtClean="0"/>
-              <a:t>4G PCI-E Model</a:t>
-            </a:r>
-            <a:endParaRPr lang="zh-CN" altLang="en-US" dirty="0"/>
-          </a:p>
-        </p:txBody>
-      </p:sp>
-      <p:sp>
-        <p:nvSpPr>
-          <p:cNvPr id="12" name="矩形 11"/>
-          <p:cNvSpPr/>
-          <p:nvPr/>
-        </p:nvSpPr>
-        <p:spPr>
-          <a:xfrm rot="16200000">
-            <a:off x="1223657" y="3548285"/>
-            <a:ext cx="688202" cy="653924"/>
-          </a:xfrm>
-          <a:prstGeom prst="rect">
-            <a:avLst/>
-          </a:prstGeom>
-        </p:spPr>
-        <p:style>
-          <a:lnRef idx="2">
-            <a:schemeClr val="dk1"/>
-          </a:lnRef>
-          <a:fillRef idx="1">
-            <a:schemeClr val="lt1"/>
-          </a:fillRef>
-          <a:effectRef idx="0">
-            <a:schemeClr val="dk1"/>
-          </a:effectRef>
-          <a:fontRef idx="minor">
-            <a:schemeClr val="dk1"/>
-          </a:fontRef>
-        </p:style>
-        <p:txBody>
-          <a:bodyPr rtlCol="0" anchor="ctr"/>
-          <a:lstStyle/>
-          <a:p>
-            <a:pPr algn="ctr"/>
-            <a:r>
-              <a:rPr lang="en-US" altLang="zh-CN" dirty="0" smtClean="0"/>
-              <a:t>SIM Card</a:t>
-            </a:r>
-            <a:endParaRPr lang="zh-CN" altLang="en-US" dirty="0"/>
-          </a:p>
-        </p:txBody>
-      </p:sp>
-      <p:sp>
-        <p:nvSpPr>
-          <p:cNvPr id="16" name="矩形 15"/>
-          <p:cNvSpPr/>
-          <p:nvPr/>
-        </p:nvSpPr>
-        <p:spPr>
-          <a:xfrm rot="16200000">
-            <a:off x="1146682" y="4347608"/>
-            <a:ext cx="450268" cy="260915"/>
-          </a:xfrm>
-          <a:prstGeom prst="rect">
-            <a:avLst/>
-          </a:prstGeom>
-        </p:spPr>
-        <p:style>
-          <a:lnRef idx="2">
-            <a:schemeClr val="dk1"/>
-          </a:lnRef>
-          <a:fillRef idx="1">
-            <a:schemeClr val="lt1"/>
-          </a:fillRef>
-          <a:effectRef idx="0">
-            <a:schemeClr val="dk1"/>
-          </a:effectRef>
-          <a:fontRef idx="minor">
-            <a:schemeClr val="dk1"/>
-          </a:fontRef>
-        </p:style>
-        <p:txBody>
-          <a:bodyPr rtlCol="0" anchor="ctr"/>
-          <a:lstStyle/>
-          <a:p>
-            <a:pPr algn="ctr"/>
-            <a:r>
-              <a:rPr lang="en-US" altLang="zh-CN" sz="1100" dirty="0" smtClean="0"/>
-              <a:t>rest</a:t>
-            </a:r>
-            <a:endParaRPr lang="zh-CN" altLang="en-US" sz="1100" dirty="0"/>
-          </a:p>
-        </p:txBody>
-      </p:sp>
-      <p:sp>
-        <p:nvSpPr>
-          <p:cNvPr id="34" name="矩形 33"/>
-          <p:cNvSpPr/>
-          <p:nvPr/>
-        </p:nvSpPr>
-        <p:spPr>
-          <a:xfrm>
-            <a:off x="5187498" y="2503714"/>
-            <a:ext cx="3222172" cy="2830288"/>
-          </a:xfrm>
-          <a:prstGeom prst="rect">
-            <a:avLst/>
-          </a:prstGeom>
-        </p:spPr>
-        <p:style>
-          <a:lnRef idx="2">
-            <a:schemeClr val="dk1"/>
-          </a:lnRef>
-          <a:fillRef idx="1">
-            <a:schemeClr val="lt1"/>
-          </a:fillRef>
-          <a:effectRef idx="0">
-            <a:schemeClr val="dk1"/>
-          </a:effectRef>
-          <a:fontRef idx="minor">
-            <a:schemeClr val="dk1"/>
-          </a:fontRef>
-        </p:style>
-        <p:txBody>
-          <a:bodyPr rtlCol="0" anchor="ctr"/>
-          <a:lstStyle/>
-          <a:p>
-            <a:pPr algn="ctr"/>
-            <a:endParaRPr lang="zh-CN" altLang="en-US"/>
-          </a:p>
-        </p:txBody>
-      </p:sp>
-      <p:sp>
-        <p:nvSpPr>
-          <p:cNvPr id="36" name="矩形 35"/>
-          <p:cNvSpPr/>
-          <p:nvPr/>
-        </p:nvSpPr>
-        <p:spPr>
-          <a:xfrm>
-            <a:off x="6988912" y="4671207"/>
-            <a:ext cx="134750" cy="73479"/>
-          </a:xfrm>
-          <a:prstGeom prst="rect">
-            <a:avLst/>
-          </a:prstGeom>
-        </p:spPr>
-        <p:style>
-          <a:lnRef idx="2">
-            <a:schemeClr val="dk1"/>
-          </a:lnRef>
-          <a:fillRef idx="1">
-            <a:schemeClr val="lt1"/>
-          </a:fillRef>
-          <a:effectRef idx="0">
-            <a:schemeClr val="dk1"/>
-          </a:effectRef>
-          <a:fontRef idx="minor">
-            <a:schemeClr val="dk1"/>
-          </a:fontRef>
-        </p:style>
-        <p:txBody>
-          <a:bodyPr rtlCol="0" anchor="ctr"/>
-          <a:lstStyle/>
-          <a:p>
-            <a:pPr algn="ctr"/>
-            <a:endParaRPr lang="zh-CN" altLang="en-US" dirty="0"/>
-          </a:p>
-        </p:txBody>
-      </p:sp>
-      <p:sp>
-        <p:nvSpPr>
-          <p:cNvPr id="37" name="矩形 36"/>
-          <p:cNvSpPr/>
-          <p:nvPr/>
-        </p:nvSpPr>
-        <p:spPr>
-          <a:xfrm>
-            <a:off x="6359556" y="4736273"/>
-            <a:ext cx="1926104" cy="369332"/>
-          </a:xfrm>
-          <a:prstGeom prst="rect">
-            <a:avLst/>
-          </a:prstGeom>
-        </p:spPr>
-        <p:txBody>
-          <a:bodyPr wrap="none">
-            <a:spAutoFit/>
-          </a:bodyPr>
-          <a:lstStyle/>
-          <a:p>
-            <a:pPr algn="ctr"/>
-            <a:r>
-              <a:rPr lang="en-US" altLang="zh-CN" dirty="0" smtClean="0"/>
-              <a:t>BAT WiFi Sign NET </a:t>
-            </a:r>
-            <a:endParaRPr lang="zh-CN" altLang="en-US" dirty="0"/>
-          </a:p>
-        </p:txBody>
-      </p:sp>
-      <p:sp>
-        <p:nvSpPr>
-          <p:cNvPr id="38" name="矩形 37"/>
-          <p:cNvSpPr/>
-          <p:nvPr/>
-        </p:nvSpPr>
-        <p:spPr>
-          <a:xfrm>
-            <a:off x="5650367" y="4549407"/>
-            <a:ext cx="604812" cy="340226"/>
-          </a:xfrm>
-          <a:prstGeom prst="rect">
-            <a:avLst/>
-          </a:prstGeom>
-        </p:spPr>
-        <p:style>
-          <a:lnRef idx="2">
-            <a:schemeClr val="dk1"/>
-          </a:lnRef>
-          <a:fillRef idx="1">
-            <a:schemeClr val="lt1"/>
-          </a:fillRef>
-          <a:effectRef idx="0">
-            <a:schemeClr val="dk1"/>
-          </a:effectRef>
-          <a:fontRef idx="minor">
-            <a:schemeClr val="dk1"/>
-          </a:fontRef>
-        </p:style>
-        <p:txBody>
-          <a:bodyPr rtlCol="0" anchor="ctr"/>
-          <a:lstStyle/>
-          <a:p>
-            <a:pPr algn="ctr"/>
-            <a:r>
-              <a:rPr lang="en-US" altLang="zh-CN" sz="1200" dirty="0" smtClean="0"/>
-              <a:t>key</a:t>
-            </a:r>
-            <a:endParaRPr lang="zh-CN" altLang="en-US" sz="1200" dirty="0"/>
-          </a:p>
-        </p:txBody>
-      </p:sp>
-      <p:sp>
-        <p:nvSpPr>
-          <p:cNvPr id="39" name="矩形 38"/>
-          <p:cNvSpPr/>
-          <p:nvPr/>
-        </p:nvSpPr>
-        <p:spPr>
-          <a:xfrm>
-            <a:off x="7410120" y="4670177"/>
-            <a:ext cx="134750" cy="73479"/>
-          </a:xfrm>
-          <a:prstGeom prst="rect">
-            <a:avLst/>
-          </a:prstGeom>
-        </p:spPr>
-        <p:style>
-          <a:lnRef idx="2">
-            <a:schemeClr val="dk1"/>
-          </a:lnRef>
-          <a:fillRef idx="1">
-            <a:schemeClr val="lt1"/>
-          </a:fillRef>
-          <a:effectRef idx="0">
-            <a:schemeClr val="dk1"/>
-          </a:effectRef>
-          <a:fontRef idx="minor">
-            <a:schemeClr val="dk1"/>
-          </a:fontRef>
-        </p:style>
-        <p:txBody>
-          <a:bodyPr rtlCol="0" anchor="ctr"/>
-          <a:lstStyle/>
-          <a:p>
-            <a:pPr algn="ctr"/>
-            <a:endParaRPr lang="zh-CN" altLang="en-US" dirty="0"/>
-          </a:p>
-        </p:txBody>
-      </p:sp>
-      <p:sp>
-        <p:nvSpPr>
-          <p:cNvPr id="40" name="矩形 39"/>
-          <p:cNvSpPr/>
-          <p:nvPr/>
-        </p:nvSpPr>
-        <p:spPr>
-          <a:xfrm>
-            <a:off x="7826083" y="4673287"/>
-            <a:ext cx="134750" cy="73479"/>
-          </a:xfrm>
-          <a:prstGeom prst="rect">
-            <a:avLst/>
-          </a:prstGeom>
-        </p:spPr>
-        <p:style>
-          <a:lnRef idx="2">
-            <a:schemeClr val="dk1"/>
-          </a:lnRef>
-          <a:fillRef idx="1">
-            <a:schemeClr val="lt1"/>
-          </a:fillRef>
-          <a:effectRef idx="0">
-            <a:schemeClr val="dk1"/>
-          </a:effectRef>
-          <a:fontRef idx="minor">
-            <a:schemeClr val="dk1"/>
-          </a:fontRef>
-        </p:style>
-        <p:txBody>
-          <a:bodyPr rtlCol="0" anchor="ctr"/>
-          <a:lstStyle/>
-          <a:p>
-            <a:pPr algn="ctr"/>
-            <a:endParaRPr lang="zh-CN" altLang="en-US" dirty="0"/>
-          </a:p>
-        </p:txBody>
-      </p:sp>
-      <p:sp>
-        <p:nvSpPr>
-          <p:cNvPr id="42" name="椭圆 41"/>
-          <p:cNvSpPr/>
-          <p:nvPr/>
-        </p:nvSpPr>
-        <p:spPr>
-          <a:xfrm>
-            <a:off x="8107551" y="2601252"/>
-            <a:ext cx="206828" cy="206828"/>
-          </a:xfrm>
-          <a:prstGeom prst="ellipse">
-            <a:avLst/>
-          </a:prstGeom>
-        </p:spPr>
-        <p:style>
-          <a:lnRef idx="2">
-            <a:schemeClr val="dk1"/>
-          </a:lnRef>
-          <a:fillRef idx="1">
-            <a:schemeClr val="lt1"/>
-          </a:fillRef>
-          <a:effectRef idx="0">
-            <a:schemeClr val="dk1"/>
-          </a:effectRef>
-          <a:fontRef idx="minor">
-            <a:schemeClr val="dk1"/>
-          </a:fontRef>
-        </p:style>
-        <p:txBody>
-          <a:bodyPr rtlCol="0" anchor="ctr"/>
-          <a:lstStyle/>
-          <a:p>
-            <a:pPr algn="ctr"/>
-            <a:endParaRPr lang="zh-CN" altLang="en-US"/>
-          </a:p>
-        </p:txBody>
-      </p:sp>
-      <p:sp>
-        <p:nvSpPr>
-          <p:cNvPr id="43" name="椭圆 42"/>
-          <p:cNvSpPr/>
-          <p:nvPr/>
-        </p:nvSpPr>
-        <p:spPr>
-          <a:xfrm>
-            <a:off x="5318341" y="2584050"/>
-            <a:ext cx="206828" cy="206828"/>
-          </a:xfrm>
-          <a:prstGeom prst="ellipse">
-            <a:avLst/>
-          </a:prstGeom>
-        </p:spPr>
-        <p:style>
-          <a:lnRef idx="2">
-            <a:schemeClr val="dk1"/>
-          </a:lnRef>
-          <a:fillRef idx="1">
-            <a:schemeClr val="lt1"/>
-          </a:fillRef>
-          <a:effectRef idx="0">
-            <a:schemeClr val="dk1"/>
-          </a:effectRef>
-          <a:fontRef idx="minor">
-            <a:schemeClr val="dk1"/>
-          </a:fontRef>
-        </p:style>
-        <p:txBody>
-          <a:bodyPr rtlCol="0" anchor="ctr"/>
-          <a:lstStyle/>
-          <a:p>
-            <a:pPr algn="ctr"/>
-            <a:endParaRPr lang="zh-CN" altLang="en-US"/>
-          </a:p>
-        </p:txBody>
-      </p:sp>
-      <p:sp>
-        <p:nvSpPr>
-          <p:cNvPr id="44" name="椭圆 43"/>
-          <p:cNvSpPr/>
-          <p:nvPr/>
-        </p:nvSpPr>
-        <p:spPr>
-          <a:xfrm>
-            <a:off x="5256273" y="5075660"/>
-            <a:ext cx="206828" cy="206828"/>
-          </a:xfrm>
-          <a:prstGeom prst="ellipse">
-            <a:avLst/>
-          </a:prstGeom>
-        </p:spPr>
-        <p:style>
-          <a:lnRef idx="2">
-            <a:schemeClr val="dk1"/>
-          </a:lnRef>
-          <a:fillRef idx="1">
-            <a:schemeClr val="lt1"/>
-          </a:fillRef>
-          <a:effectRef idx="0">
-            <a:schemeClr val="dk1"/>
-          </a:effectRef>
-          <a:fontRef idx="minor">
-            <a:schemeClr val="dk1"/>
-          </a:fontRef>
-        </p:style>
-        <p:txBody>
-          <a:bodyPr rtlCol="0" anchor="ctr"/>
-          <a:lstStyle/>
-          <a:p>
-            <a:pPr algn="ctr"/>
-            <a:endParaRPr lang="zh-CN" altLang="en-US"/>
-          </a:p>
-        </p:txBody>
-      </p:sp>
-      <p:sp>
-        <p:nvSpPr>
-          <p:cNvPr id="45" name="椭圆 44"/>
-          <p:cNvSpPr/>
-          <p:nvPr/>
-        </p:nvSpPr>
-        <p:spPr>
-          <a:xfrm>
-            <a:off x="8107551" y="5057002"/>
-            <a:ext cx="206828" cy="206828"/>
-          </a:xfrm>
-          <a:prstGeom prst="ellipse">
-            <a:avLst/>
-          </a:prstGeom>
-        </p:spPr>
-        <p:style>
-          <a:lnRef idx="2">
-            <a:schemeClr val="dk1"/>
-          </a:lnRef>
-          <a:fillRef idx="1">
-            <a:schemeClr val="lt1"/>
-          </a:fillRef>
-          <a:effectRef idx="0">
-            <a:schemeClr val="dk1"/>
-          </a:effectRef>
-          <a:fontRef idx="minor">
-            <a:schemeClr val="dk1"/>
-          </a:fontRef>
-        </p:style>
-        <p:txBody>
-          <a:bodyPr rtlCol="0" anchor="ctr"/>
-          <a:lstStyle/>
-          <a:p>
-            <a:pPr algn="ctr"/>
-            <a:endParaRPr lang="zh-CN" altLang="en-US"/>
-          </a:p>
-        </p:txBody>
-      </p:sp>
-      <p:sp>
-        <p:nvSpPr>
-          <p:cNvPr id="19" name="矩形 18"/>
-          <p:cNvSpPr/>
-          <p:nvPr/>
-        </p:nvSpPr>
-        <p:spPr>
-          <a:xfrm>
-            <a:off x="5595193" y="3077123"/>
-            <a:ext cx="2446979" cy="1245345"/>
-          </a:xfrm>
-          <a:prstGeom prst="rect">
-            <a:avLst/>
-          </a:prstGeom>
-        </p:spPr>
-        <p:style>
-          <a:lnRef idx="2">
-            <a:schemeClr val="dk1"/>
-          </a:lnRef>
-          <a:fillRef idx="1">
-            <a:schemeClr val="lt1"/>
-          </a:fillRef>
-          <a:effectRef idx="0">
-            <a:schemeClr val="dk1"/>
-          </a:effectRef>
-          <a:fontRef idx="minor">
-            <a:schemeClr val="dk1"/>
-          </a:fontRef>
-        </p:style>
-        <p:txBody>
-          <a:bodyPr rtlCol="0" anchor="ctr"/>
-          <a:lstStyle/>
-          <a:p>
-            <a:pPr algn="ctr"/>
-            <a:r>
-              <a:rPr lang="en-US" altLang="zh-CN" dirty="0" smtClean="0"/>
-              <a:t>MT7688/7628 Model</a:t>
-            </a:r>
-          </a:p>
-          <a:p>
-            <a:pPr algn="ctr"/>
-            <a:r>
-              <a:rPr lang="zh-CN" altLang="zh-CN" dirty="0"/>
-              <a:t>1Gb/64Mb</a:t>
-            </a:r>
-            <a:endParaRPr lang="zh-CN" altLang="en-US" dirty="0"/>
-          </a:p>
-        </p:txBody>
-      </p:sp>
-      <p:sp>
-        <p:nvSpPr>
-          <p:cNvPr id="50" name="矩形 49"/>
-          <p:cNvSpPr/>
-          <p:nvPr/>
-        </p:nvSpPr>
-        <p:spPr>
-          <a:xfrm rot="16200000">
-            <a:off x="1259438" y="2834448"/>
-            <a:ext cx="616992" cy="653924"/>
-          </a:xfrm>
-          <a:prstGeom prst="rect">
-            <a:avLst/>
-          </a:prstGeom>
-        </p:spPr>
-        <p:style>
-          <a:lnRef idx="2">
-            <a:schemeClr val="dk1"/>
-          </a:lnRef>
-          <a:fillRef idx="1">
-            <a:schemeClr val="lt1"/>
-          </a:fillRef>
-          <a:effectRef idx="0">
-            <a:schemeClr val="dk1"/>
-          </a:effectRef>
-          <a:fontRef idx="minor">
-            <a:schemeClr val="dk1"/>
-          </a:fontRef>
-        </p:style>
-        <p:txBody>
-          <a:bodyPr rtlCol="0" anchor="ctr"/>
-          <a:lstStyle/>
-          <a:p>
-            <a:pPr algn="ctr"/>
-            <a:r>
-              <a:rPr lang="en-US" altLang="zh-CN" dirty="0" smtClean="0"/>
-              <a:t>SD</a:t>
-            </a:r>
-          </a:p>
-          <a:p>
-            <a:pPr algn="ctr"/>
-            <a:r>
-              <a:rPr lang="en-US" altLang="zh-CN" dirty="0" smtClean="0"/>
-              <a:t>Card</a:t>
-            </a:r>
-            <a:endParaRPr lang="zh-CN" altLang="en-US" dirty="0"/>
-          </a:p>
-        </p:txBody>
-      </p:sp>
-      <p:sp>
-        <p:nvSpPr>
-          <p:cNvPr id="51" name="矩形 50"/>
-          <p:cNvSpPr/>
-          <p:nvPr/>
-        </p:nvSpPr>
-        <p:spPr>
-          <a:xfrm>
-            <a:off x="6569266" y="4663892"/>
-            <a:ext cx="134750" cy="73479"/>
-          </a:xfrm>
-          <a:prstGeom prst="rect">
-            <a:avLst/>
-          </a:prstGeom>
-        </p:spPr>
-        <p:style>
-          <a:lnRef idx="2">
-            <a:schemeClr val="dk1"/>
-          </a:lnRef>
-          <a:fillRef idx="1">
-            <a:schemeClr val="lt1"/>
-          </a:fillRef>
-          <a:effectRef idx="0">
-            <a:schemeClr val="dk1"/>
-          </a:effectRef>
-          <a:fontRef idx="minor">
-            <a:schemeClr val="dk1"/>
-          </a:fontRef>
-        </p:style>
-        <p:txBody>
-          <a:bodyPr rtlCol="0" anchor="ctr"/>
-          <a:lstStyle/>
-          <a:p>
-            <a:pPr algn="ctr"/>
-            <a:endParaRPr lang="zh-CN" altLang="en-US" dirty="0"/>
-          </a:p>
-        </p:txBody>
-      </p:sp>
-      <p:sp>
-        <p:nvSpPr>
-          <p:cNvPr id="52" name="矩形 51"/>
-          <p:cNvSpPr/>
-          <p:nvPr/>
-        </p:nvSpPr>
-        <p:spPr>
-          <a:xfrm>
-            <a:off x="1620503" y="5057002"/>
-            <a:ext cx="620487" cy="381970"/>
-          </a:xfrm>
-          <a:prstGeom prst="rect">
-            <a:avLst/>
-          </a:prstGeom>
-        </p:spPr>
-        <p:style>
-          <a:lnRef idx="2">
-            <a:schemeClr val="dk1"/>
-          </a:lnRef>
-          <a:fillRef idx="1">
-            <a:schemeClr val="lt1"/>
-          </a:fillRef>
-          <a:effectRef idx="0">
-            <a:schemeClr val="dk1"/>
-          </a:effectRef>
-          <a:fontRef idx="minor">
-            <a:schemeClr val="dk1"/>
-          </a:fontRef>
-        </p:style>
-        <p:txBody>
-          <a:bodyPr rtlCol="0" anchor="ctr"/>
-          <a:lstStyle/>
-          <a:p>
-            <a:pPr algn="ctr"/>
-            <a:r>
-              <a:rPr lang="en-US" altLang="zh-CN" dirty="0" smtClean="0"/>
-              <a:t>USB</a:t>
-            </a:r>
-            <a:endParaRPr lang="zh-CN" altLang="en-US" dirty="0"/>
-          </a:p>
-        </p:txBody>
-      </p:sp>
-      <p:sp>
-        <p:nvSpPr>
-          <p:cNvPr id="55" name="矩形 54"/>
           <p:cNvSpPr/>
           <p:nvPr/>
         </p:nvSpPr>
@@ -7195,7 +6168,212 @@
             <a:pPr algn="ctr"/>
             <a:r>
               <a:rPr lang="en-US" altLang="zh-CN" dirty="0" smtClean="0"/>
-              <a:t>Version 4 – S2</a:t>
+              <a:t>Version 4 – </a:t>
+            </a:r>
+            <a:r>
+              <a:rPr lang="en-US" altLang="zh-CN" dirty="0" smtClean="0"/>
+              <a:t>S2</a:t>
+            </a:r>
+            <a:endParaRPr lang="zh-CN" altLang="en-US" dirty="0"/>
+          </a:p>
+        </p:txBody>
+      </p:sp>
+      <p:sp>
+        <p:nvSpPr>
+          <p:cNvPr id="3" name="矩形 2"/>
+          <p:cNvSpPr/>
+          <p:nvPr/>
+        </p:nvSpPr>
+        <p:spPr>
+          <a:xfrm>
+            <a:off x="6911970" y="2253791"/>
+            <a:ext cx="1248235" cy="2287809"/>
+          </a:xfrm>
+          <a:prstGeom prst="rect">
+            <a:avLst/>
+          </a:prstGeom>
+        </p:spPr>
+        <p:style>
+          <a:lnRef idx="2">
+            <a:schemeClr val="dk1"/>
+          </a:lnRef>
+          <a:fillRef idx="1">
+            <a:schemeClr val="lt1"/>
+          </a:fillRef>
+          <a:effectRef idx="0">
+            <a:schemeClr val="dk1"/>
+          </a:effectRef>
+          <a:fontRef idx="minor">
+            <a:schemeClr val="dk1"/>
+          </a:fontRef>
+        </p:style>
+        <p:txBody>
+          <a:bodyPr rtlCol="0" anchor="ctr"/>
+          <a:lstStyle/>
+          <a:p>
+            <a:pPr algn="ctr"/>
+            <a:r>
+              <a:rPr lang="en-US" altLang="zh-CN" dirty="0" smtClean="0"/>
+              <a:t>bit3</a:t>
+            </a:r>
+          </a:p>
+          <a:p>
+            <a:pPr algn="ctr"/>
+            <a:r>
+              <a:rPr lang="en-US" altLang="zh-CN" dirty="0" smtClean="0"/>
+              <a:t>33*17.78</a:t>
+            </a:r>
+            <a:endParaRPr lang="zh-CN" altLang="en-US" dirty="0"/>
+          </a:p>
+        </p:txBody>
+      </p:sp>
+      <p:sp>
+        <p:nvSpPr>
+          <p:cNvPr id="5" name="矩形 4"/>
+          <p:cNvSpPr/>
+          <p:nvPr/>
+        </p:nvSpPr>
+        <p:spPr>
+          <a:xfrm>
+            <a:off x="4407796" y="1443709"/>
+            <a:ext cx="2277386" cy="3907971"/>
+          </a:xfrm>
+          <a:prstGeom prst="rect">
+            <a:avLst/>
+          </a:prstGeom>
+        </p:spPr>
+        <p:style>
+          <a:lnRef idx="2">
+            <a:schemeClr val="dk1"/>
+          </a:lnRef>
+          <a:fillRef idx="1">
+            <a:schemeClr val="lt1"/>
+          </a:fillRef>
+          <a:effectRef idx="0">
+            <a:schemeClr val="dk1"/>
+          </a:effectRef>
+          <a:fontRef idx="minor">
+            <a:schemeClr val="dk1"/>
+          </a:fontRef>
+        </p:style>
+        <p:txBody>
+          <a:bodyPr rtlCol="0" anchor="ctr"/>
+          <a:lstStyle/>
+          <a:p>
+            <a:pPr algn="ctr"/>
+            <a:r>
+              <a:rPr lang="en-US" altLang="zh-CN" dirty="0" smtClean="0"/>
+              <a:t>56*33.3</a:t>
+            </a:r>
+          </a:p>
+          <a:p>
+            <a:pPr algn="ctr"/>
+            <a:r>
+              <a:rPr lang="en-US" altLang="zh-CN" smtClean="0"/>
+              <a:t>4G Model</a:t>
+            </a:r>
+            <a:endParaRPr lang="zh-CN" altLang="en-US" dirty="0"/>
+          </a:p>
+        </p:txBody>
+      </p:sp>
+      <p:sp>
+        <p:nvSpPr>
+          <p:cNvPr id="6" name="矩形 5"/>
+          <p:cNvSpPr/>
+          <p:nvPr/>
+        </p:nvSpPr>
+        <p:spPr>
+          <a:xfrm>
+            <a:off x="7937940" y="1664937"/>
+            <a:ext cx="4223439" cy="3465516"/>
+          </a:xfrm>
+          <a:prstGeom prst="rect">
+            <a:avLst/>
+          </a:prstGeom>
+          <a:solidFill>
+            <a:schemeClr val="lt1">
+              <a:alpha val="64000"/>
+            </a:schemeClr>
+          </a:solidFill>
+        </p:spPr>
+        <p:style>
+          <a:lnRef idx="2">
+            <a:schemeClr val="dk1"/>
+          </a:lnRef>
+          <a:fillRef idx="1">
+            <a:schemeClr val="lt1"/>
+          </a:fillRef>
+          <a:effectRef idx="0">
+            <a:schemeClr val="dk1"/>
+          </a:effectRef>
+          <a:fontRef idx="minor">
+            <a:schemeClr val="dk1"/>
+          </a:fontRef>
+        </p:style>
+        <p:txBody>
+          <a:bodyPr rtlCol="0" anchor="ctr"/>
+          <a:lstStyle/>
+          <a:p>
+            <a:pPr algn="ctr"/>
+            <a:r>
+              <a:rPr lang="en-US" altLang="zh-CN" dirty="0" smtClean="0"/>
+              <a:t>Battery</a:t>
+            </a:r>
+          </a:p>
+          <a:p>
+            <a:pPr algn="ctr"/>
+            <a:r>
+              <a:rPr lang="en-US" altLang="zh-CN" dirty="0" smtClean="0"/>
+              <a:t>49.4*60.5</a:t>
+            </a:r>
+            <a:endParaRPr lang="zh-CN" altLang="en-US" dirty="0"/>
+          </a:p>
+        </p:txBody>
+      </p:sp>
+      <p:sp>
+        <p:nvSpPr>
+          <p:cNvPr id="7" name="矩形 6"/>
+          <p:cNvSpPr/>
+          <p:nvPr/>
+        </p:nvSpPr>
+        <p:spPr>
+          <a:xfrm>
+            <a:off x="9094999" y="2120878"/>
+            <a:ext cx="1548050" cy="2464713"/>
+          </a:xfrm>
+          <a:prstGeom prst="rect">
+            <a:avLst/>
+          </a:prstGeom>
+        </p:spPr>
+        <p:style>
+          <a:lnRef idx="2">
+            <a:schemeClr val="dk1"/>
+          </a:lnRef>
+          <a:fillRef idx="1">
+            <a:schemeClr val="lt1"/>
+          </a:fillRef>
+          <a:effectRef idx="0">
+            <a:schemeClr val="dk1"/>
+          </a:effectRef>
+          <a:fontRef idx="minor">
+            <a:schemeClr val="dk1"/>
+          </a:fontRef>
+        </p:style>
+        <p:txBody>
+          <a:bodyPr rtlCol="0" anchor="ctr"/>
+          <a:lstStyle/>
+          <a:p>
+            <a:pPr algn="ctr"/>
+            <a:r>
+              <a:rPr lang="en-US" altLang="zh-CN" dirty="0" smtClean="0"/>
+              <a:t>bit5</a:t>
+            </a:r>
+          </a:p>
+          <a:p>
+            <a:pPr algn="ctr"/>
+            <a:r>
+              <a:rPr lang="en-US" altLang="zh-CN" dirty="0" smtClean="0"/>
+              <a:t>35*22</a:t>
             </a:r>
             <a:endParaRPr lang="zh-CN" altLang="en-US" dirty="0"/>
           </a:p>
@@ -7204,7 +6382,7 @@
     </p:spTree>
     <p:extLst>
       <p:ext uri="{BB962C8B-B14F-4D97-AF65-F5344CB8AC3E}">
-        <p14:creationId xmlns:p14="http://schemas.microsoft.com/office/powerpoint/2010/main" val="3155156461"/>
+        <p14:creationId xmlns:p14="http://schemas.microsoft.com/office/powerpoint/2010/main" val="2662778434"/>
       </p:ext>
     </p:extLst>
   </p:cSld>
@@ -7231,50 +6409,1077 @@
           <a:chExt cx="0" cy="0"/>
         </a:xfrm>
       </p:grpSpPr>
-      <p:pic>
-        <p:nvPicPr>
-          <p:cNvPr id="1026" name="Picture 2" descr="http://shumeipai.nxez.com/wp-content/uploads/2015/09/20150904210710471-0.jpg"/>
-          <p:cNvPicPr>
-            <a:picLocks noChangeAspect="1" noChangeArrowheads="1"/>
-          </p:cNvPicPr>
-          <p:nvPr/>
-        </p:nvPicPr>
-        <p:blipFill>
-          <a:blip r:embed="rId2">
-            <a:extLst>
-              <a:ext uri="{28A0092B-C50C-407E-A947-70E740481C1C}">
-                <a14:useLocalDpi xmlns:a14="http://schemas.microsoft.com/office/drawing/2010/main" val="0"/>
-              </a:ext>
-            </a:extLst>
-          </a:blip>
-          <a:srcRect/>
-          <a:stretch>
-            <a:fillRect/>
-          </a:stretch>
-        </p:blipFill>
-        <p:spPr bwMode="auto">
-          <a:xfrm>
-            <a:off x="1908173" y="0"/>
-            <a:ext cx="9848398" cy="6795395"/>
+      <p:sp>
+        <p:nvSpPr>
+          <p:cNvPr id="53" name="矩形 52"/>
+          <p:cNvSpPr/>
+          <p:nvPr/>
+        </p:nvSpPr>
+        <p:spPr>
+          <a:xfrm>
+            <a:off x="6605329" y="5182337"/>
+            <a:ext cx="377644" cy="258869"/>
           </a:xfrm>
           <a:prstGeom prst="rect">
             <a:avLst/>
           </a:prstGeom>
-          <a:noFill/>
-          <a:extLst>
-            <a:ext uri="{909E8E84-426E-40DD-AFC4-6F175D3DCCD1}">
-              <a14:hiddenFill xmlns:a14="http://schemas.microsoft.com/office/drawing/2010/main">
-                <a:solidFill>
-                  <a:srgbClr val="FFFFFF"/>
-                </a:solidFill>
-              </a14:hiddenFill>
-            </a:ext>
-          </a:extLst>
-        </p:spPr>
-      </p:pic>
+        </p:spPr>
+        <p:style>
+          <a:lnRef idx="2">
+            <a:schemeClr val="dk1"/>
+          </a:lnRef>
+          <a:fillRef idx="1">
+            <a:schemeClr val="lt1"/>
+          </a:fillRef>
+          <a:effectRef idx="0">
+            <a:schemeClr val="dk1"/>
+          </a:effectRef>
+          <a:fontRef idx="minor">
+            <a:schemeClr val="dk1"/>
+          </a:fontRef>
+        </p:style>
+        <p:txBody>
+          <a:bodyPr rtlCol="0" anchor="ctr"/>
+          <a:lstStyle/>
+          <a:p>
+            <a:pPr algn="ctr"/>
+            <a:endParaRPr lang="zh-CN" altLang="en-US" dirty="0"/>
+          </a:p>
+        </p:txBody>
+      </p:sp>
+      <p:sp>
+        <p:nvSpPr>
+          <p:cNvPr id="54" name="矩形 53"/>
+          <p:cNvSpPr/>
+          <p:nvPr/>
+        </p:nvSpPr>
+        <p:spPr>
+          <a:xfrm>
+            <a:off x="5558827" y="5081495"/>
+            <a:ext cx="620487" cy="381970"/>
+          </a:xfrm>
+          <a:prstGeom prst="rect">
+            <a:avLst/>
+          </a:prstGeom>
+        </p:spPr>
+        <p:style>
+          <a:lnRef idx="2">
+            <a:schemeClr val="dk1"/>
+          </a:lnRef>
+          <a:fillRef idx="1">
+            <a:schemeClr val="lt1"/>
+          </a:fillRef>
+          <a:effectRef idx="0">
+            <a:schemeClr val="dk1"/>
+          </a:effectRef>
+          <a:fontRef idx="minor">
+            <a:schemeClr val="dk1"/>
+          </a:fontRef>
+        </p:style>
+        <p:txBody>
+          <a:bodyPr rtlCol="0" anchor="ctr"/>
+          <a:lstStyle/>
+          <a:p>
+            <a:pPr algn="ctr"/>
+            <a:endParaRPr lang="zh-CN" altLang="en-US" dirty="0"/>
+          </a:p>
+        </p:txBody>
+      </p:sp>
+      <p:sp>
+        <p:nvSpPr>
+          <p:cNvPr id="41" name="矩形 40"/>
+          <p:cNvSpPr/>
+          <p:nvPr/>
+        </p:nvSpPr>
+        <p:spPr>
+          <a:xfrm>
+            <a:off x="7426220" y="4756284"/>
+            <a:ext cx="620487" cy="682688"/>
+          </a:xfrm>
+          <a:prstGeom prst="rect">
+            <a:avLst/>
+          </a:prstGeom>
+        </p:spPr>
+        <p:style>
+          <a:lnRef idx="2">
+            <a:schemeClr val="dk1"/>
+          </a:lnRef>
+          <a:fillRef idx="1">
+            <a:schemeClr val="lt1"/>
+          </a:fillRef>
+          <a:effectRef idx="0">
+            <a:schemeClr val="dk1"/>
+          </a:effectRef>
+          <a:fontRef idx="minor">
+            <a:schemeClr val="dk1"/>
+          </a:fontRef>
+        </p:style>
+        <p:txBody>
+          <a:bodyPr rtlCol="0" anchor="ctr"/>
+          <a:lstStyle/>
+          <a:p>
+            <a:pPr algn="ctr"/>
+            <a:r>
+              <a:rPr lang="en-US" altLang="zh-CN" dirty="0" smtClean="0"/>
+              <a:t>RJ45</a:t>
+            </a:r>
+            <a:endParaRPr lang="zh-CN" altLang="en-US" dirty="0"/>
+          </a:p>
+        </p:txBody>
+      </p:sp>
       <p:sp>
         <p:nvSpPr>
           <p:cNvPr id="2" name="矩形 1"/>
+          <p:cNvSpPr/>
+          <p:nvPr/>
+        </p:nvSpPr>
+        <p:spPr>
+          <a:xfrm>
+            <a:off x="1240973" y="2503714"/>
+            <a:ext cx="3222172" cy="2830288"/>
+          </a:xfrm>
+          <a:prstGeom prst="rect">
+            <a:avLst/>
+          </a:prstGeom>
+        </p:spPr>
+        <p:style>
+          <a:lnRef idx="2">
+            <a:schemeClr val="dk1"/>
+          </a:lnRef>
+          <a:fillRef idx="1">
+            <a:schemeClr val="lt1"/>
+          </a:fillRef>
+          <a:effectRef idx="0">
+            <a:schemeClr val="dk1"/>
+          </a:effectRef>
+          <a:fontRef idx="minor">
+            <a:schemeClr val="dk1"/>
+          </a:fontRef>
+        </p:style>
+        <p:txBody>
+          <a:bodyPr rtlCol="0" anchor="ctr"/>
+          <a:lstStyle/>
+          <a:p>
+            <a:pPr algn="ctr"/>
+            <a:endParaRPr lang="zh-CN" altLang="en-US"/>
+          </a:p>
+        </p:txBody>
+      </p:sp>
+      <p:sp>
+        <p:nvSpPr>
+          <p:cNvPr id="4" name="矩形 3"/>
+          <p:cNvSpPr/>
+          <p:nvPr/>
+        </p:nvSpPr>
+        <p:spPr>
+          <a:xfrm>
+            <a:off x="2658804" y="5152029"/>
+            <a:ext cx="377644" cy="258869"/>
+          </a:xfrm>
+          <a:prstGeom prst="rect">
+            <a:avLst/>
+          </a:prstGeom>
+        </p:spPr>
+        <p:style>
+          <a:lnRef idx="2">
+            <a:schemeClr val="dk1"/>
+          </a:lnRef>
+          <a:fillRef idx="1">
+            <a:schemeClr val="lt1"/>
+          </a:fillRef>
+          <a:effectRef idx="0">
+            <a:schemeClr val="dk1"/>
+          </a:effectRef>
+          <a:fontRef idx="minor">
+            <a:schemeClr val="dk1"/>
+          </a:fontRef>
+        </p:style>
+        <p:txBody>
+          <a:bodyPr rtlCol="0" anchor="ctr"/>
+          <a:lstStyle/>
+          <a:p>
+            <a:pPr algn="ctr"/>
+            <a:endParaRPr lang="zh-CN" altLang="en-US" dirty="0"/>
+          </a:p>
+        </p:txBody>
+      </p:sp>
+      <p:sp>
+        <p:nvSpPr>
+          <p:cNvPr id="10" name="矩形 9"/>
+          <p:cNvSpPr/>
+          <p:nvPr/>
+        </p:nvSpPr>
+        <p:spPr>
+          <a:xfrm>
+            <a:off x="3479695" y="4756284"/>
+            <a:ext cx="620487" cy="682688"/>
+          </a:xfrm>
+          <a:prstGeom prst="rect">
+            <a:avLst/>
+          </a:prstGeom>
+        </p:spPr>
+        <p:style>
+          <a:lnRef idx="2">
+            <a:schemeClr val="dk1"/>
+          </a:lnRef>
+          <a:fillRef idx="1">
+            <a:schemeClr val="lt1"/>
+          </a:fillRef>
+          <a:effectRef idx="0">
+            <a:schemeClr val="dk1"/>
+          </a:effectRef>
+          <a:fontRef idx="minor">
+            <a:schemeClr val="dk1"/>
+          </a:fontRef>
+        </p:style>
+        <p:txBody>
+          <a:bodyPr rtlCol="0" anchor="ctr"/>
+          <a:lstStyle/>
+          <a:p>
+            <a:pPr algn="ctr"/>
+            <a:r>
+              <a:rPr lang="en-US" altLang="zh-CN" dirty="0" smtClean="0"/>
+              <a:t>RJ45</a:t>
+            </a:r>
+            <a:endParaRPr lang="zh-CN" altLang="en-US" dirty="0"/>
+          </a:p>
+        </p:txBody>
+      </p:sp>
+      <p:sp>
+        <p:nvSpPr>
+          <p:cNvPr id="11" name="椭圆 10"/>
+          <p:cNvSpPr/>
+          <p:nvPr/>
+        </p:nvSpPr>
+        <p:spPr>
+          <a:xfrm>
+            <a:off x="4161026" y="2601252"/>
+            <a:ext cx="206828" cy="206828"/>
+          </a:xfrm>
+          <a:prstGeom prst="ellipse">
+            <a:avLst/>
+          </a:prstGeom>
+        </p:spPr>
+        <p:style>
+          <a:lnRef idx="2">
+            <a:schemeClr val="dk1"/>
+          </a:lnRef>
+          <a:fillRef idx="1">
+            <a:schemeClr val="lt1"/>
+          </a:fillRef>
+          <a:effectRef idx="0">
+            <a:schemeClr val="dk1"/>
+          </a:effectRef>
+          <a:fontRef idx="minor">
+            <a:schemeClr val="dk1"/>
+          </a:fontRef>
+        </p:style>
+        <p:txBody>
+          <a:bodyPr rtlCol="0" anchor="ctr"/>
+          <a:lstStyle/>
+          <a:p>
+            <a:pPr algn="ctr"/>
+            <a:endParaRPr lang="zh-CN" altLang="en-US"/>
+          </a:p>
+        </p:txBody>
+      </p:sp>
+      <p:sp>
+        <p:nvSpPr>
+          <p:cNvPr id="13" name="椭圆 12"/>
+          <p:cNvSpPr/>
+          <p:nvPr/>
+        </p:nvSpPr>
+        <p:spPr>
+          <a:xfrm>
+            <a:off x="1371816" y="2584050"/>
+            <a:ext cx="206828" cy="206828"/>
+          </a:xfrm>
+          <a:prstGeom prst="ellipse">
+            <a:avLst/>
+          </a:prstGeom>
+        </p:spPr>
+        <p:style>
+          <a:lnRef idx="2">
+            <a:schemeClr val="dk1"/>
+          </a:lnRef>
+          <a:fillRef idx="1">
+            <a:schemeClr val="lt1"/>
+          </a:fillRef>
+          <a:effectRef idx="0">
+            <a:schemeClr val="dk1"/>
+          </a:effectRef>
+          <a:fontRef idx="minor">
+            <a:schemeClr val="dk1"/>
+          </a:fontRef>
+        </p:style>
+        <p:txBody>
+          <a:bodyPr rtlCol="0" anchor="ctr"/>
+          <a:lstStyle/>
+          <a:p>
+            <a:pPr algn="ctr"/>
+            <a:endParaRPr lang="zh-CN" altLang="en-US"/>
+          </a:p>
+        </p:txBody>
+      </p:sp>
+      <p:sp>
+        <p:nvSpPr>
+          <p:cNvPr id="14" name="椭圆 13"/>
+          <p:cNvSpPr/>
+          <p:nvPr/>
+        </p:nvSpPr>
+        <p:spPr>
+          <a:xfrm>
+            <a:off x="1309748" y="5075660"/>
+            <a:ext cx="206828" cy="206828"/>
+          </a:xfrm>
+          <a:prstGeom prst="ellipse">
+            <a:avLst/>
+          </a:prstGeom>
+        </p:spPr>
+        <p:style>
+          <a:lnRef idx="2">
+            <a:schemeClr val="dk1"/>
+          </a:lnRef>
+          <a:fillRef idx="1">
+            <a:schemeClr val="lt1"/>
+          </a:fillRef>
+          <a:effectRef idx="0">
+            <a:schemeClr val="dk1"/>
+          </a:effectRef>
+          <a:fontRef idx="minor">
+            <a:schemeClr val="dk1"/>
+          </a:fontRef>
+        </p:style>
+        <p:txBody>
+          <a:bodyPr rtlCol="0" anchor="ctr"/>
+          <a:lstStyle/>
+          <a:p>
+            <a:pPr algn="ctr"/>
+            <a:endParaRPr lang="zh-CN" altLang="en-US"/>
+          </a:p>
+        </p:txBody>
+      </p:sp>
+      <p:sp>
+        <p:nvSpPr>
+          <p:cNvPr id="15" name="椭圆 14"/>
+          <p:cNvSpPr/>
+          <p:nvPr/>
+        </p:nvSpPr>
+        <p:spPr>
+          <a:xfrm>
+            <a:off x="4161026" y="5057002"/>
+            <a:ext cx="206828" cy="206828"/>
+          </a:xfrm>
+          <a:prstGeom prst="ellipse">
+            <a:avLst/>
+          </a:prstGeom>
+        </p:spPr>
+        <p:style>
+          <a:lnRef idx="2">
+            <a:schemeClr val="dk1"/>
+          </a:lnRef>
+          <a:fillRef idx="1">
+            <a:schemeClr val="lt1"/>
+          </a:fillRef>
+          <a:effectRef idx="0">
+            <a:schemeClr val="dk1"/>
+          </a:effectRef>
+          <a:fontRef idx="minor">
+            <a:schemeClr val="dk1"/>
+          </a:fontRef>
+        </p:style>
+        <p:txBody>
+          <a:bodyPr rtlCol="0" anchor="ctr"/>
+          <a:lstStyle/>
+          <a:p>
+            <a:pPr algn="ctr"/>
+            <a:endParaRPr lang="zh-CN" altLang="en-US"/>
+          </a:p>
+        </p:txBody>
+      </p:sp>
+      <p:sp>
+        <p:nvSpPr>
+          <p:cNvPr id="17" name="矩形 16"/>
+          <p:cNvSpPr/>
+          <p:nvPr/>
+        </p:nvSpPr>
+        <p:spPr>
+          <a:xfrm>
+            <a:off x="1371816" y="2875247"/>
+            <a:ext cx="2960485" cy="1674160"/>
+          </a:xfrm>
+          <a:prstGeom prst="rect">
+            <a:avLst/>
+          </a:prstGeom>
+        </p:spPr>
+        <p:style>
+          <a:lnRef idx="2">
+            <a:schemeClr val="dk1"/>
+          </a:lnRef>
+          <a:fillRef idx="1">
+            <a:schemeClr val="lt1"/>
+          </a:fillRef>
+          <a:effectRef idx="0">
+            <a:schemeClr val="dk1"/>
+          </a:effectRef>
+          <a:fontRef idx="minor">
+            <a:schemeClr val="dk1"/>
+          </a:fontRef>
+        </p:style>
+        <p:txBody>
+          <a:bodyPr rtlCol="0" anchor="ctr"/>
+          <a:lstStyle/>
+          <a:p>
+            <a:pPr algn="ctr"/>
+            <a:r>
+              <a:rPr lang="en-US" altLang="zh-CN" dirty="0" smtClean="0"/>
+              <a:t>4G PCI-E Model</a:t>
+            </a:r>
+            <a:endParaRPr lang="zh-CN" altLang="en-US" dirty="0"/>
+          </a:p>
+        </p:txBody>
+      </p:sp>
+      <p:sp>
+        <p:nvSpPr>
+          <p:cNvPr id="12" name="矩形 11"/>
+          <p:cNvSpPr/>
+          <p:nvPr/>
+        </p:nvSpPr>
+        <p:spPr>
+          <a:xfrm rot="16200000">
+            <a:off x="1223657" y="3548285"/>
+            <a:ext cx="688202" cy="653924"/>
+          </a:xfrm>
+          <a:prstGeom prst="rect">
+            <a:avLst/>
+          </a:prstGeom>
+        </p:spPr>
+        <p:style>
+          <a:lnRef idx="2">
+            <a:schemeClr val="dk1"/>
+          </a:lnRef>
+          <a:fillRef idx="1">
+            <a:schemeClr val="lt1"/>
+          </a:fillRef>
+          <a:effectRef idx="0">
+            <a:schemeClr val="dk1"/>
+          </a:effectRef>
+          <a:fontRef idx="minor">
+            <a:schemeClr val="dk1"/>
+          </a:fontRef>
+        </p:style>
+        <p:txBody>
+          <a:bodyPr rtlCol="0" anchor="ctr"/>
+          <a:lstStyle/>
+          <a:p>
+            <a:pPr algn="ctr"/>
+            <a:r>
+              <a:rPr lang="en-US" altLang="zh-CN" dirty="0" smtClean="0"/>
+              <a:t>SIM Card</a:t>
+            </a:r>
+            <a:endParaRPr lang="zh-CN" altLang="en-US" dirty="0"/>
+          </a:p>
+        </p:txBody>
+      </p:sp>
+      <p:sp>
+        <p:nvSpPr>
+          <p:cNvPr id="16" name="矩形 15"/>
+          <p:cNvSpPr/>
+          <p:nvPr/>
+        </p:nvSpPr>
+        <p:spPr>
+          <a:xfrm rot="16200000">
+            <a:off x="1146682" y="4347608"/>
+            <a:ext cx="450268" cy="260915"/>
+          </a:xfrm>
+          <a:prstGeom prst="rect">
+            <a:avLst/>
+          </a:prstGeom>
+        </p:spPr>
+        <p:style>
+          <a:lnRef idx="2">
+            <a:schemeClr val="dk1"/>
+          </a:lnRef>
+          <a:fillRef idx="1">
+            <a:schemeClr val="lt1"/>
+          </a:fillRef>
+          <a:effectRef idx="0">
+            <a:schemeClr val="dk1"/>
+          </a:effectRef>
+          <a:fontRef idx="minor">
+            <a:schemeClr val="dk1"/>
+          </a:fontRef>
+        </p:style>
+        <p:txBody>
+          <a:bodyPr rtlCol="0" anchor="ctr"/>
+          <a:lstStyle/>
+          <a:p>
+            <a:pPr algn="ctr"/>
+            <a:r>
+              <a:rPr lang="en-US" altLang="zh-CN" sz="1100" dirty="0" smtClean="0"/>
+              <a:t>rest</a:t>
+            </a:r>
+            <a:endParaRPr lang="zh-CN" altLang="en-US" sz="1100" dirty="0"/>
+          </a:p>
+        </p:txBody>
+      </p:sp>
+      <p:sp>
+        <p:nvSpPr>
+          <p:cNvPr id="34" name="矩形 33"/>
+          <p:cNvSpPr/>
+          <p:nvPr/>
+        </p:nvSpPr>
+        <p:spPr>
+          <a:xfrm>
+            <a:off x="5187498" y="2503714"/>
+            <a:ext cx="3222172" cy="2830288"/>
+          </a:xfrm>
+          <a:prstGeom prst="rect">
+            <a:avLst/>
+          </a:prstGeom>
+        </p:spPr>
+        <p:style>
+          <a:lnRef idx="2">
+            <a:schemeClr val="dk1"/>
+          </a:lnRef>
+          <a:fillRef idx="1">
+            <a:schemeClr val="lt1"/>
+          </a:fillRef>
+          <a:effectRef idx="0">
+            <a:schemeClr val="dk1"/>
+          </a:effectRef>
+          <a:fontRef idx="minor">
+            <a:schemeClr val="dk1"/>
+          </a:fontRef>
+        </p:style>
+        <p:txBody>
+          <a:bodyPr rtlCol="0" anchor="ctr"/>
+          <a:lstStyle/>
+          <a:p>
+            <a:pPr algn="ctr"/>
+            <a:endParaRPr lang="zh-CN" altLang="en-US"/>
+          </a:p>
+        </p:txBody>
+      </p:sp>
+      <p:sp>
+        <p:nvSpPr>
+          <p:cNvPr id="36" name="矩形 35"/>
+          <p:cNvSpPr/>
+          <p:nvPr/>
+        </p:nvSpPr>
+        <p:spPr>
+          <a:xfrm>
+            <a:off x="6988912" y="4671207"/>
+            <a:ext cx="134750" cy="73479"/>
+          </a:xfrm>
+          <a:prstGeom prst="rect">
+            <a:avLst/>
+          </a:prstGeom>
+        </p:spPr>
+        <p:style>
+          <a:lnRef idx="2">
+            <a:schemeClr val="dk1"/>
+          </a:lnRef>
+          <a:fillRef idx="1">
+            <a:schemeClr val="lt1"/>
+          </a:fillRef>
+          <a:effectRef idx="0">
+            <a:schemeClr val="dk1"/>
+          </a:effectRef>
+          <a:fontRef idx="minor">
+            <a:schemeClr val="dk1"/>
+          </a:fontRef>
+        </p:style>
+        <p:txBody>
+          <a:bodyPr rtlCol="0" anchor="ctr"/>
+          <a:lstStyle/>
+          <a:p>
+            <a:pPr algn="ctr"/>
+            <a:endParaRPr lang="zh-CN" altLang="en-US" dirty="0"/>
+          </a:p>
+        </p:txBody>
+      </p:sp>
+      <p:sp>
+        <p:nvSpPr>
+          <p:cNvPr id="37" name="矩形 36"/>
+          <p:cNvSpPr/>
+          <p:nvPr/>
+        </p:nvSpPr>
+        <p:spPr>
+          <a:xfrm>
+            <a:off x="6359556" y="4736273"/>
+            <a:ext cx="1926104" cy="369332"/>
+          </a:xfrm>
+          <a:prstGeom prst="rect">
+            <a:avLst/>
+          </a:prstGeom>
+        </p:spPr>
+        <p:txBody>
+          <a:bodyPr wrap="none">
+            <a:spAutoFit/>
+          </a:bodyPr>
+          <a:lstStyle/>
+          <a:p>
+            <a:pPr algn="ctr"/>
+            <a:r>
+              <a:rPr lang="en-US" altLang="zh-CN" dirty="0" smtClean="0"/>
+              <a:t>BAT WiFi Sign NET </a:t>
+            </a:r>
+            <a:endParaRPr lang="zh-CN" altLang="en-US" dirty="0"/>
+          </a:p>
+        </p:txBody>
+      </p:sp>
+      <p:sp>
+        <p:nvSpPr>
+          <p:cNvPr id="38" name="矩形 37"/>
+          <p:cNvSpPr/>
+          <p:nvPr/>
+        </p:nvSpPr>
+        <p:spPr>
+          <a:xfrm>
+            <a:off x="5650367" y="4549407"/>
+            <a:ext cx="604812" cy="340226"/>
+          </a:xfrm>
+          <a:prstGeom prst="rect">
+            <a:avLst/>
+          </a:prstGeom>
+        </p:spPr>
+        <p:style>
+          <a:lnRef idx="2">
+            <a:schemeClr val="dk1"/>
+          </a:lnRef>
+          <a:fillRef idx="1">
+            <a:schemeClr val="lt1"/>
+          </a:fillRef>
+          <a:effectRef idx="0">
+            <a:schemeClr val="dk1"/>
+          </a:effectRef>
+          <a:fontRef idx="minor">
+            <a:schemeClr val="dk1"/>
+          </a:fontRef>
+        </p:style>
+        <p:txBody>
+          <a:bodyPr rtlCol="0" anchor="ctr"/>
+          <a:lstStyle/>
+          <a:p>
+            <a:pPr algn="ctr"/>
+            <a:r>
+              <a:rPr lang="en-US" altLang="zh-CN" sz="1200" dirty="0" smtClean="0"/>
+              <a:t>key</a:t>
+            </a:r>
+            <a:endParaRPr lang="zh-CN" altLang="en-US" sz="1200" dirty="0"/>
+          </a:p>
+        </p:txBody>
+      </p:sp>
+      <p:sp>
+        <p:nvSpPr>
+          <p:cNvPr id="39" name="矩形 38"/>
+          <p:cNvSpPr/>
+          <p:nvPr/>
+        </p:nvSpPr>
+        <p:spPr>
+          <a:xfrm>
+            <a:off x="7410120" y="4670177"/>
+            <a:ext cx="134750" cy="73479"/>
+          </a:xfrm>
+          <a:prstGeom prst="rect">
+            <a:avLst/>
+          </a:prstGeom>
+        </p:spPr>
+        <p:style>
+          <a:lnRef idx="2">
+            <a:schemeClr val="dk1"/>
+          </a:lnRef>
+          <a:fillRef idx="1">
+            <a:schemeClr val="lt1"/>
+          </a:fillRef>
+          <a:effectRef idx="0">
+            <a:schemeClr val="dk1"/>
+          </a:effectRef>
+          <a:fontRef idx="minor">
+            <a:schemeClr val="dk1"/>
+          </a:fontRef>
+        </p:style>
+        <p:txBody>
+          <a:bodyPr rtlCol="0" anchor="ctr"/>
+          <a:lstStyle/>
+          <a:p>
+            <a:pPr algn="ctr"/>
+            <a:endParaRPr lang="zh-CN" altLang="en-US" dirty="0"/>
+          </a:p>
+        </p:txBody>
+      </p:sp>
+      <p:sp>
+        <p:nvSpPr>
+          <p:cNvPr id="40" name="矩形 39"/>
+          <p:cNvSpPr/>
+          <p:nvPr/>
+        </p:nvSpPr>
+        <p:spPr>
+          <a:xfrm>
+            <a:off x="7826083" y="4673287"/>
+            <a:ext cx="134750" cy="73479"/>
+          </a:xfrm>
+          <a:prstGeom prst="rect">
+            <a:avLst/>
+          </a:prstGeom>
+        </p:spPr>
+        <p:style>
+          <a:lnRef idx="2">
+            <a:schemeClr val="dk1"/>
+          </a:lnRef>
+          <a:fillRef idx="1">
+            <a:schemeClr val="lt1"/>
+          </a:fillRef>
+          <a:effectRef idx="0">
+            <a:schemeClr val="dk1"/>
+          </a:effectRef>
+          <a:fontRef idx="minor">
+            <a:schemeClr val="dk1"/>
+          </a:fontRef>
+        </p:style>
+        <p:txBody>
+          <a:bodyPr rtlCol="0" anchor="ctr"/>
+          <a:lstStyle/>
+          <a:p>
+            <a:pPr algn="ctr"/>
+            <a:endParaRPr lang="zh-CN" altLang="en-US" dirty="0"/>
+          </a:p>
+        </p:txBody>
+      </p:sp>
+      <p:sp>
+        <p:nvSpPr>
+          <p:cNvPr id="42" name="椭圆 41"/>
+          <p:cNvSpPr/>
+          <p:nvPr/>
+        </p:nvSpPr>
+        <p:spPr>
+          <a:xfrm>
+            <a:off x="8107551" y="2601252"/>
+            <a:ext cx="206828" cy="206828"/>
+          </a:xfrm>
+          <a:prstGeom prst="ellipse">
+            <a:avLst/>
+          </a:prstGeom>
+        </p:spPr>
+        <p:style>
+          <a:lnRef idx="2">
+            <a:schemeClr val="dk1"/>
+          </a:lnRef>
+          <a:fillRef idx="1">
+            <a:schemeClr val="lt1"/>
+          </a:fillRef>
+          <a:effectRef idx="0">
+            <a:schemeClr val="dk1"/>
+          </a:effectRef>
+          <a:fontRef idx="minor">
+            <a:schemeClr val="dk1"/>
+          </a:fontRef>
+        </p:style>
+        <p:txBody>
+          <a:bodyPr rtlCol="0" anchor="ctr"/>
+          <a:lstStyle/>
+          <a:p>
+            <a:pPr algn="ctr"/>
+            <a:endParaRPr lang="zh-CN" altLang="en-US"/>
+          </a:p>
+        </p:txBody>
+      </p:sp>
+      <p:sp>
+        <p:nvSpPr>
+          <p:cNvPr id="43" name="椭圆 42"/>
+          <p:cNvSpPr/>
+          <p:nvPr/>
+        </p:nvSpPr>
+        <p:spPr>
+          <a:xfrm>
+            <a:off x="5318341" y="2584050"/>
+            <a:ext cx="206828" cy="206828"/>
+          </a:xfrm>
+          <a:prstGeom prst="ellipse">
+            <a:avLst/>
+          </a:prstGeom>
+        </p:spPr>
+        <p:style>
+          <a:lnRef idx="2">
+            <a:schemeClr val="dk1"/>
+          </a:lnRef>
+          <a:fillRef idx="1">
+            <a:schemeClr val="lt1"/>
+          </a:fillRef>
+          <a:effectRef idx="0">
+            <a:schemeClr val="dk1"/>
+          </a:effectRef>
+          <a:fontRef idx="minor">
+            <a:schemeClr val="dk1"/>
+          </a:fontRef>
+        </p:style>
+        <p:txBody>
+          <a:bodyPr rtlCol="0" anchor="ctr"/>
+          <a:lstStyle/>
+          <a:p>
+            <a:pPr algn="ctr"/>
+            <a:endParaRPr lang="zh-CN" altLang="en-US"/>
+          </a:p>
+        </p:txBody>
+      </p:sp>
+      <p:sp>
+        <p:nvSpPr>
+          <p:cNvPr id="44" name="椭圆 43"/>
+          <p:cNvSpPr/>
+          <p:nvPr/>
+        </p:nvSpPr>
+        <p:spPr>
+          <a:xfrm>
+            <a:off x="5256273" y="5075660"/>
+            <a:ext cx="206828" cy="206828"/>
+          </a:xfrm>
+          <a:prstGeom prst="ellipse">
+            <a:avLst/>
+          </a:prstGeom>
+        </p:spPr>
+        <p:style>
+          <a:lnRef idx="2">
+            <a:schemeClr val="dk1"/>
+          </a:lnRef>
+          <a:fillRef idx="1">
+            <a:schemeClr val="lt1"/>
+          </a:fillRef>
+          <a:effectRef idx="0">
+            <a:schemeClr val="dk1"/>
+          </a:effectRef>
+          <a:fontRef idx="minor">
+            <a:schemeClr val="dk1"/>
+          </a:fontRef>
+        </p:style>
+        <p:txBody>
+          <a:bodyPr rtlCol="0" anchor="ctr"/>
+          <a:lstStyle/>
+          <a:p>
+            <a:pPr algn="ctr"/>
+            <a:endParaRPr lang="zh-CN" altLang="en-US"/>
+          </a:p>
+        </p:txBody>
+      </p:sp>
+      <p:sp>
+        <p:nvSpPr>
+          <p:cNvPr id="45" name="椭圆 44"/>
+          <p:cNvSpPr/>
+          <p:nvPr/>
+        </p:nvSpPr>
+        <p:spPr>
+          <a:xfrm>
+            <a:off x="8107551" y="5057002"/>
+            <a:ext cx="206828" cy="206828"/>
+          </a:xfrm>
+          <a:prstGeom prst="ellipse">
+            <a:avLst/>
+          </a:prstGeom>
+        </p:spPr>
+        <p:style>
+          <a:lnRef idx="2">
+            <a:schemeClr val="dk1"/>
+          </a:lnRef>
+          <a:fillRef idx="1">
+            <a:schemeClr val="lt1"/>
+          </a:fillRef>
+          <a:effectRef idx="0">
+            <a:schemeClr val="dk1"/>
+          </a:effectRef>
+          <a:fontRef idx="minor">
+            <a:schemeClr val="dk1"/>
+          </a:fontRef>
+        </p:style>
+        <p:txBody>
+          <a:bodyPr rtlCol="0" anchor="ctr"/>
+          <a:lstStyle/>
+          <a:p>
+            <a:pPr algn="ctr"/>
+            <a:endParaRPr lang="zh-CN" altLang="en-US"/>
+          </a:p>
+        </p:txBody>
+      </p:sp>
+      <p:sp>
+        <p:nvSpPr>
+          <p:cNvPr id="19" name="矩形 18"/>
+          <p:cNvSpPr/>
+          <p:nvPr/>
+        </p:nvSpPr>
+        <p:spPr>
+          <a:xfrm>
+            <a:off x="5595193" y="3077123"/>
+            <a:ext cx="2446979" cy="1245345"/>
+          </a:xfrm>
+          <a:prstGeom prst="rect">
+            <a:avLst/>
+          </a:prstGeom>
+        </p:spPr>
+        <p:style>
+          <a:lnRef idx="2">
+            <a:schemeClr val="dk1"/>
+          </a:lnRef>
+          <a:fillRef idx="1">
+            <a:schemeClr val="lt1"/>
+          </a:fillRef>
+          <a:effectRef idx="0">
+            <a:schemeClr val="dk1"/>
+          </a:effectRef>
+          <a:fontRef idx="minor">
+            <a:schemeClr val="dk1"/>
+          </a:fontRef>
+        </p:style>
+        <p:txBody>
+          <a:bodyPr rtlCol="0" anchor="ctr"/>
+          <a:lstStyle/>
+          <a:p>
+            <a:pPr algn="ctr"/>
+            <a:r>
+              <a:rPr lang="en-US" altLang="zh-CN" dirty="0" smtClean="0"/>
+              <a:t>MT7688/7628 Model</a:t>
+            </a:r>
+          </a:p>
+          <a:p>
+            <a:pPr algn="ctr"/>
+            <a:r>
+              <a:rPr lang="zh-CN" altLang="zh-CN" dirty="0"/>
+              <a:t>1Gb/64Mb</a:t>
+            </a:r>
+            <a:endParaRPr lang="zh-CN" altLang="en-US" dirty="0"/>
+          </a:p>
+        </p:txBody>
+      </p:sp>
+      <p:sp>
+        <p:nvSpPr>
+          <p:cNvPr id="50" name="矩形 49"/>
+          <p:cNvSpPr/>
+          <p:nvPr/>
+        </p:nvSpPr>
+        <p:spPr>
+          <a:xfrm rot="16200000">
+            <a:off x="1259438" y="2834448"/>
+            <a:ext cx="616992" cy="653924"/>
+          </a:xfrm>
+          <a:prstGeom prst="rect">
+            <a:avLst/>
+          </a:prstGeom>
+        </p:spPr>
+        <p:style>
+          <a:lnRef idx="2">
+            <a:schemeClr val="dk1"/>
+          </a:lnRef>
+          <a:fillRef idx="1">
+            <a:schemeClr val="lt1"/>
+          </a:fillRef>
+          <a:effectRef idx="0">
+            <a:schemeClr val="dk1"/>
+          </a:effectRef>
+          <a:fontRef idx="minor">
+            <a:schemeClr val="dk1"/>
+          </a:fontRef>
+        </p:style>
+        <p:txBody>
+          <a:bodyPr rtlCol="0" anchor="ctr"/>
+          <a:lstStyle/>
+          <a:p>
+            <a:pPr algn="ctr"/>
+            <a:r>
+              <a:rPr lang="en-US" altLang="zh-CN" dirty="0" smtClean="0"/>
+              <a:t>SD</a:t>
+            </a:r>
+          </a:p>
+          <a:p>
+            <a:pPr algn="ctr"/>
+            <a:r>
+              <a:rPr lang="en-US" altLang="zh-CN" dirty="0" smtClean="0"/>
+              <a:t>Card</a:t>
+            </a:r>
+            <a:endParaRPr lang="zh-CN" altLang="en-US" dirty="0"/>
+          </a:p>
+        </p:txBody>
+      </p:sp>
+      <p:sp>
+        <p:nvSpPr>
+          <p:cNvPr id="51" name="矩形 50"/>
+          <p:cNvSpPr/>
+          <p:nvPr/>
+        </p:nvSpPr>
+        <p:spPr>
+          <a:xfrm>
+            <a:off x="6569266" y="4663892"/>
+            <a:ext cx="134750" cy="73479"/>
+          </a:xfrm>
+          <a:prstGeom prst="rect">
+            <a:avLst/>
+          </a:prstGeom>
+        </p:spPr>
+        <p:style>
+          <a:lnRef idx="2">
+            <a:schemeClr val="dk1"/>
+          </a:lnRef>
+          <a:fillRef idx="1">
+            <a:schemeClr val="lt1"/>
+          </a:fillRef>
+          <a:effectRef idx="0">
+            <a:schemeClr val="dk1"/>
+          </a:effectRef>
+          <a:fontRef idx="minor">
+            <a:schemeClr val="dk1"/>
+          </a:fontRef>
+        </p:style>
+        <p:txBody>
+          <a:bodyPr rtlCol="0" anchor="ctr"/>
+          <a:lstStyle/>
+          <a:p>
+            <a:pPr algn="ctr"/>
+            <a:endParaRPr lang="zh-CN" altLang="en-US" dirty="0"/>
+          </a:p>
+        </p:txBody>
+      </p:sp>
+      <p:sp>
+        <p:nvSpPr>
+          <p:cNvPr id="52" name="矩形 51"/>
+          <p:cNvSpPr/>
+          <p:nvPr/>
+        </p:nvSpPr>
+        <p:spPr>
+          <a:xfrm>
+            <a:off x="1620503" y="5057002"/>
+            <a:ext cx="620487" cy="381970"/>
+          </a:xfrm>
+          <a:prstGeom prst="rect">
+            <a:avLst/>
+          </a:prstGeom>
+        </p:spPr>
+        <p:style>
+          <a:lnRef idx="2">
+            <a:schemeClr val="dk1"/>
+          </a:lnRef>
+          <a:fillRef idx="1">
+            <a:schemeClr val="lt1"/>
+          </a:fillRef>
+          <a:effectRef idx="0">
+            <a:schemeClr val="dk1"/>
+          </a:effectRef>
+          <a:fontRef idx="minor">
+            <a:schemeClr val="dk1"/>
+          </a:fontRef>
+        </p:style>
+        <p:txBody>
+          <a:bodyPr rtlCol="0" anchor="ctr"/>
+          <a:lstStyle/>
+          <a:p>
+            <a:pPr algn="ctr"/>
+            <a:r>
+              <a:rPr lang="en-US" altLang="zh-CN" dirty="0" smtClean="0"/>
+              <a:t>USB</a:t>
+            </a:r>
+            <a:endParaRPr lang="zh-CN" altLang="en-US" dirty="0"/>
+          </a:p>
+        </p:txBody>
+      </p:sp>
+      <p:sp>
+        <p:nvSpPr>
+          <p:cNvPr id="55" name="矩形 54"/>
           <p:cNvSpPr/>
           <p:nvPr/>
         </p:nvSpPr>
@@ -7308,7 +7513,11 @@
             <a:pPr algn="ctr"/>
             <a:r>
               <a:rPr lang="en-US" altLang="zh-CN" dirty="0" smtClean="0"/>
-              <a:t>Version 4 – S3</a:t>
+              <a:t>Version 4 – </a:t>
+            </a:r>
+            <a:r>
+              <a:rPr lang="en-US" altLang="zh-CN" dirty="0" smtClean="0"/>
+              <a:t>S3</a:t>
             </a:r>
             <a:endParaRPr lang="zh-CN" altLang="en-US" dirty="0"/>
           </a:p>
@@ -7322,194 +7531,26 @@
         </p:nvSpPr>
         <p:spPr>
           <a:xfrm>
-            <a:off x="6911970" y="2253791"/>
-            <a:ext cx="1248235" cy="2287809"/>
+            <a:off x="3100549" y="479362"/>
+            <a:ext cx="1999265" cy="369332"/>
           </a:xfrm>
           <a:prstGeom prst="rect">
             <a:avLst/>
           </a:prstGeom>
         </p:spPr>
-        <p:style>
-          <a:lnRef idx="2">
-            <a:schemeClr val="dk1"/>
-          </a:lnRef>
-          <a:fillRef idx="1">
-            <a:schemeClr val="lt1"/>
-          </a:fillRef>
-          <a:effectRef idx="0">
-            <a:schemeClr val="dk1"/>
-          </a:effectRef>
-          <a:fontRef idx="minor">
-            <a:schemeClr val="dk1"/>
-          </a:fontRef>
-        </p:style>
-        <p:txBody>
-          <a:bodyPr rtlCol="0" anchor="ctr"/>
-          <a:lstStyle/>
-          <a:p>
-            <a:pPr algn="ctr"/>
+        <p:txBody>
+          <a:bodyPr wrap="none">
+            <a:spAutoFit/>
+          </a:bodyPr>
+          <a:lstStyle/>
+          <a:p>
+            <a:r>
+              <a:rPr lang="zh-CN" altLang="en-US" dirty="0" smtClean="0"/>
+              <a:t>基于 </a:t>
+            </a:r>
             <a:r>
               <a:rPr lang="en-US" altLang="zh-CN" dirty="0" smtClean="0"/>
-              <a:t>bit3</a:t>
-            </a:r>
-          </a:p>
-          <a:p>
-            <a:pPr algn="ctr"/>
-            <a:r>
-              <a:rPr lang="en-US" altLang="zh-CN" dirty="0" smtClean="0"/>
-              <a:t>33*17.78</a:t>
-            </a:r>
-            <a:endParaRPr lang="zh-CN" altLang="en-US" dirty="0"/>
-          </a:p>
-        </p:txBody>
-      </p:sp>
-      <p:sp>
-        <p:nvSpPr>
-          <p:cNvPr id="5" name="矩形 4"/>
-          <p:cNvSpPr/>
-          <p:nvPr/>
-        </p:nvSpPr>
-        <p:spPr>
-          <a:xfrm>
-            <a:off x="4407796" y="1443709"/>
-            <a:ext cx="2277386" cy="3907971"/>
-          </a:xfrm>
-          <a:prstGeom prst="rect">
-            <a:avLst/>
-          </a:prstGeom>
-        </p:spPr>
-        <p:style>
-          <a:lnRef idx="2">
-            <a:schemeClr val="dk1"/>
-          </a:lnRef>
-          <a:fillRef idx="1">
-            <a:schemeClr val="lt1"/>
-          </a:fillRef>
-          <a:effectRef idx="0">
-            <a:schemeClr val="dk1"/>
-          </a:effectRef>
-          <a:fontRef idx="minor">
-            <a:schemeClr val="dk1"/>
-          </a:fontRef>
-        </p:style>
-        <p:txBody>
-          <a:bodyPr rtlCol="0" anchor="ctr"/>
-          <a:lstStyle/>
-          <a:p>
-            <a:pPr algn="ctr"/>
-            <a:r>
-              <a:rPr lang="en-US" altLang="zh-CN" dirty="0" smtClean="0"/>
-              <a:t>56*33.3</a:t>
-            </a:r>
-          </a:p>
-          <a:p>
-            <a:pPr algn="ctr"/>
-            <a:r>
-              <a:rPr lang="en-US" altLang="zh-CN" smtClean="0"/>
-              <a:t>4G Model</a:t>
-            </a:r>
-            <a:endParaRPr lang="zh-CN" altLang="en-US" dirty="0"/>
-          </a:p>
-        </p:txBody>
-      </p:sp>
-      <p:sp>
-        <p:nvSpPr>
-          <p:cNvPr id="6" name="矩形 5"/>
-          <p:cNvSpPr/>
-          <p:nvPr/>
-        </p:nvSpPr>
-        <p:spPr>
-          <a:xfrm>
-            <a:off x="7937940" y="1664937"/>
-            <a:ext cx="4223439" cy="3465516"/>
-          </a:xfrm>
-          <a:prstGeom prst="rect">
-            <a:avLst/>
-          </a:prstGeom>
-          <a:solidFill>
-            <a:schemeClr val="lt1">
-              <a:alpha val="64000"/>
-            </a:schemeClr>
-          </a:solidFill>
-        </p:spPr>
-        <p:style>
-          <a:lnRef idx="2">
-            <a:schemeClr val="dk1"/>
-          </a:lnRef>
-          <a:fillRef idx="1">
-            <a:schemeClr val="lt1"/>
-          </a:fillRef>
-          <a:effectRef idx="0">
-            <a:schemeClr val="dk1"/>
-          </a:effectRef>
-          <a:fontRef idx="minor">
-            <a:schemeClr val="dk1"/>
-          </a:fontRef>
-        </p:style>
-        <p:txBody>
-          <a:bodyPr rtlCol="0" anchor="ctr"/>
-          <a:lstStyle/>
-          <a:p>
-            <a:pPr algn="ctr"/>
-            <a:r>
-              <a:rPr lang="en-US" altLang="zh-CN" dirty="0" smtClean="0"/>
-              <a:t>Battery</a:t>
-            </a:r>
-          </a:p>
-          <a:p>
-            <a:pPr algn="ctr"/>
-            <a:r>
-              <a:rPr lang="en-US" altLang="zh-CN" dirty="0" smtClean="0"/>
-              <a:t>49.4*60.5</a:t>
-            </a:r>
-            <a:endParaRPr lang="zh-CN" altLang="en-US" dirty="0"/>
-          </a:p>
-        </p:txBody>
-      </p:sp>
-      <p:sp>
-        <p:nvSpPr>
-          <p:cNvPr id="7" name="矩形 6"/>
-          <p:cNvSpPr/>
-          <p:nvPr/>
-        </p:nvSpPr>
-        <p:spPr>
-          <a:xfrm>
-            <a:off x="9094999" y="2120878"/>
-            <a:ext cx="1548050" cy="2464713"/>
-          </a:xfrm>
-          <a:prstGeom prst="rect">
-            <a:avLst/>
-          </a:prstGeom>
-        </p:spPr>
-        <p:style>
-          <a:lnRef idx="2">
-            <a:schemeClr val="dk1"/>
-          </a:lnRef>
-          <a:fillRef idx="1">
-            <a:schemeClr val="lt1"/>
-          </a:fillRef>
-          <a:effectRef idx="0">
-            <a:schemeClr val="dk1"/>
-          </a:effectRef>
-          <a:fontRef idx="minor">
-            <a:schemeClr val="dk1"/>
-          </a:fontRef>
-        </p:style>
-        <p:txBody>
-          <a:bodyPr rtlCol="0" anchor="ctr"/>
-          <a:lstStyle/>
-          <a:p>
-            <a:pPr algn="ctr"/>
-            <a:r>
-              <a:rPr lang="en-US" altLang="zh-CN" dirty="0" smtClean="0"/>
-              <a:t>bit5</a:t>
-            </a:r>
-          </a:p>
-          <a:p>
-            <a:pPr algn="ctr"/>
-            <a:r>
-              <a:rPr lang="en-US" altLang="zh-CN" dirty="0" smtClean="0"/>
-              <a:t>35*22</a:t>
+              <a:t>WIDORA_bit3</a:t>
             </a:r>
             <a:endParaRPr lang="zh-CN" altLang="en-US" dirty="0"/>
           </a:p>
@@ -7518,7 +7559,7 @@
     </p:spTree>
     <p:extLst>
       <p:ext uri="{BB962C8B-B14F-4D97-AF65-F5344CB8AC3E}">
-        <p14:creationId xmlns:p14="http://schemas.microsoft.com/office/powerpoint/2010/main" val="2662778434"/>
+        <p14:creationId xmlns:p14="http://schemas.microsoft.com/office/powerpoint/2010/main" val="3155156461"/>
       </p:ext>
     </p:extLst>
   </p:cSld>
@@ -9349,7 +9390,7 @@
           <p:cNvPr id="59" name="直接连接符 58">
             <a:extLst>
               <a:ext uri="{FF2B5EF4-FFF2-40B4-BE49-F238E27FC236}">
-                <a16:creationId xmlns:a16="http://schemas.microsoft.com/office/drawing/2014/main" xmlns="" id="{B0612C4A-FDB4-49C6-99DC-8A1177131D50}"/>
+                <a16:creationId xmlns="" xmlns:a16="http://schemas.microsoft.com/office/drawing/2014/main" id="{B0612C4A-FDB4-49C6-99DC-8A1177131D50}"/>
               </a:ext>
             </a:extLst>
           </p:cNvPr>
@@ -9393,7 +9434,7 @@
           <p:cNvPr id="57" name="直接连接符 56">
             <a:extLst>
               <a:ext uri="{FF2B5EF4-FFF2-40B4-BE49-F238E27FC236}">
-                <a16:creationId xmlns:a16="http://schemas.microsoft.com/office/drawing/2014/main" xmlns="" id="{61BAD73C-9ED2-49A6-B4F0-1BBDFDB501D8}"/>
+                <a16:creationId xmlns="" xmlns:a16="http://schemas.microsoft.com/office/drawing/2014/main" id="{61BAD73C-9ED2-49A6-B4F0-1BBDFDB501D8}"/>
               </a:ext>
             </a:extLst>
           </p:cNvPr>
@@ -9437,7 +9478,7 @@
           <p:cNvPr id="53" name="直接连接符 52">
             <a:extLst>
               <a:ext uri="{FF2B5EF4-FFF2-40B4-BE49-F238E27FC236}">
-                <a16:creationId xmlns:a16="http://schemas.microsoft.com/office/drawing/2014/main" xmlns="" id="{94FDCC07-00C9-45D0-B707-87B0D913F652}"/>
+                <a16:creationId xmlns="" xmlns:a16="http://schemas.microsoft.com/office/drawing/2014/main" id="{94FDCC07-00C9-45D0-B707-87B0D913F652}"/>
               </a:ext>
             </a:extLst>
           </p:cNvPr>
@@ -9481,7 +9522,7 @@
           <p:cNvPr id="49" name="直接连接符 48">
             <a:extLst>
               <a:ext uri="{FF2B5EF4-FFF2-40B4-BE49-F238E27FC236}">
-                <a16:creationId xmlns:a16="http://schemas.microsoft.com/office/drawing/2014/main" xmlns="" id="{CC165633-05D9-45F4-AF2C-E15F5D957D38}"/>
+                <a16:creationId xmlns="" xmlns:a16="http://schemas.microsoft.com/office/drawing/2014/main" id="{CC165633-05D9-45F4-AF2C-E15F5D957D38}"/>
               </a:ext>
             </a:extLst>
           </p:cNvPr>
@@ -9525,7 +9566,7 @@
           <p:cNvPr id="48" name="直接连接符 47">
             <a:extLst>
               <a:ext uri="{FF2B5EF4-FFF2-40B4-BE49-F238E27FC236}">
-                <a16:creationId xmlns:a16="http://schemas.microsoft.com/office/drawing/2014/main" xmlns="" id="{D6383094-CE0A-4492-A713-BC5D512860D4}"/>
+                <a16:creationId xmlns="" xmlns:a16="http://schemas.microsoft.com/office/drawing/2014/main" id="{D6383094-CE0A-4492-A713-BC5D512860D4}"/>
               </a:ext>
             </a:extLst>
           </p:cNvPr>
@@ -9569,7 +9610,7 @@
           <p:cNvPr id="47" name="直接连接符 46">
             <a:extLst>
               <a:ext uri="{FF2B5EF4-FFF2-40B4-BE49-F238E27FC236}">
-                <a16:creationId xmlns:a16="http://schemas.microsoft.com/office/drawing/2014/main" xmlns="" id="{C94951D2-8DD4-42C0-A481-97E6C25A33B7}"/>
+                <a16:creationId xmlns="" xmlns:a16="http://schemas.microsoft.com/office/drawing/2014/main" id="{C94951D2-8DD4-42C0-A481-97E6C25A33B7}"/>
               </a:ext>
             </a:extLst>
           </p:cNvPr>
@@ -9613,7 +9654,7 @@
           <p:cNvPr id="24" name="直接连接符 23">
             <a:extLst>
               <a:ext uri="{FF2B5EF4-FFF2-40B4-BE49-F238E27FC236}">
-                <a16:creationId xmlns:a16="http://schemas.microsoft.com/office/drawing/2014/main" xmlns="" id="{473A74A2-3CE8-4446-B677-255A62247C1D}"/>
+                <a16:creationId xmlns="" xmlns:a16="http://schemas.microsoft.com/office/drawing/2014/main" id="{473A74A2-3CE8-4446-B677-255A62247C1D}"/>
               </a:ext>
             </a:extLst>
           </p:cNvPr>
@@ -9657,7 +9698,7 @@
           <p:cNvPr id="46" name="直接连接符 45">
             <a:extLst>
               <a:ext uri="{FF2B5EF4-FFF2-40B4-BE49-F238E27FC236}">
-                <a16:creationId xmlns:a16="http://schemas.microsoft.com/office/drawing/2014/main" xmlns="" id="{93CCEF41-3D1A-48AB-BE82-AC1423FC84D5}"/>
+                <a16:creationId xmlns="" xmlns:a16="http://schemas.microsoft.com/office/drawing/2014/main" id="{93CCEF41-3D1A-48AB-BE82-AC1423FC84D5}"/>
               </a:ext>
             </a:extLst>
           </p:cNvPr>
@@ -9701,7 +9742,7 @@
           <p:cNvPr id="40" name="圆柱形 39">
             <a:extLst>
               <a:ext uri="{FF2B5EF4-FFF2-40B4-BE49-F238E27FC236}">
-                <a16:creationId xmlns:a16="http://schemas.microsoft.com/office/drawing/2014/main" xmlns="" id="{FE2E533D-5D96-43CB-A77B-D3799107B0F5}"/>
+                <a16:creationId xmlns="" xmlns:a16="http://schemas.microsoft.com/office/drawing/2014/main" id="{FE2E533D-5D96-43CB-A77B-D3799107B0F5}"/>
               </a:ext>
             </a:extLst>
           </p:cNvPr>
@@ -9755,7 +9796,7 @@
           <p:cNvPr id="43" name="圆柱形 42">
             <a:extLst>
               <a:ext uri="{FF2B5EF4-FFF2-40B4-BE49-F238E27FC236}">
-                <a16:creationId xmlns:a16="http://schemas.microsoft.com/office/drawing/2014/main" xmlns="" id="{CDABACE9-93B0-45D3-8908-7EE179237CF0}"/>
+                <a16:creationId xmlns="" xmlns:a16="http://schemas.microsoft.com/office/drawing/2014/main" id="{CDABACE9-93B0-45D3-8908-7EE179237CF0}"/>
               </a:ext>
             </a:extLst>
           </p:cNvPr>
@@ -9809,7 +9850,7 @@
           <p:cNvPr id="42" name="圆柱形 41">
             <a:extLst>
               <a:ext uri="{FF2B5EF4-FFF2-40B4-BE49-F238E27FC236}">
-                <a16:creationId xmlns:a16="http://schemas.microsoft.com/office/drawing/2014/main" xmlns="" id="{CB57CAD4-FFFE-4646-A55B-FDA28AF9B101}"/>
+                <a16:creationId xmlns="" xmlns:a16="http://schemas.microsoft.com/office/drawing/2014/main" id="{CB57CAD4-FFFE-4646-A55B-FDA28AF9B101}"/>
               </a:ext>
             </a:extLst>
           </p:cNvPr>
@@ -10983,7 +11024,7 @@
           <p:cNvPr id="2" name="矩形 1">
             <a:extLst>
               <a:ext uri="{FF2B5EF4-FFF2-40B4-BE49-F238E27FC236}">
-                <a16:creationId xmlns:a16="http://schemas.microsoft.com/office/drawing/2014/main" xmlns="" id="{6195E1B2-D03E-450A-9908-5A4B12A88C79}"/>
+                <a16:creationId xmlns="" xmlns:a16="http://schemas.microsoft.com/office/drawing/2014/main" id="{6195E1B2-D03E-450A-9908-5A4B12A88C79}"/>
               </a:ext>
             </a:extLst>
           </p:cNvPr>
@@ -11033,7 +11074,7 @@
           <p:cNvPr id="30" name="矩形 29">
             <a:extLst>
               <a:ext uri="{FF2B5EF4-FFF2-40B4-BE49-F238E27FC236}">
-                <a16:creationId xmlns:a16="http://schemas.microsoft.com/office/drawing/2014/main" xmlns="" id="{1E4FF06F-9F23-44B4-93ED-32A23B3A89F4}"/>
+                <a16:creationId xmlns="" xmlns:a16="http://schemas.microsoft.com/office/drawing/2014/main" id="{1E4FF06F-9F23-44B4-93ED-32A23B3A89F4}"/>
               </a:ext>
             </a:extLst>
           </p:cNvPr>
@@ -11088,7 +11129,7 @@
           <p:cNvPr id="31" name="矩形 30">
             <a:extLst>
               <a:ext uri="{FF2B5EF4-FFF2-40B4-BE49-F238E27FC236}">
-                <a16:creationId xmlns:a16="http://schemas.microsoft.com/office/drawing/2014/main" xmlns="" id="{CF9834D3-CBCB-45DB-A2E8-87BF80266815}"/>
+                <a16:creationId xmlns="" xmlns:a16="http://schemas.microsoft.com/office/drawing/2014/main" id="{CF9834D3-CBCB-45DB-A2E8-87BF80266815}"/>
               </a:ext>
             </a:extLst>
           </p:cNvPr>
@@ -11144,7 +11185,7 @@
           <p:cNvPr id="37" name="矩形 36">
             <a:extLst>
               <a:ext uri="{FF2B5EF4-FFF2-40B4-BE49-F238E27FC236}">
-                <a16:creationId xmlns:a16="http://schemas.microsoft.com/office/drawing/2014/main" xmlns="" id="{C4E8A817-9A94-42F8-974D-3F1C511DFBE1}"/>
+                <a16:creationId xmlns="" xmlns:a16="http://schemas.microsoft.com/office/drawing/2014/main" id="{C4E8A817-9A94-42F8-974D-3F1C511DFBE1}"/>
               </a:ext>
             </a:extLst>
           </p:cNvPr>
@@ -11204,7 +11245,7 @@
           <p:cNvPr id="8" name="右大括号 7">
             <a:extLst>
               <a:ext uri="{FF2B5EF4-FFF2-40B4-BE49-F238E27FC236}">
-                <a16:creationId xmlns:a16="http://schemas.microsoft.com/office/drawing/2014/main" xmlns="" id="{65D7FD4A-9DB7-4403-B6AC-B18D53706051}"/>
+                <a16:creationId xmlns="" xmlns:a16="http://schemas.microsoft.com/office/drawing/2014/main" id="{65D7FD4A-9DB7-4403-B6AC-B18D53706051}"/>
               </a:ext>
             </a:extLst>
           </p:cNvPr>
@@ -11251,7 +11292,7 @@
           <p:cNvPr id="14" name="矩形 13">
             <a:extLst>
               <a:ext uri="{FF2B5EF4-FFF2-40B4-BE49-F238E27FC236}">
-                <a16:creationId xmlns:a16="http://schemas.microsoft.com/office/drawing/2014/main" xmlns="" id="{F29A3D16-7342-466D-969F-F25F200F859D}"/>
+                <a16:creationId xmlns="" xmlns:a16="http://schemas.microsoft.com/office/drawing/2014/main" id="{F29A3D16-7342-466D-969F-F25F200F859D}"/>
               </a:ext>
             </a:extLst>
           </p:cNvPr>
@@ -11286,7 +11327,7 @@
           <p:cNvPr id="38" name="圆柱形 37">
             <a:extLst>
               <a:ext uri="{FF2B5EF4-FFF2-40B4-BE49-F238E27FC236}">
-                <a16:creationId xmlns:a16="http://schemas.microsoft.com/office/drawing/2014/main" xmlns="" id="{6B35CB05-826A-4F21-84B4-EC4FF1A7D374}"/>
+                <a16:creationId xmlns="" xmlns:a16="http://schemas.microsoft.com/office/drawing/2014/main" id="{6B35CB05-826A-4F21-84B4-EC4FF1A7D374}"/>
               </a:ext>
             </a:extLst>
           </p:cNvPr>
@@ -11340,7 +11381,7 @@
           <p:cNvPr id="39" name="圆柱形 38">
             <a:extLst>
               <a:ext uri="{FF2B5EF4-FFF2-40B4-BE49-F238E27FC236}">
-                <a16:creationId xmlns:a16="http://schemas.microsoft.com/office/drawing/2014/main" xmlns="" id="{04344B83-66BB-42C8-BD71-01DCB27D7900}"/>
+                <a16:creationId xmlns="" xmlns:a16="http://schemas.microsoft.com/office/drawing/2014/main" id="{04344B83-66BB-42C8-BD71-01DCB27D7900}"/>
               </a:ext>
             </a:extLst>
           </p:cNvPr>
@@ -11394,7 +11435,7 @@
           <p:cNvPr id="18" name="立方体 17">
             <a:extLst>
               <a:ext uri="{FF2B5EF4-FFF2-40B4-BE49-F238E27FC236}">
-                <a16:creationId xmlns:a16="http://schemas.microsoft.com/office/drawing/2014/main" xmlns="" id="{D166C661-D91B-4D1C-A06F-0A0B3ADF2EBC}"/>
+                <a16:creationId xmlns="" xmlns:a16="http://schemas.microsoft.com/office/drawing/2014/main" id="{D166C661-D91B-4D1C-A06F-0A0B3ADF2EBC}"/>
               </a:ext>
             </a:extLst>
           </p:cNvPr>
@@ -11446,7 +11487,7 @@
           <p:cNvPr id="41" name="圆柱形 40">
             <a:extLst>
               <a:ext uri="{FF2B5EF4-FFF2-40B4-BE49-F238E27FC236}">
-                <a16:creationId xmlns:a16="http://schemas.microsoft.com/office/drawing/2014/main" xmlns="" id="{B2CAAB81-D9B0-4614-A32F-D30ED0182F38}"/>
+                <a16:creationId xmlns="" xmlns:a16="http://schemas.microsoft.com/office/drawing/2014/main" id="{B2CAAB81-D9B0-4614-A32F-D30ED0182F38}"/>
               </a:ext>
             </a:extLst>
           </p:cNvPr>
@@ -11500,7 +11541,7 @@
           <p:cNvPr id="44" name="圆柱形 43">
             <a:extLst>
               <a:ext uri="{FF2B5EF4-FFF2-40B4-BE49-F238E27FC236}">
-                <a16:creationId xmlns:a16="http://schemas.microsoft.com/office/drawing/2014/main" xmlns="" id="{28509D93-430C-41BC-9836-AB44C089F33F}"/>
+                <a16:creationId xmlns="" xmlns:a16="http://schemas.microsoft.com/office/drawing/2014/main" id="{28509D93-430C-41BC-9836-AB44C089F33F}"/>
               </a:ext>
             </a:extLst>
           </p:cNvPr>
@@ -11763,7 +11804,7 @@
           <p:cNvPr id="2" name="图片 1">
             <a:extLst>
               <a:ext uri="{FF2B5EF4-FFF2-40B4-BE49-F238E27FC236}">
-                <a16:creationId xmlns:a16="http://schemas.microsoft.com/office/drawing/2014/main" xmlns="" id="{29492C5B-6DC3-4923-B4D8-7044D359FC75}"/>
+                <a16:creationId xmlns="" xmlns:a16="http://schemas.microsoft.com/office/drawing/2014/main" id="{29492C5B-6DC3-4923-B4D8-7044D359FC75}"/>
               </a:ext>
             </a:extLst>
           </p:cNvPr>
@@ -12364,7 +12405,7 @@
           <p:cNvPr id="2" name="矩形 1">
             <a:extLst>
               <a:ext uri="{FF2B5EF4-FFF2-40B4-BE49-F238E27FC236}">
-                <a16:creationId xmlns:a16="http://schemas.microsoft.com/office/drawing/2014/main" xmlns="" id="{5AA56607-0C89-4FF1-8AB4-472D95F1B685}"/>
+                <a16:creationId xmlns="" xmlns:a16="http://schemas.microsoft.com/office/drawing/2014/main" id="{5AA56607-0C89-4FF1-8AB4-472D95F1B685}"/>
               </a:ext>
             </a:extLst>
           </p:cNvPr>
@@ -12419,7 +12460,7 @@
           <p:cNvPr id="3" name="矩形 2">
             <a:extLst>
               <a:ext uri="{FF2B5EF4-FFF2-40B4-BE49-F238E27FC236}">
-                <a16:creationId xmlns:a16="http://schemas.microsoft.com/office/drawing/2014/main" xmlns="" id="{93FA19D6-7D78-400C-AFE8-B4CB85F1F3F9}"/>
+                <a16:creationId xmlns="" xmlns:a16="http://schemas.microsoft.com/office/drawing/2014/main" id="{93FA19D6-7D78-400C-AFE8-B4CB85F1F3F9}"/>
               </a:ext>
             </a:extLst>
           </p:cNvPr>
@@ -12479,7 +12520,7 @@
           <p:cNvPr id="4" name="矩形 3">
             <a:extLst>
               <a:ext uri="{FF2B5EF4-FFF2-40B4-BE49-F238E27FC236}">
-                <a16:creationId xmlns:a16="http://schemas.microsoft.com/office/drawing/2014/main" xmlns="" id="{4326502D-B9DC-4521-B99A-B7267B06EADE}"/>
+                <a16:creationId xmlns="" xmlns:a16="http://schemas.microsoft.com/office/drawing/2014/main" id="{4326502D-B9DC-4521-B99A-B7267B06EADE}"/>
               </a:ext>
             </a:extLst>
           </p:cNvPr>
@@ -12539,7 +12580,7 @@
           <p:cNvPr id="5" name="矩形 4">
             <a:extLst>
               <a:ext uri="{FF2B5EF4-FFF2-40B4-BE49-F238E27FC236}">
-                <a16:creationId xmlns:a16="http://schemas.microsoft.com/office/drawing/2014/main" xmlns="" id="{C9A5A6DE-45E3-4897-8D25-37BE4F889C5B}"/>
+                <a16:creationId xmlns="" xmlns:a16="http://schemas.microsoft.com/office/drawing/2014/main" id="{C9A5A6DE-45E3-4897-8D25-37BE4F889C5B}"/>
               </a:ext>
             </a:extLst>
           </p:cNvPr>
@@ -12596,7 +12637,7 @@
           <p:cNvPr id="15" name="矩形 14">
             <a:extLst>
               <a:ext uri="{FF2B5EF4-FFF2-40B4-BE49-F238E27FC236}">
-                <a16:creationId xmlns:a16="http://schemas.microsoft.com/office/drawing/2014/main" xmlns="" id="{C9A5A6DE-45E3-4897-8D25-37BE4F889C5B}"/>
+                <a16:creationId xmlns="" xmlns:a16="http://schemas.microsoft.com/office/drawing/2014/main" id="{C9A5A6DE-45E3-4897-8D25-37BE4F889C5B}"/>
               </a:ext>
             </a:extLst>
           </p:cNvPr>
@@ -12653,7 +12694,7 @@
           <p:cNvPr id="18" name="矩形: 圆角 6">
             <a:extLst>
               <a:ext uri="{FF2B5EF4-FFF2-40B4-BE49-F238E27FC236}">
-                <a16:creationId xmlns:a16="http://schemas.microsoft.com/office/drawing/2014/main" xmlns="" id="{942A04B4-2387-4E00-940C-771209097755}"/>
+                <a16:creationId xmlns="" xmlns:a16="http://schemas.microsoft.com/office/drawing/2014/main" id="{942A04B4-2387-4E00-940C-771209097755}"/>
               </a:ext>
             </a:extLst>
           </p:cNvPr>
@@ -12711,7 +12752,7 @@
           <p:cNvPr id="19" name="矩形 18">
             <a:extLst>
               <a:ext uri="{FF2B5EF4-FFF2-40B4-BE49-F238E27FC236}">
-                <a16:creationId xmlns:a16="http://schemas.microsoft.com/office/drawing/2014/main" xmlns="" id="{93FA19D6-7D78-400C-AFE8-B4CB85F1F3F9}"/>
+                <a16:creationId xmlns="" xmlns:a16="http://schemas.microsoft.com/office/drawing/2014/main" id="{93FA19D6-7D78-400C-AFE8-B4CB85F1F3F9}"/>
               </a:ext>
             </a:extLst>
           </p:cNvPr>
@@ -12768,7 +12809,7 @@
           <p:cNvPr id="21" name="矩形: 圆角 6">
             <a:extLst>
               <a:ext uri="{FF2B5EF4-FFF2-40B4-BE49-F238E27FC236}">
-                <a16:creationId xmlns:a16="http://schemas.microsoft.com/office/drawing/2014/main" xmlns="" id="{942A04B4-2387-4E00-940C-771209097755}"/>
+                <a16:creationId xmlns="" xmlns:a16="http://schemas.microsoft.com/office/drawing/2014/main" id="{942A04B4-2387-4E00-940C-771209097755}"/>
               </a:ext>
             </a:extLst>
           </p:cNvPr>
@@ -12825,7 +12866,7 @@
           <p:cNvPr id="23" name="矩形: 圆角 6">
             <a:extLst>
               <a:ext uri="{FF2B5EF4-FFF2-40B4-BE49-F238E27FC236}">
-                <a16:creationId xmlns:a16="http://schemas.microsoft.com/office/drawing/2014/main" xmlns="" id="{942A04B4-2387-4E00-940C-771209097755}"/>
+                <a16:creationId xmlns="" xmlns:a16="http://schemas.microsoft.com/office/drawing/2014/main" id="{942A04B4-2387-4E00-940C-771209097755}"/>
               </a:ext>
             </a:extLst>
           </p:cNvPr>
@@ -12886,7 +12927,7 @@
           <p:cNvPr id="24" name="矩形: 圆角 6">
             <a:extLst>
               <a:ext uri="{FF2B5EF4-FFF2-40B4-BE49-F238E27FC236}">
-                <a16:creationId xmlns:a16="http://schemas.microsoft.com/office/drawing/2014/main" xmlns="" id="{942A04B4-2387-4E00-940C-771209097755}"/>
+                <a16:creationId xmlns="" xmlns:a16="http://schemas.microsoft.com/office/drawing/2014/main" id="{942A04B4-2387-4E00-940C-771209097755}"/>
               </a:ext>
             </a:extLst>
           </p:cNvPr>
@@ -12943,7 +12984,7 @@
           <p:cNvPr id="25" name="矩形 24">
             <a:extLst>
               <a:ext uri="{FF2B5EF4-FFF2-40B4-BE49-F238E27FC236}">
-                <a16:creationId xmlns:a16="http://schemas.microsoft.com/office/drawing/2014/main" xmlns="" id="{BB0C55E0-545C-4D77-B964-911EF85975A8}"/>
+                <a16:creationId xmlns="" xmlns:a16="http://schemas.microsoft.com/office/drawing/2014/main" id="{BB0C55E0-545C-4D77-B964-911EF85975A8}"/>
               </a:ext>
             </a:extLst>
           </p:cNvPr>
@@ -13000,7 +13041,7 @@
           <p:cNvPr id="13" name="矩形: 圆角 6">
             <a:extLst>
               <a:ext uri="{FF2B5EF4-FFF2-40B4-BE49-F238E27FC236}">
-                <a16:creationId xmlns:a16="http://schemas.microsoft.com/office/drawing/2014/main" xmlns="" id="{942A04B4-2387-4E00-940C-771209097755}"/>
+                <a16:creationId xmlns="" xmlns:a16="http://schemas.microsoft.com/office/drawing/2014/main" id="{942A04B4-2387-4E00-940C-771209097755}"/>
               </a:ext>
             </a:extLst>
           </p:cNvPr>
@@ -13057,7 +13098,7 @@
           <p:cNvPr id="14" name="矩形: 圆角 6">
             <a:extLst>
               <a:ext uri="{FF2B5EF4-FFF2-40B4-BE49-F238E27FC236}">
-                <a16:creationId xmlns:a16="http://schemas.microsoft.com/office/drawing/2014/main" xmlns="" id="{942A04B4-2387-4E00-940C-771209097755}"/>
+                <a16:creationId xmlns="" xmlns:a16="http://schemas.microsoft.com/office/drawing/2014/main" id="{942A04B4-2387-4E00-940C-771209097755}"/>
               </a:ext>
             </a:extLst>
           </p:cNvPr>
@@ -13114,7 +13155,7 @@
           <p:cNvPr id="16" name="直接连接符 15">
             <a:extLst>
               <a:ext uri="{FF2B5EF4-FFF2-40B4-BE49-F238E27FC236}">
-                <a16:creationId xmlns:a16="http://schemas.microsoft.com/office/drawing/2014/main" xmlns="" id="{C94951D2-8DD4-42C0-A481-97E6C25A33B7}"/>
+                <a16:creationId xmlns="" xmlns:a16="http://schemas.microsoft.com/office/drawing/2014/main" id="{C94951D2-8DD4-42C0-A481-97E6C25A33B7}"/>
               </a:ext>
             </a:extLst>
           </p:cNvPr>
@@ -13158,7 +13199,7 @@
           <p:cNvPr id="17" name="直接连接符 16">
             <a:extLst>
               <a:ext uri="{FF2B5EF4-FFF2-40B4-BE49-F238E27FC236}">
-                <a16:creationId xmlns:a16="http://schemas.microsoft.com/office/drawing/2014/main" xmlns="" id="{C94951D2-8DD4-42C0-A481-97E6C25A33B7}"/>
+                <a16:creationId xmlns="" xmlns:a16="http://schemas.microsoft.com/office/drawing/2014/main" id="{C94951D2-8DD4-42C0-A481-97E6C25A33B7}"/>
               </a:ext>
             </a:extLst>
           </p:cNvPr>
@@ -13239,7 +13280,7 @@
           <p:cNvPr id="20" name="矩形 19">
             <a:extLst>
               <a:ext uri="{FF2B5EF4-FFF2-40B4-BE49-F238E27FC236}">
-                <a16:creationId xmlns:a16="http://schemas.microsoft.com/office/drawing/2014/main" xmlns="" id="{F29A3D16-7342-466D-969F-F25F200F859D}"/>
+                <a16:creationId xmlns="" xmlns:a16="http://schemas.microsoft.com/office/drawing/2014/main" id="{F29A3D16-7342-466D-969F-F25F200F859D}"/>
               </a:ext>
             </a:extLst>
           </p:cNvPr>
@@ -13274,7 +13315,7 @@
           <p:cNvPr id="22" name="直接连接符 21">
             <a:extLst>
               <a:ext uri="{FF2B5EF4-FFF2-40B4-BE49-F238E27FC236}">
-                <a16:creationId xmlns:a16="http://schemas.microsoft.com/office/drawing/2014/main" xmlns="" id="{C94951D2-8DD4-42C0-A481-97E6C25A33B7}"/>
+                <a16:creationId xmlns="" xmlns:a16="http://schemas.microsoft.com/office/drawing/2014/main" id="{C94951D2-8DD4-42C0-A481-97E6C25A33B7}"/>
               </a:ext>
             </a:extLst>
           </p:cNvPr>
@@ -13355,7 +13396,7 @@
           <p:cNvPr id="27" name="矩形 26">
             <a:extLst>
               <a:ext uri="{FF2B5EF4-FFF2-40B4-BE49-F238E27FC236}">
-                <a16:creationId xmlns:a16="http://schemas.microsoft.com/office/drawing/2014/main" xmlns="" id="{F29A3D16-7342-466D-969F-F25F200F859D}"/>
+                <a16:creationId xmlns="" xmlns:a16="http://schemas.microsoft.com/office/drawing/2014/main" id="{F29A3D16-7342-466D-969F-F25F200F859D}"/>
               </a:ext>
             </a:extLst>
           </p:cNvPr>
@@ -13390,7 +13431,7 @@
           <p:cNvPr id="28" name="直接连接符 27">
             <a:extLst>
               <a:ext uri="{FF2B5EF4-FFF2-40B4-BE49-F238E27FC236}">
-                <a16:creationId xmlns:a16="http://schemas.microsoft.com/office/drawing/2014/main" xmlns="" id="{C94951D2-8DD4-42C0-A481-97E6C25A33B7}"/>
+                <a16:creationId xmlns="" xmlns:a16="http://schemas.microsoft.com/office/drawing/2014/main" id="{C94951D2-8DD4-42C0-A481-97E6C25A33B7}"/>
               </a:ext>
             </a:extLst>
           </p:cNvPr>
@@ -13434,7 +13475,7 @@
           <p:cNvPr id="29" name="右大括号 28">
             <a:extLst>
               <a:ext uri="{FF2B5EF4-FFF2-40B4-BE49-F238E27FC236}">
-                <a16:creationId xmlns:a16="http://schemas.microsoft.com/office/drawing/2014/main" xmlns="" id="{65D7FD4A-9DB7-4403-B6AC-B18D53706051}"/>
+                <a16:creationId xmlns="" xmlns:a16="http://schemas.microsoft.com/office/drawing/2014/main" id="{65D7FD4A-9DB7-4403-B6AC-B18D53706051}"/>
               </a:ext>
             </a:extLst>
           </p:cNvPr>
@@ -13486,7 +13527,7 @@
           <p:cNvPr id="30" name="矩形 29">
             <a:extLst>
               <a:ext uri="{FF2B5EF4-FFF2-40B4-BE49-F238E27FC236}">
-                <a16:creationId xmlns:a16="http://schemas.microsoft.com/office/drawing/2014/main" xmlns="" id="{F29A3D16-7342-466D-969F-F25F200F859D}"/>
+                <a16:creationId xmlns="" xmlns:a16="http://schemas.microsoft.com/office/drawing/2014/main" id="{F29A3D16-7342-466D-969F-F25F200F859D}"/>
               </a:ext>
             </a:extLst>
           </p:cNvPr>
@@ -13521,7 +13562,7 @@
           <p:cNvPr id="31" name="直接连接符 30">
             <a:extLst>
               <a:ext uri="{FF2B5EF4-FFF2-40B4-BE49-F238E27FC236}">
-                <a16:creationId xmlns:a16="http://schemas.microsoft.com/office/drawing/2014/main" xmlns="" id="{C94951D2-8DD4-42C0-A481-97E6C25A33B7}"/>
+                <a16:creationId xmlns="" xmlns:a16="http://schemas.microsoft.com/office/drawing/2014/main" id="{C94951D2-8DD4-42C0-A481-97E6C25A33B7}"/>
               </a:ext>
             </a:extLst>
           </p:cNvPr>
@@ -13565,7 +13606,7 @@
           <p:cNvPr id="33" name="直接连接符 32">
             <a:extLst>
               <a:ext uri="{FF2B5EF4-FFF2-40B4-BE49-F238E27FC236}">
-                <a16:creationId xmlns:a16="http://schemas.microsoft.com/office/drawing/2014/main" xmlns="" id="{C94951D2-8DD4-42C0-A481-97E6C25A33B7}"/>
+                <a16:creationId xmlns="" xmlns:a16="http://schemas.microsoft.com/office/drawing/2014/main" id="{C94951D2-8DD4-42C0-A481-97E6C25A33B7}"/>
               </a:ext>
             </a:extLst>
           </p:cNvPr>
@@ -13609,7 +13650,7 @@
           <p:cNvPr id="34" name="直接连接符 33">
             <a:extLst>
               <a:ext uri="{FF2B5EF4-FFF2-40B4-BE49-F238E27FC236}">
-                <a16:creationId xmlns:a16="http://schemas.microsoft.com/office/drawing/2014/main" xmlns="" id="{C94951D2-8DD4-42C0-A481-97E6C25A33B7}"/>
+                <a16:creationId xmlns="" xmlns:a16="http://schemas.microsoft.com/office/drawing/2014/main" id="{C94951D2-8DD4-42C0-A481-97E6C25A33B7}"/>
               </a:ext>
             </a:extLst>
           </p:cNvPr>
@@ -13653,7 +13694,7 @@
           <p:cNvPr id="36" name="直接连接符 35">
             <a:extLst>
               <a:ext uri="{FF2B5EF4-FFF2-40B4-BE49-F238E27FC236}">
-                <a16:creationId xmlns:a16="http://schemas.microsoft.com/office/drawing/2014/main" xmlns="" id="{C94951D2-8DD4-42C0-A481-97E6C25A33B7}"/>
+                <a16:creationId xmlns="" xmlns:a16="http://schemas.microsoft.com/office/drawing/2014/main" id="{C94951D2-8DD4-42C0-A481-97E6C25A33B7}"/>
               </a:ext>
             </a:extLst>
           </p:cNvPr>
@@ -13697,7 +13738,7 @@
           <p:cNvPr id="38" name="右大括号 37">
             <a:extLst>
               <a:ext uri="{FF2B5EF4-FFF2-40B4-BE49-F238E27FC236}">
-                <a16:creationId xmlns:a16="http://schemas.microsoft.com/office/drawing/2014/main" xmlns="" id="{65D7FD4A-9DB7-4403-B6AC-B18D53706051}"/>
+                <a16:creationId xmlns="" xmlns:a16="http://schemas.microsoft.com/office/drawing/2014/main" id="{65D7FD4A-9DB7-4403-B6AC-B18D53706051}"/>
               </a:ext>
             </a:extLst>
           </p:cNvPr>
@@ -13749,7 +13790,7 @@
           <p:cNvPr id="39" name="矩形 38">
             <a:extLst>
               <a:ext uri="{FF2B5EF4-FFF2-40B4-BE49-F238E27FC236}">
-                <a16:creationId xmlns:a16="http://schemas.microsoft.com/office/drawing/2014/main" xmlns="" id="{F29A3D16-7342-466D-969F-F25F200F859D}"/>
+                <a16:creationId xmlns="" xmlns:a16="http://schemas.microsoft.com/office/drawing/2014/main" id="{F29A3D16-7342-466D-969F-F25F200F859D}"/>
               </a:ext>
             </a:extLst>
           </p:cNvPr>
@@ -14018,7 +14059,7 @@
           <p:cNvPr id="45" name="直接连接符 44">
             <a:extLst>
               <a:ext uri="{FF2B5EF4-FFF2-40B4-BE49-F238E27FC236}">
-                <a16:creationId xmlns:a16="http://schemas.microsoft.com/office/drawing/2014/main" xmlns="" id="{C94951D2-8DD4-42C0-A481-97E6C25A33B7}"/>
+                <a16:creationId xmlns="" xmlns:a16="http://schemas.microsoft.com/office/drawing/2014/main" id="{C94951D2-8DD4-42C0-A481-97E6C25A33B7}"/>
               </a:ext>
             </a:extLst>
           </p:cNvPr>
@@ -14099,7 +14140,7 @@
           <p:cNvPr id="48" name="矩形 47">
             <a:extLst>
               <a:ext uri="{FF2B5EF4-FFF2-40B4-BE49-F238E27FC236}">
-                <a16:creationId xmlns:a16="http://schemas.microsoft.com/office/drawing/2014/main" xmlns="" id="{F29A3D16-7342-466D-969F-F25F200F859D}"/>
+                <a16:creationId xmlns="" xmlns:a16="http://schemas.microsoft.com/office/drawing/2014/main" id="{F29A3D16-7342-466D-969F-F25F200F859D}"/>
               </a:ext>
             </a:extLst>
           </p:cNvPr>
@@ -14421,7 +14462,7 @@
           <p:cNvPr id="55" name="右大括号 54">
             <a:extLst>
               <a:ext uri="{FF2B5EF4-FFF2-40B4-BE49-F238E27FC236}">
-                <a16:creationId xmlns:a16="http://schemas.microsoft.com/office/drawing/2014/main" xmlns="" id="{65D7FD4A-9DB7-4403-B6AC-B18D53706051}"/>
+                <a16:creationId xmlns="" xmlns:a16="http://schemas.microsoft.com/office/drawing/2014/main" id="{65D7FD4A-9DB7-4403-B6AC-B18D53706051}"/>
               </a:ext>
             </a:extLst>
           </p:cNvPr>
@@ -14473,7 +14514,7 @@
           <p:cNvPr id="56" name="矩形 55">
             <a:extLst>
               <a:ext uri="{FF2B5EF4-FFF2-40B4-BE49-F238E27FC236}">
-                <a16:creationId xmlns:a16="http://schemas.microsoft.com/office/drawing/2014/main" xmlns="" id="{F29A3D16-7342-466D-969F-F25F200F859D}"/>
+                <a16:creationId xmlns="" xmlns:a16="http://schemas.microsoft.com/office/drawing/2014/main" id="{F29A3D16-7342-466D-969F-F25F200F859D}"/>
               </a:ext>
             </a:extLst>
           </p:cNvPr>
@@ -14508,7 +14549,7 @@
           <p:cNvPr id="59" name="矩形 58">
             <a:extLst>
               <a:ext uri="{FF2B5EF4-FFF2-40B4-BE49-F238E27FC236}">
-                <a16:creationId xmlns:a16="http://schemas.microsoft.com/office/drawing/2014/main" xmlns="" id="{F29A3D16-7342-466D-969F-F25F200F859D}"/>
+                <a16:creationId xmlns="" xmlns:a16="http://schemas.microsoft.com/office/drawing/2014/main" id="{F29A3D16-7342-466D-969F-F25F200F859D}"/>
               </a:ext>
             </a:extLst>
           </p:cNvPr>
@@ -14543,7 +14584,7 @@
           <p:cNvPr id="60" name="矩形 59">
             <a:extLst>
               <a:ext uri="{FF2B5EF4-FFF2-40B4-BE49-F238E27FC236}">
-                <a16:creationId xmlns:a16="http://schemas.microsoft.com/office/drawing/2014/main" xmlns="" id="{F29A3D16-7342-466D-969F-F25F200F859D}"/>
+                <a16:creationId xmlns="" xmlns:a16="http://schemas.microsoft.com/office/drawing/2014/main" id="{F29A3D16-7342-466D-969F-F25F200F859D}"/>
               </a:ext>
             </a:extLst>
           </p:cNvPr>
@@ -14578,7 +14619,7 @@
           <p:cNvPr id="61" name="矩形 60">
             <a:extLst>
               <a:ext uri="{FF2B5EF4-FFF2-40B4-BE49-F238E27FC236}">
-                <a16:creationId xmlns:a16="http://schemas.microsoft.com/office/drawing/2014/main" xmlns="" id="{F29A3D16-7342-466D-969F-F25F200F859D}"/>
+                <a16:creationId xmlns="" xmlns:a16="http://schemas.microsoft.com/office/drawing/2014/main" id="{F29A3D16-7342-466D-969F-F25F200F859D}"/>
               </a:ext>
             </a:extLst>
           </p:cNvPr>
@@ -14613,7 +14654,7 @@
           <p:cNvPr id="62" name="矩形 61">
             <a:extLst>
               <a:ext uri="{FF2B5EF4-FFF2-40B4-BE49-F238E27FC236}">
-                <a16:creationId xmlns:a16="http://schemas.microsoft.com/office/drawing/2014/main" xmlns="" id="{F29A3D16-7342-466D-969F-F25F200F859D}"/>
+                <a16:creationId xmlns="" xmlns:a16="http://schemas.microsoft.com/office/drawing/2014/main" id="{F29A3D16-7342-466D-969F-F25F200F859D}"/>
               </a:ext>
             </a:extLst>
           </p:cNvPr>
@@ -14648,7 +14689,7 @@
           <p:cNvPr id="63" name="矩形 62">
             <a:extLst>
               <a:ext uri="{FF2B5EF4-FFF2-40B4-BE49-F238E27FC236}">
-                <a16:creationId xmlns:a16="http://schemas.microsoft.com/office/drawing/2014/main" xmlns="" id="{F29A3D16-7342-466D-969F-F25F200F859D}"/>
+                <a16:creationId xmlns="" xmlns:a16="http://schemas.microsoft.com/office/drawing/2014/main" id="{F29A3D16-7342-466D-969F-F25F200F859D}"/>
               </a:ext>
             </a:extLst>
           </p:cNvPr>
@@ -14683,7 +14724,7 @@
           <p:cNvPr id="64" name="矩形 63">
             <a:extLst>
               <a:ext uri="{FF2B5EF4-FFF2-40B4-BE49-F238E27FC236}">
-                <a16:creationId xmlns:a16="http://schemas.microsoft.com/office/drawing/2014/main" xmlns="" id="{F29A3D16-7342-466D-969F-F25F200F859D}"/>
+                <a16:creationId xmlns="" xmlns:a16="http://schemas.microsoft.com/office/drawing/2014/main" id="{F29A3D16-7342-466D-969F-F25F200F859D}"/>
               </a:ext>
             </a:extLst>
           </p:cNvPr>
@@ -14748,7 +14789,7 @@
           <p:cNvPr id="2" name="矩形 1">
             <a:extLst>
               <a:ext uri="{FF2B5EF4-FFF2-40B4-BE49-F238E27FC236}">
-                <a16:creationId xmlns:a16="http://schemas.microsoft.com/office/drawing/2014/main" xmlns="" id="{C8A7849E-911B-40F9-B477-855AD6CBB0E9}"/>
+                <a16:creationId xmlns="" xmlns:a16="http://schemas.microsoft.com/office/drawing/2014/main" id="{C8A7849E-911B-40F9-B477-855AD6CBB0E9}"/>
               </a:ext>
             </a:extLst>
           </p:cNvPr>
@@ -14792,7 +14833,7 @@
           <p:cNvPr id="3" name="矩形 2">
             <a:extLst>
               <a:ext uri="{FF2B5EF4-FFF2-40B4-BE49-F238E27FC236}">
-                <a16:creationId xmlns:a16="http://schemas.microsoft.com/office/drawing/2014/main" xmlns="" id="{E9F94B9D-BB0B-459C-8DBD-791D64A21734}"/>
+                <a16:creationId xmlns="" xmlns:a16="http://schemas.microsoft.com/office/drawing/2014/main" id="{E9F94B9D-BB0B-459C-8DBD-791D64A21734}"/>
               </a:ext>
             </a:extLst>
           </p:cNvPr>
@@ -14840,7 +14881,7 @@
           <p:cNvPr id="4" name="矩形 3">
             <a:extLst>
               <a:ext uri="{FF2B5EF4-FFF2-40B4-BE49-F238E27FC236}">
-                <a16:creationId xmlns:a16="http://schemas.microsoft.com/office/drawing/2014/main" xmlns="" id="{50EE0DB5-02E1-4FEA-A897-2CA60F7ADC82}"/>
+                <a16:creationId xmlns="" xmlns:a16="http://schemas.microsoft.com/office/drawing/2014/main" id="{50EE0DB5-02E1-4FEA-A897-2CA60F7ADC82}"/>
               </a:ext>
             </a:extLst>
           </p:cNvPr>
@@ -14884,7 +14925,7 @@
           <p:cNvPr id="5" name="矩形 4">
             <a:extLst>
               <a:ext uri="{FF2B5EF4-FFF2-40B4-BE49-F238E27FC236}">
-                <a16:creationId xmlns:a16="http://schemas.microsoft.com/office/drawing/2014/main" xmlns="" id="{549F3974-0797-4C3A-A982-29204D3A521D}"/>
+                <a16:creationId xmlns="" xmlns:a16="http://schemas.microsoft.com/office/drawing/2014/main" id="{549F3974-0797-4C3A-A982-29204D3A521D}"/>
               </a:ext>
             </a:extLst>
           </p:cNvPr>
@@ -14932,7 +14973,7 @@
           <p:cNvPr id="6" name="矩形 5">
             <a:extLst>
               <a:ext uri="{FF2B5EF4-FFF2-40B4-BE49-F238E27FC236}">
-                <a16:creationId xmlns:a16="http://schemas.microsoft.com/office/drawing/2014/main" xmlns="" id="{A57BCBF1-AEE7-4F2A-A92F-903B9E59F31D}"/>
+                <a16:creationId xmlns="" xmlns:a16="http://schemas.microsoft.com/office/drawing/2014/main" id="{A57BCBF1-AEE7-4F2A-A92F-903B9E59F31D}"/>
               </a:ext>
             </a:extLst>
           </p:cNvPr>
@@ -14976,7 +15017,7 @@
           <p:cNvPr id="7" name="矩形 6">
             <a:extLst>
               <a:ext uri="{FF2B5EF4-FFF2-40B4-BE49-F238E27FC236}">
-                <a16:creationId xmlns:a16="http://schemas.microsoft.com/office/drawing/2014/main" xmlns="" id="{8F89BA29-172E-4CE6-833C-6AA55D79292A}"/>
+                <a16:creationId xmlns="" xmlns:a16="http://schemas.microsoft.com/office/drawing/2014/main" id="{8F89BA29-172E-4CE6-833C-6AA55D79292A}"/>
               </a:ext>
             </a:extLst>
           </p:cNvPr>
@@ -15020,7 +15061,7 @@
           <p:cNvPr id="8" name="矩形 7">
             <a:extLst>
               <a:ext uri="{FF2B5EF4-FFF2-40B4-BE49-F238E27FC236}">
-                <a16:creationId xmlns:a16="http://schemas.microsoft.com/office/drawing/2014/main" xmlns="" id="{0AD12FC3-820C-4FC2-BBC1-9FDD8E9176B3}"/>
+                <a16:creationId xmlns="" xmlns:a16="http://schemas.microsoft.com/office/drawing/2014/main" id="{0AD12FC3-820C-4FC2-BBC1-9FDD8E9176B3}"/>
               </a:ext>
             </a:extLst>
           </p:cNvPr>
@@ -15064,7 +15105,7 @@
           <p:cNvPr id="9" name="矩形 8">
             <a:extLst>
               <a:ext uri="{FF2B5EF4-FFF2-40B4-BE49-F238E27FC236}">
-                <a16:creationId xmlns:a16="http://schemas.microsoft.com/office/drawing/2014/main" xmlns="" id="{B111B6EA-9B21-424D-9CB1-1E62EBE0FEEF}"/>
+                <a16:creationId xmlns="" xmlns:a16="http://schemas.microsoft.com/office/drawing/2014/main" id="{B111B6EA-9B21-424D-9CB1-1E62EBE0FEEF}"/>
               </a:ext>
             </a:extLst>
           </p:cNvPr>
@@ -15108,7 +15149,7 @@
           <p:cNvPr id="10" name="矩形 9">
             <a:extLst>
               <a:ext uri="{FF2B5EF4-FFF2-40B4-BE49-F238E27FC236}">
-                <a16:creationId xmlns:a16="http://schemas.microsoft.com/office/drawing/2014/main" xmlns="" id="{47A28AEB-AA40-45D4-9A9B-9B033777DF62}"/>
+                <a16:creationId xmlns="" xmlns:a16="http://schemas.microsoft.com/office/drawing/2014/main" id="{47A28AEB-AA40-45D4-9A9B-9B033777DF62}"/>
               </a:ext>
             </a:extLst>
           </p:cNvPr>
@@ -15152,7 +15193,7 @@
           <p:cNvPr id="12" name="椭圆 11">
             <a:extLst>
               <a:ext uri="{FF2B5EF4-FFF2-40B4-BE49-F238E27FC236}">
-                <a16:creationId xmlns:a16="http://schemas.microsoft.com/office/drawing/2014/main" xmlns="" id="{88B95B7A-8B6D-45F8-A8BA-14670F0D57EF}"/>
+                <a16:creationId xmlns="" xmlns:a16="http://schemas.microsoft.com/office/drawing/2014/main" id="{88B95B7A-8B6D-45F8-A8BA-14670F0D57EF}"/>
               </a:ext>
             </a:extLst>
           </p:cNvPr>
@@ -15197,7 +15238,7 @@
           <p:cNvPr id="13" name="椭圆 12">
             <a:extLst>
               <a:ext uri="{FF2B5EF4-FFF2-40B4-BE49-F238E27FC236}">
-                <a16:creationId xmlns:a16="http://schemas.microsoft.com/office/drawing/2014/main" xmlns="" id="{FF716F28-C68B-4D0D-84F6-D3621853F5C3}"/>
+                <a16:creationId xmlns="" xmlns:a16="http://schemas.microsoft.com/office/drawing/2014/main" id="{FF716F28-C68B-4D0D-84F6-D3621853F5C3}"/>
               </a:ext>
             </a:extLst>
           </p:cNvPr>
@@ -15241,7 +15282,7 @@
           <p:cNvPr id="14" name="椭圆 13">
             <a:extLst>
               <a:ext uri="{FF2B5EF4-FFF2-40B4-BE49-F238E27FC236}">
-                <a16:creationId xmlns:a16="http://schemas.microsoft.com/office/drawing/2014/main" xmlns="" id="{63B834B8-F3CA-4FDA-81FC-4491AB8A543A}"/>
+                <a16:creationId xmlns="" xmlns:a16="http://schemas.microsoft.com/office/drawing/2014/main" id="{63B834B8-F3CA-4FDA-81FC-4491AB8A543A}"/>
               </a:ext>
             </a:extLst>
           </p:cNvPr>
@@ -15285,7 +15326,7 @@
           <p:cNvPr id="15" name="椭圆 14">
             <a:extLst>
               <a:ext uri="{FF2B5EF4-FFF2-40B4-BE49-F238E27FC236}">
-                <a16:creationId xmlns:a16="http://schemas.microsoft.com/office/drawing/2014/main" xmlns="" id="{A19C592B-C565-4693-A332-40BA5C7F1629}"/>
+                <a16:creationId xmlns="" xmlns:a16="http://schemas.microsoft.com/office/drawing/2014/main" id="{A19C592B-C565-4693-A332-40BA5C7F1629}"/>
               </a:ext>
             </a:extLst>
           </p:cNvPr>
@@ -15330,7 +15371,7 @@
           <p:cNvPr id="16" name="矩形 15">
             <a:extLst>
               <a:ext uri="{FF2B5EF4-FFF2-40B4-BE49-F238E27FC236}">
-                <a16:creationId xmlns:a16="http://schemas.microsoft.com/office/drawing/2014/main" xmlns="" id="{C0028BF5-4C0C-4F62-B90E-74F162D5CB65}"/>
+                <a16:creationId xmlns="" xmlns:a16="http://schemas.microsoft.com/office/drawing/2014/main" id="{C0028BF5-4C0C-4F62-B90E-74F162D5CB65}"/>
               </a:ext>
             </a:extLst>
           </p:cNvPr>
@@ -15378,7 +15419,7 @@
           <p:cNvPr id="17" name="矩形 16">
             <a:extLst>
               <a:ext uri="{FF2B5EF4-FFF2-40B4-BE49-F238E27FC236}">
-                <a16:creationId xmlns:a16="http://schemas.microsoft.com/office/drawing/2014/main" xmlns="" id="{AAB4CE55-6534-4A28-823C-DF125D3B5132}"/>
+                <a16:creationId xmlns="" xmlns:a16="http://schemas.microsoft.com/office/drawing/2014/main" id="{AAB4CE55-6534-4A28-823C-DF125D3B5132}"/>
               </a:ext>
             </a:extLst>
           </p:cNvPr>
@@ -15433,7 +15474,7 @@
           <p:cNvPr id="18" name="矩形 17">
             <a:extLst>
               <a:ext uri="{FF2B5EF4-FFF2-40B4-BE49-F238E27FC236}">
-                <a16:creationId xmlns:a16="http://schemas.microsoft.com/office/drawing/2014/main" xmlns="" id="{DDC3A7B4-6494-4704-AEE9-9E1F0A46897B}"/>
+                <a16:creationId xmlns="" xmlns:a16="http://schemas.microsoft.com/office/drawing/2014/main" id="{DDC3A7B4-6494-4704-AEE9-9E1F0A46897B}"/>
               </a:ext>
             </a:extLst>
           </p:cNvPr>
@@ -15488,7 +15529,7 @@
           <p:cNvPr id="19" name="矩形 18">
             <a:extLst>
               <a:ext uri="{FF2B5EF4-FFF2-40B4-BE49-F238E27FC236}">
-                <a16:creationId xmlns:a16="http://schemas.microsoft.com/office/drawing/2014/main" xmlns="" id="{33718A82-7A61-4BD6-A0AE-69103684CE5F}"/>
+                <a16:creationId xmlns="" xmlns:a16="http://schemas.microsoft.com/office/drawing/2014/main" id="{33718A82-7A61-4BD6-A0AE-69103684CE5F}"/>
               </a:ext>
             </a:extLst>
           </p:cNvPr>
@@ -15531,7 +15572,7 @@
           <p:cNvPr id="20" name="矩形 19">
             <a:extLst>
               <a:ext uri="{FF2B5EF4-FFF2-40B4-BE49-F238E27FC236}">
-                <a16:creationId xmlns:a16="http://schemas.microsoft.com/office/drawing/2014/main" xmlns="" id="{C4011502-A762-4BA2-A75C-112E15BEDD08}"/>
+                <a16:creationId xmlns="" xmlns:a16="http://schemas.microsoft.com/office/drawing/2014/main" id="{C4011502-A762-4BA2-A75C-112E15BEDD08}"/>
               </a:ext>
             </a:extLst>
           </p:cNvPr>
@@ -15574,7 +15615,7 @@
           <p:cNvPr id="21" name="矩形 20">
             <a:extLst>
               <a:ext uri="{FF2B5EF4-FFF2-40B4-BE49-F238E27FC236}">
-                <a16:creationId xmlns:a16="http://schemas.microsoft.com/office/drawing/2014/main" xmlns="" id="{6797A39C-8E65-4555-B3A4-DBC0352578F3}"/>
+                <a16:creationId xmlns="" xmlns:a16="http://schemas.microsoft.com/office/drawing/2014/main" id="{6797A39C-8E65-4555-B3A4-DBC0352578F3}"/>
               </a:ext>
             </a:extLst>
           </p:cNvPr>
@@ -15616,7 +15657,7 @@
           <p:cNvPr id="22" name="矩形 21">
             <a:extLst>
               <a:ext uri="{FF2B5EF4-FFF2-40B4-BE49-F238E27FC236}">
-                <a16:creationId xmlns:a16="http://schemas.microsoft.com/office/drawing/2014/main" xmlns="" id="{6B58B23A-DC64-4148-9226-33683A2C9A99}"/>
+                <a16:creationId xmlns="" xmlns:a16="http://schemas.microsoft.com/office/drawing/2014/main" id="{6B58B23A-DC64-4148-9226-33683A2C9A99}"/>
               </a:ext>
             </a:extLst>
           </p:cNvPr>
@@ -15650,7 +15691,7 @@
           <p:cNvPr id="23" name="矩形 22">
             <a:extLst>
               <a:ext uri="{FF2B5EF4-FFF2-40B4-BE49-F238E27FC236}">
-                <a16:creationId xmlns:a16="http://schemas.microsoft.com/office/drawing/2014/main" xmlns="" id="{35130935-65E2-4F1C-8631-7E4BD4B4DCC4}"/>
+                <a16:creationId xmlns="" xmlns:a16="http://schemas.microsoft.com/office/drawing/2014/main" id="{35130935-65E2-4F1C-8631-7E4BD4B4DCC4}"/>
               </a:ext>
             </a:extLst>
           </p:cNvPr>
@@ -15684,7 +15725,7 @@
           <p:cNvPr id="24" name="矩形 23">
             <a:extLst>
               <a:ext uri="{FF2B5EF4-FFF2-40B4-BE49-F238E27FC236}">
-                <a16:creationId xmlns:a16="http://schemas.microsoft.com/office/drawing/2014/main" xmlns="" id="{F3E02D4F-B76D-4D6E-AB4C-61E863679F41}"/>
+                <a16:creationId xmlns="" xmlns:a16="http://schemas.microsoft.com/office/drawing/2014/main" id="{F3E02D4F-B76D-4D6E-AB4C-61E863679F41}"/>
               </a:ext>
             </a:extLst>
           </p:cNvPr>
@@ -15732,7 +15773,7 @@
           <p:cNvPr id="29" name="组合 28">
             <a:extLst>
               <a:ext uri="{FF2B5EF4-FFF2-40B4-BE49-F238E27FC236}">
-                <a16:creationId xmlns:a16="http://schemas.microsoft.com/office/drawing/2014/main" xmlns="" id="{AA571BCF-14D5-4AF9-8FC8-B2B81CEF3D3C}"/>
+                <a16:creationId xmlns="" xmlns:a16="http://schemas.microsoft.com/office/drawing/2014/main" id="{AA571BCF-14D5-4AF9-8FC8-B2B81CEF3D3C}"/>
               </a:ext>
             </a:extLst>
           </p:cNvPr>
@@ -15752,7 +15793,7 @@
             <p:cNvPr id="28" name="椭圆 27">
               <a:extLst>
                 <a:ext uri="{FF2B5EF4-FFF2-40B4-BE49-F238E27FC236}">
-                  <a16:creationId xmlns:a16="http://schemas.microsoft.com/office/drawing/2014/main" xmlns="" id="{F5EE1765-1FDB-49D4-8ACC-987822B56A21}"/>
+                  <a16:creationId xmlns="" xmlns:a16="http://schemas.microsoft.com/office/drawing/2014/main" id="{F5EE1765-1FDB-49D4-8ACC-987822B56A21}"/>
                 </a:ext>
               </a:extLst>
             </p:cNvPr>
@@ -15796,7 +15837,7 @@
             <p:cNvPr id="27" name="椭圆 26">
               <a:extLst>
                 <a:ext uri="{FF2B5EF4-FFF2-40B4-BE49-F238E27FC236}">
-                  <a16:creationId xmlns:a16="http://schemas.microsoft.com/office/drawing/2014/main" xmlns="" id="{6C3EF5C3-B3B1-4786-A54B-487DF5D5C2AC}"/>
+                  <a16:creationId xmlns="" xmlns:a16="http://schemas.microsoft.com/office/drawing/2014/main" id="{6C3EF5C3-B3B1-4786-A54B-487DF5D5C2AC}"/>
                 </a:ext>
               </a:extLst>
             </p:cNvPr>
@@ -15849,7 +15890,7 @@
           <p:cNvPr id="30" name="组合 29">
             <a:extLst>
               <a:ext uri="{FF2B5EF4-FFF2-40B4-BE49-F238E27FC236}">
-                <a16:creationId xmlns:a16="http://schemas.microsoft.com/office/drawing/2014/main" xmlns="" id="{A0A3D282-3E58-4A52-8053-1CCD660823F8}"/>
+                <a16:creationId xmlns="" xmlns:a16="http://schemas.microsoft.com/office/drawing/2014/main" id="{A0A3D282-3E58-4A52-8053-1CCD660823F8}"/>
               </a:ext>
             </a:extLst>
           </p:cNvPr>
@@ -15869,7 +15910,7 @@
             <p:cNvPr id="31" name="椭圆 30">
               <a:extLst>
                 <a:ext uri="{FF2B5EF4-FFF2-40B4-BE49-F238E27FC236}">
-                  <a16:creationId xmlns:a16="http://schemas.microsoft.com/office/drawing/2014/main" xmlns="" id="{EEF5BB86-FCF2-48B7-91D5-3416A7522090}"/>
+                  <a16:creationId xmlns="" xmlns:a16="http://schemas.microsoft.com/office/drawing/2014/main" id="{EEF5BB86-FCF2-48B7-91D5-3416A7522090}"/>
                 </a:ext>
               </a:extLst>
             </p:cNvPr>
@@ -15913,7 +15954,7 @@
             <p:cNvPr id="32" name="椭圆 31">
               <a:extLst>
                 <a:ext uri="{FF2B5EF4-FFF2-40B4-BE49-F238E27FC236}">
-                  <a16:creationId xmlns:a16="http://schemas.microsoft.com/office/drawing/2014/main" xmlns="" id="{02980C2D-B798-4A8F-A958-14F44A4A8C06}"/>
+                  <a16:creationId xmlns="" xmlns:a16="http://schemas.microsoft.com/office/drawing/2014/main" id="{02980C2D-B798-4A8F-A958-14F44A4A8C06}"/>
                 </a:ext>
               </a:extLst>
             </p:cNvPr>
@@ -15966,7 +16007,7 @@
           <p:cNvPr id="33" name="矩形 32">
             <a:extLst>
               <a:ext uri="{FF2B5EF4-FFF2-40B4-BE49-F238E27FC236}">
-                <a16:creationId xmlns:a16="http://schemas.microsoft.com/office/drawing/2014/main" xmlns="" id="{DA601A91-BCC0-4E25-81D5-2DD56F74F23D}"/>
+                <a16:creationId xmlns="" xmlns:a16="http://schemas.microsoft.com/office/drawing/2014/main" id="{DA601A91-BCC0-4E25-81D5-2DD56F74F23D}"/>
               </a:ext>
             </a:extLst>
           </p:cNvPr>
@@ -16008,7 +16049,7 @@
           <p:cNvPr id="34" name="矩形 33">
             <a:extLst>
               <a:ext uri="{FF2B5EF4-FFF2-40B4-BE49-F238E27FC236}">
-                <a16:creationId xmlns:a16="http://schemas.microsoft.com/office/drawing/2014/main" xmlns="" id="{BC59CD5E-09B6-426A-BE30-3EEA89E1DF79}"/>
+                <a16:creationId xmlns="" xmlns:a16="http://schemas.microsoft.com/office/drawing/2014/main" id="{BC59CD5E-09B6-426A-BE30-3EEA89E1DF79}"/>
               </a:ext>
             </a:extLst>
           </p:cNvPr>
@@ -16080,7 +16121,7 @@
           <p:cNvPr id="31" name="矩形 30">
             <a:extLst>
               <a:ext uri="{FF2B5EF4-FFF2-40B4-BE49-F238E27FC236}">
-                <a16:creationId xmlns:a16="http://schemas.microsoft.com/office/drawing/2014/main" xmlns="" id="{3932F80A-3232-416F-B8E0-C900C0BCF520}"/>
+                <a16:creationId xmlns="" xmlns:a16="http://schemas.microsoft.com/office/drawing/2014/main" id="{3932F80A-3232-416F-B8E0-C900C0BCF520}"/>
               </a:ext>
             </a:extLst>
           </p:cNvPr>
@@ -16124,7 +16165,7 @@
           <p:cNvPr id="28" name="矩形 27">
             <a:extLst>
               <a:ext uri="{FF2B5EF4-FFF2-40B4-BE49-F238E27FC236}">
-                <a16:creationId xmlns:a16="http://schemas.microsoft.com/office/drawing/2014/main" xmlns="" id="{D9F354FE-06F4-4C94-AD42-BE9865DA3D2E}"/>
+                <a16:creationId xmlns="" xmlns:a16="http://schemas.microsoft.com/office/drawing/2014/main" id="{D9F354FE-06F4-4C94-AD42-BE9865DA3D2E}"/>
               </a:ext>
             </a:extLst>
           </p:cNvPr>
@@ -16172,7 +16213,7 @@
           <p:cNvPr id="27" name="矩形 26">
             <a:extLst>
               <a:ext uri="{FF2B5EF4-FFF2-40B4-BE49-F238E27FC236}">
-                <a16:creationId xmlns:a16="http://schemas.microsoft.com/office/drawing/2014/main" xmlns="" id="{BF630FE5-02D9-4892-8428-BBB8C453520A}"/>
+                <a16:creationId xmlns="" xmlns:a16="http://schemas.microsoft.com/office/drawing/2014/main" id="{BF630FE5-02D9-4892-8428-BBB8C453520A}"/>
               </a:ext>
             </a:extLst>
           </p:cNvPr>
@@ -16216,7 +16257,7 @@
           <p:cNvPr id="36" name="椭圆 35">
             <a:extLst>
               <a:ext uri="{FF2B5EF4-FFF2-40B4-BE49-F238E27FC236}">
-                <a16:creationId xmlns:a16="http://schemas.microsoft.com/office/drawing/2014/main" xmlns="" id="{F75CF5A2-03F3-479D-AC27-63E52F7CB9D3}"/>
+                <a16:creationId xmlns="" xmlns:a16="http://schemas.microsoft.com/office/drawing/2014/main" id="{F75CF5A2-03F3-479D-AC27-63E52F7CB9D3}"/>
               </a:ext>
             </a:extLst>
           </p:cNvPr>
@@ -16261,7 +16302,7 @@
           <p:cNvPr id="37" name="椭圆 36">
             <a:extLst>
               <a:ext uri="{FF2B5EF4-FFF2-40B4-BE49-F238E27FC236}">
-                <a16:creationId xmlns:a16="http://schemas.microsoft.com/office/drawing/2014/main" xmlns="" id="{26645976-6F84-48AD-B509-46EC386E29D5}"/>
+                <a16:creationId xmlns="" xmlns:a16="http://schemas.microsoft.com/office/drawing/2014/main" id="{26645976-6F84-48AD-B509-46EC386E29D5}"/>
               </a:ext>
             </a:extLst>
           </p:cNvPr>
@@ -16305,7 +16346,7 @@
           <p:cNvPr id="38" name="椭圆 37">
             <a:extLst>
               <a:ext uri="{FF2B5EF4-FFF2-40B4-BE49-F238E27FC236}">
-                <a16:creationId xmlns:a16="http://schemas.microsoft.com/office/drawing/2014/main" xmlns="" id="{DE957281-87B8-4187-A00B-0A76E4C36EBE}"/>
+                <a16:creationId xmlns="" xmlns:a16="http://schemas.microsoft.com/office/drawing/2014/main" id="{DE957281-87B8-4187-A00B-0A76E4C36EBE}"/>
               </a:ext>
             </a:extLst>
           </p:cNvPr>
@@ -16349,7 +16390,7 @@
           <p:cNvPr id="39" name="椭圆 38">
             <a:extLst>
               <a:ext uri="{FF2B5EF4-FFF2-40B4-BE49-F238E27FC236}">
-                <a16:creationId xmlns:a16="http://schemas.microsoft.com/office/drawing/2014/main" xmlns="" id="{334BE293-2050-43EF-830C-510C86B3979D}"/>
+                <a16:creationId xmlns="" xmlns:a16="http://schemas.microsoft.com/office/drawing/2014/main" id="{334BE293-2050-43EF-830C-510C86B3979D}"/>
               </a:ext>
             </a:extLst>
           </p:cNvPr>
@@ -16394,7 +16435,7 @@
           <p:cNvPr id="44" name="组合 43">
             <a:extLst>
               <a:ext uri="{FF2B5EF4-FFF2-40B4-BE49-F238E27FC236}">
-                <a16:creationId xmlns:a16="http://schemas.microsoft.com/office/drawing/2014/main" xmlns="" id="{B99AEDF5-FAD3-4F45-9AC6-4FBE56A9D887}"/>
+                <a16:creationId xmlns="" xmlns:a16="http://schemas.microsoft.com/office/drawing/2014/main" id="{B99AEDF5-FAD3-4F45-9AC6-4FBE56A9D887}"/>
               </a:ext>
             </a:extLst>
           </p:cNvPr>
@@ -16414,7 +16455,7 @@
             <p:cNvPr id="45" name="椭圆 44">
               <a:extLst>
                 <a:ext uri="{FF2B5EF4-FFF2-40B4-BE49-F238E27FC236}">
-                  <a16:creationId xmlns:a16="http://schemas.microsoft.com/office/drawing/2014/main" xmlns="" id="{E91FE637-3E62-4F20-BD33-CA412B82BE93}"/>
+                  <a16:creationId xmlns="" xmlns:a16="http://schemas.microsoft.com/office/drawing/2014/main" id="{E91FE637-3E62-4F20-BD33-CA412B82BE93}"/>
                 </a:ext>
               </a:extLst>
             </p:cNvPr>
@@ -16458,7 +16499,7 @@
             <p:cNvPr id="46" name="椭圆 45">
               <a:extLst>
                 <a:ext uri="{FF2B5EF4-FFF2-40B4-BE49-F238E27FC236}">
-                  <a16:creationId xmlns:a16="http://schemas.microsoft.com/office/drawing/2014/main" xmlns="" id="{2D16A979-E0B1-424E-8730-731AACFB80BE}"/>
+                  <a16:creationId xmlns="" xmlns:a16="http://schemas.microsoft.com/office/drawing/2014/main" id="{2D16A979-E0B1-424E-8730-731AACFB80BE}"/>
                 </a:ext>
               </a:extLst>
             </p:cNvPr>
@@ -16511,7 +16552,7 @@
           <p:cNvPr id="52" name="组合 51">
             <a:extLst>
               <a:ext uri="{FF2B5EF4-FFF2-40B4-BE49-F238E27FC236}">
-                <a16:creationId xmlns:a16="http://schemas.microsoft.com/office/drawing/2014/main" xmlns="" id="{10EB72AF-4AEE-462D-93AD-5703E3D5967B}"/>
+                <a16:creationId xmlns="" xmlns:a16="http://schemas.microsoft.com/office/drawing/2014/main" id="{10EB72AF-4AEE-462D-93AD-5703E3D5967B}"/>
               </a:ext>
             </a:extLst>
           </p:cNvPr>
@@ -16531,7 +16572,7 @@
             <p:cNvPr id="53" name="椭圆 52">
               <a:extLst>
                 <a:ext uri="{FF2B5EF4-FFF2-40B4-BE49-F238E27FC236}">
-                  <a16:creationId xmlns:a16="http://schemas.microsoft.com/office/drawing/2014/main" xmlns="" id="{DB19FA0A-4009-4980-912E-F1953F900453}"/>
+                  <a16:creationId xmlns="" xmlns:a16="http://schemas.microsoft.com/office/drawing/2014/main" id="{DB19FA0A-4009-4980-912E-F1953F900453}"/>
                 </a:ext>
               </a:extLst>
             </p:cNvPr>
@@ -16575,7 +16616,7 @@
             <p:cNvPr id="54" name="椭圆 53">
               <a:extLst>
                 <a:ext uri="{FF2B5EF4-FFF2-40B4-BE49-F238E27FC236}">
-                  <a16:creationId xmlns:a16="http://schemas.microsoft.com/office/drawing/2014/main" xmlns="" id="{2A888D66-8D73-4E06-BC34-DBAF95E83AB3}"/>
+                  <a16:creationId xmlns="" xmlns:a16="http://schemas.microsoft.com/office/drawing/2014/main" id="{2A888D66-8D73-4E06-BC34-DBAF95E83AB3}"/>
                 </a:ext>
               </a:extLst>
             </p:cNvPr>
@@ -16628,7 +16669,7 @@
           <p:cNvPr id="55" name="矩形 54">
             <a:extLst>
               <a:ext uri="{FF2B5EF4-FFF2-40B4-BE49-F238E27FC236}">
-                <a16:creationId xmlns:a16="http://schemas.microsoft.com/office/drawing/2014/main" xmlns="" id="{5B79D0BC-75B1-4F46-B377-A3B61EF83949}"/>
+                <a16:creationId xmlns="" xmlns:a16="http://schemas.microsoft.com/office/drawing/2014/main" id="{5B79D0BC-75B1-4F46-B377-A3B61EF83949}"/>
               </a:ext>
             </a:extLst>
           </p:cNvPr>
@@ -16662,7 +16703,7 @@
           <p:cNvPr id="56" name="矩形 55">
             <a:extLst>
               <a:ext uri="{FF2B5EF4-FFF2-40B4-BE49-F238E27FC236}">
-                <a16:creationId xmlns:a16="http://schemas.microsoft.com/office/drawing/2014/main" xmlns="" id="{1AA65494-53EA-4D9F-AF2D-4370E574B618}"/>
+                <a16:creationId xmlns="" xmlns:a16="http://schemas.microsoft.com/office/drawing/2014/main" id="{1AA65494-53EA-4D9F-AF2D-4370E574B618}"/>
               </a:ext>
             </a:extLst>
           </p:cNvPr>
@@ -16696,7 +16737,7 @@
           <p:cNvPr id="57" name="矩形 56">
             <a:extLst>
               <a:ext uri="{FF2B5EF4-FFF2-40B4-BE49-F238E27FC236}">
-                <a16:creationId xmlns:a16="http://schemas.microsoft.com/office/drawing/2014/main" xmlns="" id="{AE380427-15FF-40E3-B09B-2E9A2C0EF872}"/>
+                <a16:creationId xmlns="" xmlns:a16="http://schemas.microsoft.com/office/drawing/2014/main" id="{AE380427-15FF-40E3-B09B-2E9A2C0EF872}"/>
               </a:ext>
             </a:extLst>
           </p:cNvPr>
@@ -16740,7 +16781,7 @@
           <p:cNvPr id="58" name="弧形 57">
             <a:extLst>
               <a:ext uri="{FF2B5EF4-FFF2-40B4-BE49-F238E27FC236}">
-                <a16:creationId xmlns:a16="http://schemas.microsoft.com/office/drawing/2014/main" xmlns="" id="{7DB8BB38-27A8-433C-82B2-B13ECEF82709}"/>
+                <a16:creationId xmlns="" xmlns:a16="http://schemas.microsoft.com/office/drawing/2014/main" id="{7DB8BB38-27A8-433C-82B2-B13ECEF82709}"/>
               </a:ext>
             </a:extLst>
           </p:cNvPr>
@@ -16793,7 +16834,7 @@
           <p:cNvPr id="60" name="椭圆 59">
             <a:extLst>
               <a:ext uri="{FF2B5EF4-FFF2-40B4-BE49-F238E27FC236}">
-                <a16:creationId xmlns:a16="http://schemas.microsoft.com/office/drawing/2014/main" xmlns="" id="{A4D3C9D7-F7E5-4E16-9074-24F0CF1558A2}"/>
+                <a16:creationId xmlns="" xmlns:a16="http://schemas.microsoft.com/office/drawing/2014/main" id="{A4D3C9D7-F7E5-4E16-9074-24F0CF1558A2}"/>
               </a:ext>
             </a:extLst>
           </p:cNvPr>
@@ -16845,7 +16886,7 @@
           <p:cNvPr id="61" name="椭圆 60">
             <a:extLst>
               <a:ext uri="{FF2B5EF4-FFF2-40B4-BE49-F238E27FC236}">
-                <a16:creationId xmlns:a16="http://schemas.microsoft.com/office/drawing/2014/main" xmlns="" id="{36638C21-6CCF-49A6-AB4D-E4FD2D496E3C}"/>
+                <a16:creationId xmlns="" xmlns:a16="http://schemas.microsoft.com/office/drawing/2014/main" id="{36638C21-6CCF-49A6-AB4D-E4FD2D496E3C}"/>
               </a:ext>
             </a:extLst>
           </p:cNvPr>
@@ -16897,7 +16938,7 @@
           <p:cNvPr id="62" name="椭圆 61">
             <a:extLst>
               <a:ext uri="{FF2B5EF4-FFF2-40B4-BE49-F238E27FC236}">
-                <a16:creationId xmlns:a16="http://schemas.microsoft.com/office/drawing/2014/main" xmlns="" id="{553F1AEA-ACE6-43D1-ABF8-DD2E3A3CC5CA}"/>
+                <a16:creationId xmlns="" xmlns:a16="http://schemas.microsoft.com/office/drawing/2014/main" id="{553F1AEA-ACE6-43D1-ABF8-DD2E3A3CC5CA}"/>
               </a:ext>
             </a:extLst>
           </p:cNvPr>
@@ -16949,7 +16990,7 @@
           <p:cNvPr id="63" name="矩形 62">
             <a:extLst>
               <a:ext uri="{FF2B5EF4-FFF2-40B4-BE49-F238E27FC236}">
-                <a16:creationId xmlns:a16="http://schemas.microsoft.com/office/drawing/2014/main" xmlns="" id="{F7EEE9A2-0A5B-4BFF-B4C8-3C981E32B8AA}"/>
+                <a16:creationId xmlns="" xmlns:a16="http://schemas.microsoft.com/office/drawing/2014/main" id="{F7EEE9A2-0A5B-4BFF-B4C8-3C981E32B8AA}"/>
               </a:ext>
             </a:extLst>
           </p:cNvPr>
@@ -16993,7 +17034,7 @@
           <p:cNvPr id="64" name="矩形 63">
             <a:extLst>
               <a:ext uri="{FF2B5EF4-FFF2-40B4-BE49-F238E27FC236}">
-                <a16:creationId xmlns:a16="http://schemas.microsoft.com/office/drawing/2014/main" xmlns="" id="{375834CA-C596-4948-A3DA-B9CFD8C512EA}"/>
+                <a16:creationId xmlns="" xmlns:a16="http://schemas.microsoft.com/office/drawing/2014/main" id="{375834CA-C596-4948-A3DA-B9CFD8C512EA}"/>
               </a:ext>
             </a:extLst>
           </p:cNvPr>
@@ -17037,7 +17078,7 @@
           <p:cNvPr id="65" name="矩形 64">
             <a:extLst>
               <a:ext uri="{FF2B5EF4-FFF2-40B4-BE49-F238E27FC236}">
-                <a16:creationId xmlns:a16="http://schemas.microsoft.com/office/drawing/2014/main" xmlns="" id="{5BAF36C3-4072-4DB2-BDCA-543F9FDEB7BF}"/>
+                <a16:creationId xmlns="" xmlns:a16="http://schemas.microsoft.com/office/drawing/2014/main" id="{5BAF36C3-4072-4DB2-BDCA-543F9FDEB7BF}"/>
               </a:ext>
             </a:extLst>
           </p:cNvPr>
@@ -17071,7 +17112,7 @@
           <p:cNvPr id="66" name="矩形 65">
             <a:extLst>
               <a:ext uri="{FF2B5EF4-FFF2-40B4-BE49-F238E27FC236}">
-                <a16:creationId xmlns:a16="http://schemas.microsoft.com/office/drawing/2014/main" xmlns="" id="{A6DE9C7D-EC7F-4F04-9EA8-61E11757885D}"/>
+                <a16:creationId xmlns="" xmlns:a16="http://schemas.microsoft.com/office/drawing/2014/main" id="{A6DE9C7D-EC7F-4F04-9EA8-61E11757885D}"/>
               </a:ext>
             </a:extLst>
           </p:cNvPr>
@@ -17135,7 +17176,7 @@
           <p:cNvPr id="2" name="矩形 1">
             <a:extLst>
               <a:ext uri="{FF2B5EF4-FFF2-40B4-BE49-F238E27FC236}">
-                <a16:creationId xmlns:a16="http://schemas.microsoft.com/office/drawing/2014/main" xmlns="" id="{39AD512D-B38E-42DB-97F2-1E453FDCBEA8}"/>
+                <a16:creationId xmlns="" xmlns:a16="http://schemas.microsoft.com/office/drawing/2014/main" id="{39AD512D-B38E-42DB-97F2-1E453FDCBEA8}"/>
               </a:ext>
             </a:extLst>
           </p:cNvPr>
@@ -17179,7 +17220,7 @@
           <p:cNvPr id="4" name="矩形 3">
             <a:extLst>
               <a:ext uri="{FF2B5EF4-FFF2-40B4-BE49-F238E27FC236}">
-                <a16:creationId xmlns:a16="http://schemas.microsoft.com/office/drawing/2014/main" xmlns="" id="{30BD5A06-57CC-4C50-B4DB-B5F51B674F5B}"/>
+                <a16:creationId xmlns="" xmlns:a16="http://schemas.microsoft.com/office/drawing/2014/main" id="{30BD5A06-57CC-4C50-B4DB-B5F51B674F5B}"/>
               </a:ext>
             </a:extLst>
           </p:cNvPr>
@@ -17223,7 +17264,7 @@
           <p:cNvPr id="5" name="椭圆 4">
             <a:extLst>
               <a:ext uri="{FF2B5EF4-FFF2-40B4-BE49-F238E27FC236}">
-                <a16:creationId xmlns:a16="http://schemas.microsoft.com/office/drawing/2014/main" xmlns="" id="{1E073CCE-04A5-4AB8-BF19-70442BB14ABB}"/>
+                <a16:creationId xmlns="" xmlns:a16="http://schemas.microsoft.com/office/drawing/2014/main" id="{1E073CCE-04A5-4AB8-BF19-70442BB14ABB}"/>
               </a:ext>
             </a:extLst>
           </p:cNvPr>
@@ -17268,7 +17309,7 @@
           <p:cNvPr id="6" name="椭圆 5">
             <a:extLst>
               <a:ext uri="{FF2B5EF4-FFF2-40B4-BE49-F238E27FC236}">
-                <a16:creationId xmlns:a16="http://schemas.microsoft.com/office/drawing/2014/main" xmlns="" id="{43C53126-9AF0-4214-A572-B5C45091A404}"/>
+                <a16:creationId xmlns="" xmlns:a16="http://schemas.microsoft.com/office/drawing/2014/main" id="{43C53126-9AF0-4214-A572-B5C45091A404}"/>
               </a:ext>
             </a:extLst>
           </p:cNvPr>
@@ -17312,7 +17353,7 @@
           <p:cNvPr id="7" name="椭圆 6">
             <a:extLst>
               <a:ext uri="{FF2B5EF4-FFF2-40B4-BE49-F238E27FC236}">
-                <a16:creationId xmlns:a16="http://schemas.microsoft.com/office/drawing/2014/main" xmlns="" id="{B9CDF78F-77B1-47A4-998F-C806731E2831}"/>
+                <a16:creationId xmlns="" xmlns:a16="http://schemas.microsoft.com/office/drawing/2014/main" id="{B9CDF78F-77B1-47A4-998F-C806731E2831}"/>
               </a:ext>
             </a:extLst>
           </p:cNvPr>
@@ -17356,7 +17397,7 @@
           <p:cNvPr id="8" name="椭圆 7">
             <a:extLst>
               <a:ext uri="{FF2B5EF4-FFF2-40B4-BE49-F238E27FC236}">
-                <a16:creationId xmlns:a16="http://schemas.microsoft.com/office/drawing/2014/main" xmlns="" id="{FBCF4E2E-4563-41AA-A7B3-4A77245ACB1E}"/>
+                <a16:creationId xmlns="" xmlns:a16="http://schemas.microsoft.com/office/drawing/2014/main" id="{FBCF4E2E-4563-41AA-A7B3-4A77245ACB1E}"/>
               </a:ext>
             </a:extLst>
           </p:cNvPr>
@@ -17401,7 +17442,7 @@
           <p:cNvPr id="17" name="矩形 16">
             <a:extLst>
               <a:ext uri="{FF2B5EF4-FFF2-40B4-BE49-F238E27FC236}">
-                <a16:creationId xmlns:a16="http://schemas.microsoft.com/office/drawing/2014/main" xmlns="" id="{9D22A83E-2774-48C0-A7CA-23A51D63DEFD}"/>
+                <a16:creationId xmlns="" xmlns:a16="http://schemas.microsoft.com/office/drawing/2014/main" id="{9D22A83E-2774-48C0-A7CA-23A51D63DEFD}"/>
               </a:ext>
             </a:extLst>
           </p:cNvPr>
@@ -17445,7 +17486,7 @@
           <p:cNvPr id="18" name="弧形 17">
             <a:extLst>
               <a:ext uri="{FF2B5EF4-FFF2-40B4-BE49-F238E27FC236}">
-                <a16:creationId xmlns:a16="http://schemas.microsoft.com/office/drawing/2014/main" xmlns="" id="{8FF296A8-6003-4544-A5FB-C43B1248F798}"/>
+                <a16:creationId xmlns="" xmlns:a16="http://schemas.microsoft.com/office/drawing/2014/main" id="{8FF296A8-6003-4544-A5FB-C43B1248F798}"/>
               </a:ext>
             </a:extLst>
           </p:cNvPr>
@@ -17498,7 +17539,7 @@
           <p:cNvPr id="19" name="椭圆 18">
             <a:extLst>
               <a:ext uri="{FF2B5EF4-FFF2-40B4-BE49-F238E27FC236}">
-                <a16:creationId xmlns:a16="http://schemas.microsoft.com/office/drawing/2014/main" xmlns="" id="{B26BD503-7256-4E8F-9B70-978BF775D0DD}"/>
+                <a16:creationId xmlns="" xmlns:a16="http://schemas.microsoft.com/office/drawing/2014/main" id="{B26BD503-7256-4E8F-9B70-978BF775D0DD}"/>
               </a:ext>
             </a:extLst>
           </p:cNvPr>
@@ -17550,7 +17591,7 @@
           <p:cNvPr id="20" name="椭圆 19">
             <a:extLst>
               <a:ext uri="{FF2B5EF4-FFF2-40B4-BE49-F238E27FC236}">
-                <a16:creationId xmlns:a16="http://schemas.microsoft.com/office/drawing/2014/main" xmlns="" id="{0DCD0E03-808F-4A3D-8C16-8F8DF95187F8}"/>
+                <a16:creationId xmlns="" xmlns:a16="http://schemas.microsoft.com/office/drawing/2014/main" id="{0DCD0E03-808F-4A3D-8C16-8F8DF95187F8}"/>
               </a:ext>
             </a:extLst>
           </p:cNvPr>
@@ -17602,7 +17643,7 @@
           <p:cNvPr id="21" name="椭圆 20">
             <a:extLst>
               <a:ext uri="{FF2B5EF4-FFF2-40B4-BE49-F238E27FC236}">
-                <a16:creationId xmlns:a16="http://schemas.microsoft.com/office/drawing/2014/main" xmlns="" id="{7FFCEA4B-011A-4AFB-A6DD-D8306729B5DF}"/>
+                <a16:creationId xmlns="" xmlns:a16="http://schemas.microsoft.com/office/drawing/2014/main" id="{7FFCEA4B-011A-4AFB-A6DD-D8306729B5DF}"/>
               </a:ext>
             </a:extLst>
           </p:cNvPr>
@@ -17654,7 +17695,7 @@
           <p:cNvPr id="22" name="矩形 21">
             <a:extLst>
               <a:ext uri="{FF2B5EF4-FFF2-40B4-BE49-F238E27FC236}">
-                <a16:creationId xmlns:a16="http://schemas.microsoft.com/office/drawing/2014/main" xmlns="" id="{E4F30A2E-C96C-4317-BB9A-A9C71070D3FE}"/>
+                <a16:creationId xmlns="" xmlns:a16="http://schemas.microsoft.com/office/drawing/2014/main" id="{E4F30A2E-C96C-4317-BB9A-A9C71070D3FE}"/>
               </a:ext>
             </a:extLst>
           </p:cNvPr>
@@ -17698,7 +17739,7 @@
           <p:cNvPr id="23" name="矩形 22">
             <a:extLst>
               <a:ext uri="{FF2B5EF4-FFF2-40B4-BE49-F238E27FC236}">
-                <a16:creationId xmlns:a16="http://schemas.microsoft.com/office/drawing/2014/main" xmlns="" id="{55A7B6F3-30DA-4681-966C-EB95FCD23EF7}"/>
+                <a16:creationId xmlns="" xmlns:a16="http://schemas.microsoft.com/office/drawing/2014/main" id="{55A7B6F3-30DA-4681-966C-EB95FCD23EF7}"/>
               </a:ext>
             </a:extLst>
           </p:cNvPr>
@@ -17742,7 +17783,7 @@
           <p:cNvPr id="24" name="矩形 23">
             <a:extLst>
               <a:ext uri="{FF2B5EF4-FFF2-40B4-BE49-F238E27FC236}">
-                <a16:creationId xmlns:a16="http://schemas.microsoft.com/office/drawing/2014/main" xmlns="" id="{50CA8D6E-8992-4CF8-8D71-E568BBAAEE11}"/>
+                <a16:creationId xmlns="" xmlns:a16="http://schemas.microsoft.com/office/drawing/2014/main" id="{50CA8D6E-8992-4CF8-8D71-E568BBAAEE11}"/>
               </a:ext>
             </a:extLst>
           </p:cNvPr>
@@ -17786,7 +17827,7 @@
           <p:cNvPr id="25" name="矩形 24">
             <a:extLst>
               <a:ext uri="{FF2B5EF4-FFF2-40B4-BE49-F238E27FC236}">
-                <a16:creationId xmlns:a16="http://schemas.microsoft.com/office/drawing/2014/main" xmlns="" id="{EDB4D9F7-EAAD-4327-B3F8-F9B2958C2703}"/>
+                <a16:creationId xmlns="" xmlns:a16="http://schemas.microsoft.com/office/drawing/2014/main" id="{EDB4D9F7-EAAD-4327-B3F8-F9B2958C2703}"/>
               </a:ext>
             </a:extLst>
           </p:cNvPr>
@@ -17830,7 +17871,7 @@
           <p:cNvPr id="3" name="矩形 2">
             <a:extLst>
               <a:ext uri="{FF2B5EF4-FFF2-40B4-BE49-F238E27FC236}">
-                <a16:creationId xmlns:a16="http://schemas.microsoft.com/office/drawing/2014/main" xmlns="" id="{4F03A318-8992-4D4A-85EC-40E07052E614}"/>
+                <a16:creationId xmlns="" xmlns:a16="http://schemas.microsoft.com/office/drawing/2014/main" id="{4F03A318-8992-4D4A-85EC-40E07052E614}"/>
               </a:ext>
             </a:extLst>
           </p:cNvPr>
@@ -17878,7 +17919,7 @@
           <p:cNvPr id="29" name="直接连接符 28">
             <a:extLst>
               <a:ext uri="{FF2B5EF4-FFF2-40B4-BE49-F238E27FC236}">
-                <a16:creationId xmlns:a16="http://schemas.microsoft.com/office/drawing/2014/main" xmlns="" id="{C7071CA5-1306-4D0F-871B-1B39BE6D2C6A}"/>
+                <a16:creationId xmlns="" xmlns:a16="http://schemas.microsoft.com/office/drawing/2014/main" id="{C7071CA5-1306-4D0F-871B-1B39BE6D2C6A}"/>
               </a:ext>
             </a:extLst>
           </p:cNvPr>
@@ -17916,7 +17957,7 @@
           <p:cNvPr id="31" name="直接连接符 30">
             <a:extLst>
               <a:ext uri="{FF2B5EF4-FFF2-40B4-BE49-F238E27FC236}">
-                <a16:creationId xmlns:a16="http://schemas.microsoft.com/office/drawing/2014/main" xmlns="" id="{A9A96BCA-A28D-452F-808A-0199960C1EF1}"/>
+                <a16:creationId xmlns="" xmlns:a16="http://schemas.microsoft.com/office/drawing/2014/main" id="{A9A96BCA-A28D-452F-808A-0199960C1EF1}"/>
               </a:ext>
             </a:extLst>
           </p:cNvPr>
@@ -17954,7 +17995,7 @@
           <p:cNvPr id="33" name="直接箭头连接符 32">
             <a:extLst>
               <a:ext uri="{FF2B5EF4-FFF2-40B4-BE49-F238E27FC236}">
-                <a16:creationId xmlns:a16="http://schemas.microsoft.com/office/drawing/2014/main" xmlns="" id="{F5B95145-BFAB-4671-913A-95C7BBBC8EE8}"/>
+                <a16:creationId xmlns="" xmlns:a16="http://schemas.microsoft.com/office/drawing/2014/main" id="{F5B95145-BFAB-4671-913A-95C7BBBC8EE8}"/>
               </a:ext>
             </a:extLst>
           </p:cNvPr>
@@ -17994,7 +18035,7 @@
           <p:cNvPr id="34" name="矩形 33">
             <a:extLst>
               <a:ext uri="{FF2B5EF4-FFF2-40B4-BE49-F238E27FC236}">
-                <a16:creationId xmlns:a16="http://schemas.microsoft.com/office/drawing/2014/main" xmlns="" id="{5BEBBC22-989B-46DA-860A-1F4272DA4F7D}"/>
+                <a16:creationId xmlns="" xmlns:a16="http://schemas.microsoft.com/office/drawing/2014/main" id="{5BEBBC22-989B-46DA-860A-1F4272DA4F7D}"/>
               </a:ext>
             </a:extLst>
           </p:cNvPr>
@@ -18028,7 +18069,7 @@
           <p:cNvPr id="35" name="矩形 34">
             <a:extLst>
               <a:ext uri="{FF2B5EF4-FFF2-40B4-BE49-F238E27FC236}">
-                <a16:creationId xmlns:a16="http://schemas.microsoft.com/office/drawing/2014/main" xmlns="" id="{198384A6-A6CC-40E3-BFAD-F40E31A95EF4}"/>
+                <a16:creationId xmlns="" xmlns:a16="http://schemas.microsoft.com/office/drawing/2014/main" id="{198384A6-A6CC-40E3-BFAD-F40E31A95EF4}"/>
               </a:ext>
             </a:extLst>
           </p:cNvPr>
@@ -18071,7 +18112,7 @@
           <p:cNvPr id="36" name="直接连接符 35">
             <a:extLst>
               <a:ext uri="{FF2B5EF4-FFF2-40B4-BE49-F238E27FC236}">
-                <a16:creationId xmlns:a16="http://schemas.microsoft.com/office/drawing/2014/main" xmlns="" id="{DA4D5211-958C-4642-9F52-20F7169DBBE2}"/>
+                <a16:creationId xmlns="" xmlns:a16="http://schemas.microsoft.com/office/drawing/2014/main" id="{DA4D5211-958C-4642-9F52-20F7169DBBE2}"/>
               </a:ext>
             </a:extLst>
           </p:cNvPr>
@@ -18109,7 +18150,7 @@
           <p:cNvPr id="38" name="直接连接符 37">
             <a:extLst>
               <a:ext uri="{FF2B5EF4-FFF2-40B4-BE49-F238E27FC236}">
-                <a16:creationId xmlns:a16="http://schemas.microsoft.com/office/drawing/2014/main" xmlns="" id="{E2143363-3068-4396-9446-236B5C1F8270}"/>
+                <a16:creationId xmlns="" xmlns:a16="http://schemas.microsoft.com/office/drawing/2014/main" id="{E2143363-3068-4396-9446-236B5C1F8270}"/>
               </a:ext>
             </a:extLst>
           </p:cNvPr>
@@ -18147,7 +18188,7 @@
           <p:cNvPr id="39" name="直接箭头连接符 38">
             <a:extLst>
               <a:ext uri="{FF2B5EF4-FFF2-40B4-BE49-F238E27FC236}">
-                <a16:creationId xmlns:a16="http://schemas.microsoft.com/office/drawing/2014/main" xmlns="" id="{87558373-F448-4EC5-8A6D-25BA724301A8}"/>
+                <a16:creationId xmlns="" xmlns:a16="http://schemas.microsoft.com/office/drawing/2014/main" id="{87558373-F448-4EC5-8A6D-25BA724301A8}"/>
               </a:ext>
             </a:extLst>
           </p:cNvPr>
@@ -18187,7 +18228,7 @@
           <p:cNvPr id="40" name="矩形 39">
             <a:extLst>
               <a:ext uri="{FF2B5EF4-FFF2-40B4-BE49-F238E27FC236}">
-                <a16:creationId xmlns:a16="http://schemas.microsoft.com/office/drawing/2014/main" xmlns="" id="{FC1AFF1A-FF8F-4594-8DCB-52FE6053BC77}"/>
+                <a16:creationId xmlns="" xmlns:a16="http://schemas.microsoft.com/office/drawing/2014/main" id="{FC1AFF1A-FF8F-4594-8DCB-52FE6053BC77}"/>
               </a:ext>
             </a:extLst>
           </p:cNvPr>
@@ -18221,7 +18262,7 @@
           <p:cNvPr id="42" name="直接连接符 41">
             <a:extLst>
               <a:ext uri="{FF2B5EF4-FFF2-40B4-BE49-F238E27FC236}">
-                <a16:creationId xmlns:a16="http://schemas.microsoft.com/office/drawing/2014/main" xmlns="" id="{545B0BCD-47A9-4735-8523-086B32FE8C45}"/>
+                <a16:creationId xmlns="" xmlns:a16="http://schemas.microsoft.com/office/drawing/2014/main" id="{545B0BCD-47A9-4735-8523-086B32FE8C45}"/>
               </a:ext>
             </a:extLst>
           </p:cNvPr>
@@ -18259,7 +18300,7 @@
           <p:cNvPr id="43" name="直接箭头连接符 42">
             <a:extLst>
               <a:ext uri="{FF2B5EF4-FFF2-40B4-BE49-F238E27FC236}">
-                <a16:creationId xmlns:a16="http://schemas.microsoft.com/office/drawing/2014/main" xmlns="" id="{3761C616-A134-4DCA-AABC-575469DE4668}"/>
+                <a16:creationId xmlns="" xmlns:a16="http://schemas.microsoft.com/office/drawing/2014/main" id="{3761C616-A134-4DCA-AABC-575469DE4668}"/>
               </a:ext>
             </a:extLst>
           </p:cNvPr>
@@ -18301,7 +18342,7 @@
           <p:cNvPr id="46" name="矩形 45">
             <a:extLst>
               <a:ext uri="{FF2B5EF4-FFF2-40B4-BE49-F238E27FC236}">
-                <a16:creationId xmlns:a16="http://schemas.microsoft.com/office/drawing/2014/main" xmlns="" id="{3F8EA31E-2287-4E36-A93F-5620ADC0E665}"/>
+                <a16:creationId xmlns="" xmlns:a16="http://schemas.microsoft.com/office/drawing/2014/main" id="{3F8EA31E-2287-4E36-A93F-5620ADC0E665}"/>
               </a:ext>
             </a:extLst>
           </p:cNvPr>
@@ -18335,7 +18376,7 @@
           <p:cNvPr id="50" name="矩形 49">
             <a:extLst>
               <a:ext uri="{FF2B5EF4-FFF2-40B4-BE49-F238E27FC236}">
-                <a16:creationId xmlns:a16="http://schemas.microsoft.com/office/drawing/2014/main" xmlns="" id="{1C92F821-1CA9-4922-A407-226C3318FE4E}"/>
+                <a16:creationId xmlns="" xmlns:a16="http://schemas.microsoft.com/office/drawing/2014/main" id="{1C92F821-1CA9-4922-A407-226C3318FE4E}"/>
               </a:ext>
             </a:extLst>
           </p:cNvPr>
@@ -18370,7 +18411,7 @@
           <p:cNvPr id="51" name="右大括号 50">
             <a:extLst>
               <a:ext uri="{FF2B5EF4-FFF2-40B4-BE49-F238E27FC236}">
-                <a16:creationId xmlns:a16="http://schemas.microsoft.com/office/drawing/2014/main" xmlns="" id="{B30D63C6-A627-49BE-BE67-4B8F821FB348}"/>
+                <a16:creationId xmlns="" xmlns:a16="http://schemas.microsoft.com/office/drawing/2014/main" id="{B30D63C6-A627-49BE-BE67-4B8F821FB348}"/>
               </a:ext>
             </a:extLst>
           </p:cNvPr>
@@ -18422,7 +18463,7 @@
           <p:cNvPr id="52" name="矩形 51">
             <a:extLst>
               <a:ext uri="{FF2B5EF4-FFF2-40B4-BE49-F238E27FC236}">
-                <a16:creationId xmlns:a16="http://schemas.microsoft.com/office/drawing/2014/main" xmlns="" id="{D56C19D5-01A6-4BF0-8CE3-683CE102795B}"/>
+                <a16:creationId xmlns="" xmlns:a16="http://schemas.microsoft.com/office/drawing/2014/main" id="{D56C19D5-01A6-4BF0-8CE3-683CE102795B}"/>
               </a:ext>
             </a:extLst>
           </p:cNvPr>
@@ -18460,7 +18501,7 @@
           <p:cNvPr id="53" name="右大括号 52">
             <a:extLst>
               <a:ext uri="{FF2B5EF4-FFF2-40B4-BE49-F238E27FC236}">
-                <a16:creationId xmlns:a16="http://schemas.microsoft.com/office/drawing/2014/main" xmlns="" id="{93A20529-5955-4168-AB80-614BC670BDC8}"/>
+                <a16:creationId xmlns="" xmlns:a16="http://schemas.microsoft.com/office/drawing/2014/main" id="{93A20529-5955-4168-AB80-614BC670BDC8}"/>
               </a:ext>
             </a:extLst>
           </p:cNvPr>
@@ -18512,7 +18553,7 @@
           <p:cNvPr id="54" name="矩形 53">
             <a:extLst>
               <a:ext uri="{FF2B5EF4-FFF2-40B4-BE49-F238E27FC236}">
-                <a16:creationId xmlns:a16="http://schemas.microsoft.com/office/drawing/2014/main" xmlns="" id="{114D9BE6-741A-4F52-82D9-40D89A1648D0}"/>
+                <a16:creationId xmlns="" xmlns:a16="http://schemas.microsoft.com/office/drawing/2014/main" id="{114D9BE6-741A-4F52-82D9-40D89A1648D0}"/>
               </a:ext>
             </a:extLst>
           </p:cNvPr>

</xml_diff>